<commit_message>
Modified source code : Add project to solution
Updated PPT
</commit_message>
<xml_diff>
--- a/Meetup_DotNet_10_Aug_2019/ML_Net_Praveen_Raghuvanshi_10_Aug_2019.pptx
+++ b/Meetup_DotNet_10_Aug_2019/ML_Net_Praveen_Raghuvanshi_10_Aug_2019.pptx
@@ -5675,7 +5675,7 @@
           <a:p>
             <a:fld id="{154FEC57-6F76-4D9A-BEBF-4431325DB260}" type="datetimeFigureOut">
               <a:rPr lang="en-US" smtClean="0"/>
-              <a:t>8/8/2019</a:t>
+              <a:t>8/9/2019</a:t>
             </a:fld>
             <a:endParaRPr lang="en-US"/>
           </a:p>
@@ -6013,16 +6013,21 @@
           <a:p>
             <a:r>
               <a:rPr lang="en-US" baseline="0" dirty="0" smtClean="0"/>
-              <a:t>Thanks to the organizing members : Harman , </a:t>
+              <a:t>Thanks to the organizing members : </a:t>
             </a:r>
             <a:r>
               <a:rPr lang="en-US" baseline="0" dirty="0" err="1" smtClean="0"/>
-              <a:t>CodeOps</a:t>
+              <a:t>.Net</a:t>
             </a:r>
             <a:r>
               <a:rPr lang="en-US" baseline="0" dirty="0" smtClean="0"/>
-              <a:t> (Ganesh and Vinay)</a:t>
-            </a:r>
+              <a:t> Community, Anand and </a:t>
+            </a:r>
+            <a:r>
+              <a:rPr lang="en-US" baseline="0" dirty="0" err="1" smtClean="0"/>
+              <a:t>DevOn</a:t>
+            </a:r>
+            <a:endParaRPr lang="en-US" baseline="0" dirty="0" smtClean="0"/>
           </a:p>
           <a:p>
             <a:endParaRPr lang="en-US" baseline="0" dirty="0" smtClean="0"/>
@@ -8567,7 +8572,7 @@
           <a:p>
             <a:fld id="{48A87A34-81AB-432B-8DAE-1953F412C126}" type="datetimeFigureOut">
               <a:rPr lang="en-US" smtClean="0"/>
-              <a:t>8/8/2019</a:t>
+              <a:t>8/9/2019</a:t>
             </a:fld>
             <a:endParaRPr lang="en-US" dirty="0"/>
           </a:p>
@@ -8775,7 +8780,7 @@
           <a:p>
             <a:fld id="{48A87A34-81AB-432B-8DAE-1953F412C126}" type="datetimeFigureOut">
               <a:rPr lang="en-US" smtClean="0"/>
-              <a:t>8/8/2019</a:t>
+              <a:t>8/9/2019</a:t>
             </a:fld>
             <a:endParaRPr lang="en-US" dirty="0"/>
           </a:p>
@@ -9031,7 +9036,7 @@
           <a:p>
             <a:fld id="{48A87A34-81AB-432B-8DAE-1953F412C126}" type="datetimeFigureOut">
               <a:rPr lang="en-US" smtClean="0"/>
-              <a:t>8/8/2019</a:t>
+              <a:t>8/9/2019</a:t>
             </a:fld>
             <a:endParaRPr lang="en-US" dirty="0"/>
           </a:p>
@@ -9205,7 +9210,7 @@
           <a:p>
             <a:fld id="{48A87A34-81AB-432B-8DAE-1953F412C126}" type="datetimeFigureOut">
               <a:rPr lang="en-US" smtClean="0"/>
-              <a:t>8/8/2019</a:t>
+              <a:t>8/9/2019</a:t>
             </a:fld>
             <a:endParaRPr lang="en-US" dirty="0"/>
           </a:p>
@@ -9548,7 +9553,7 @@
           <a:p>
             <a:fld id="{48A87A34-81AB-432B-8DAE-1953F412C126}" type="datetimeFigureOut">
               <a:rPr lang="en-US" smtClean="0"/>
-              <a:t>8/8/2019</a:t>
+              <a:t>8/9/2019</a:t>
             </a:fld>
             <a:endParaRPr lang="en-US" dirty="0"/>
           </a:p>
@@ -9823,7 +9828,7 @@
           <a:p>
             <a:fld id="{48A87A34-81AB-432B-8DAE-1953F412C126}" type="datetimeFigureOut">
               <a:rPr lang="en-US" smtClean="0"/>
-              <a:t>8/8/2019</a:t>
+              <a:t>8/9/2019</a:t>
             </a:fld>
             <a:endParaRPr lang="en-US" dirty="0"/>
           </a:p>
@@ -10202,7 +10207,7 @@
           <a:p>
             <a:fld id="{48A87A34-81AB-432B-8DAE-1953F412C126}" type="datetimeFigureOut">
               <a:rPr lang="en-US" smtClean="0"/>
-              <a:t>8/8/2019</a:t>
+              <a:t>8/9/2019</a:t>
             </a:fld>
             <a:endParaRPr lang="en-US" dirty="0"/>
           </a:p>
@@ -10320,7 +10325,7 @@
           <a:p>
             <a:fld id="{48A87A34-81AB-432B-8DAE-1953F412C126}" type="datetimeFigureOut">
               <a:rPr lang="en-US" smtClean="0"/>
-              <a:t>8/8/2019</a:t>
+              <a:t>8/9/2019</a:t>
             </a:fld>
             <a:endParaRPr lang="en-US" dirty="0"/>
           </a:p>
@@ -10491,7 +10496,7 @@
           <a:p>
             <a:fld id="{48A87A34-81AB-432B-8DAE-1953F412C126}" type="datetimeFigureOut">
               <a:rPr lang="en-US" smtClean="0"/>
-              <a:t>8/8/2019</a:t>
+              <a:t>8/9/2019</a:t>
             </a:fld>
             <a:endParaRPr lang="en-US" dirty="0"/>
           </a:p>
@@ -10845,7 +10850,7 @@
           <a:p>
             <a:fld id="{48A87A34-81AB-432B-8DAE-1953F412C126}" type="datetimeFigureOut">
               <a:rPr lang="en-US" smtClean="0"/>
-              <a:t>8/8/2019</a:t>
+              <a:t>8/9/2019</a:t>
             </a:fld>
             <a:endParaRPr lang="en-US" dirty="0"/>
           </a:p>
@@ -11227,7 +11232,7 @@
           <a:p>
             <a:fld id="{48A87A34-81AB-432B-8DAE-1953F412C126}" type="datetimeFigureOut">
               <a:rPr lang="en-US" smtClean="0"/>
-              <a:t>8/8/2019</a:t>
+              <a:t>8/9/2019</a:t>
             </a:fld>
             <a:endParaRPr lang="en-US" dirty="0"/>
           </a:p>
@@ -11515,7 +11520,7 @@
             <a:fld id="{48A87A34-81AB-432B-8DAE-1953F412C126}" type="datetimeFigureOut">
               <a:rPr lang="en-US" smtClean="0"/>
               <a:pPr/>
-              <a:t>8/8/2019</a:t>
+              <a:t>8/9/2019</a:t>
             </a:fld>
             <a:endParaRPr lang="en-US" dirty="0"/>
           </a:p>
@@ -12243,8 +12248,8 @@
         </p:nvSpPr>
         <p:spPr>
           <a:xfrm>
-            <a:off x="1141413" y="2249486"/>
-            <a:ext cx="5903822" cy="2453143"/>
+            <a:off x="1141412" y="2249487"/>
+            <a:ext cx="9867963" cy="1688530"/>
           </a:xfrm>
         </p:spPr>
         <p:txBody>
@@ -12313,7 +12318,7 @@
         </p:blipFill>
         <p:spPr>
           <a:xfrm>
-            <a:off x="2973977" y="4702629"/>
+            <a:off x="2973977" y="4275909"/>
             <a:ext cx="5486400" cy="1295400"/>
           </a:xfrm>
           <a:prstGeom prst="rect">
@@ -12521,7 +12526,7 @@
               <a:buChar char="•"/>
             </a:pPr>
             <a:r>
-              <a:rPr lang="en-US" sz="2200" b="1" dirty="0"/>
+              <a:rPr lang="en-US" sz="2200" dirty="0"/>
               <a:t>ML framework from Microsoft for developing Custom AI/ML applications</a:t>
             </a:r>
           </a:p>
@@ -12534,7 +12539,7 @@
               <a:buChar char="•"/>
             </a:pPr>
             <a:r>
-              <a:rPr lang="en-US" sz="2200" b="1" dirty="0"/>
+              <a:rPr lang="en-US" sz="2200" dirty="0"/>
               <a:t>Originated in 2002 as part of Microsoft Research project</a:t>
             </a:r>
           </a:p>
@@ -13183,7 +13188,7 @@
         </p:spPr>
         <p:txBody>
           <a:bodyPr>
-            <a:normAutofit fontScale="85000" lnSpcReduction="20000"/>
+            <a:normAutofit fontScale="85000" lnSpcReduction="10000"/>
           </a:bodyPr>
           <a:lstStyle/>
           <a:p>
@@ -13195,17 +13200,18 @@
               <a:buChar char="•"/>
             </a:pPr>
             <a:r>
-              <a:rPr lang="en-US" sz="2200" b="1" dirty="0"/>
-              <a:t>ONNX is developed and maintained by a community of partners such as Microsoft, Facebook, AWS, </a:t>
-            </a:r>
-            <a:r>
-              <a:rPr lang="en-US" sz="2200" b="1" dirty="0" err="1"/>
-              <a:t>Nvidia</a:t>
-            </a:r>
-            <a:r>
-              <a:rPr lang="en-US" sz="2200" b="1" dirty="0"/>
-              <a:t>, Intel and AMD.</a:t>
-            </a:r>
+              <a:rPr lang="en-US" sz="2200" dirty="0"/>
+              <a:t>ONNX is developed and maintained by a community of partners such as Microsoft</a:t>
+            </a:r>
+            <a:r>
+              <a:rPr lang="en-US" sz="2200"/>
+              <a:t>, </a:t>
+            </a:r>
+            <a:r>
+              <a:rPr lang="en-US" sz="2200" smtClean="0"/>
+              <a:t>Facebook.</a:t>
+            </a:r>
+            <a:endParaRPr lang="en-US" sz="2200" dirty="0"/>
           </a:p>
           <a:p>
             <a:pPr lvl="1" fontAlgn="base">
@@ -13216,14 +13222,14 @@
               <a:buChar char="•"/>
             </a:pPr>
             <a:r>
-              <a:rPr lang="en-US" sz="2200" b="1" dirty="0"/>
+              <a:rPr lang="en-US" sz="2200" dirty="0"/>
               <a:t>ONNX files could be viewed using </a:t>
             </a:r>
             <a:r>
-              <a:rPr lang="en-US" sz="2200" b="1" dirty="0" err="1"/>
+              <a:rPr lang="en-US" sz="2200" dirty="0" err="1"/>
               <a:t>Netron</a:t>
             </a:r>
-            <a:endParaRPr lang="en-US" sz="2200" b="1" dirty="0"/>
+            <a:endParaRPr lang="en-US" sz="2200" dirty="0"/>
           </a:p>
           <a:p>
             <a:endParaRPr lang="en-US" dirty="0"/>
@@ -14460,12 +14466,36 @@
           </a:xfrm>
         </p:spPr>
         <p:txBody>
-          <a:bodyPr/>
+          <a:bodyPr>
+            <a:normAutofit fontScale="90000"/>
+          </a:bodyPr>
           <a:lstStyle/>
           <a:p>
             <a:r>
               <a:rPr lang="en-US" dirty="0" smtClean="0"/>
-              <a:t>Thank you</a:t>
+              <a:t>Thank </a:t>
+            </a:r>
+            <a:r>
+              <a:rPr lang="en-US" dirty="0" smtClean="0"/>
+              <a:t>you</a:t>
+            </a:r>
+            <a:br>
+              <a:rPr lang="en-US" dirty="0" smtClean="0"/>
+            </a:br>
+            <a:r>
+              <a:rPr lang="en-US" dirty="0"/>
+              <a:t/>
+            </a:r>
+            <a:br>
+              <a:rPr lang="en-US" dirty="0"/>
+            </a:br>
+            <a:r>
+              <a:rPr lang="en-US" dirty="0"/>
+              <a:t>Q</a:t>
+            </a:r>
+            <a:r>
+              <a:rPr lang="en-US" dirty="0" smtClean="0"/>
+              <a:t> &amp; A</a:t>
             </a:r>
             <a:endParaRPr lang="en-US" dirty="0"/>
           </a:p>
@@ -14500,7 +14530,7 @@
               <a:buNone/>
             </a:pPr>
             <a:r>
-              <a:rPr lang="en-US" sz="8000" dirty="0" smtClean="0"/>
+              <a:rPr lang="en-US" sz="8000" dirty="0"/>
               <a:t>praveenraghuvanshi@gmail.com</a:t>
             </a:r>
           </a:p>
@@ -14550,9 +14580,6 @@
               </a:rPr>
               <a:t>github.com/praveenraghuvanshi1512</a:t>
             </a:r>
-            <a:endParaRPr lang="en-US" sz="8000" dirty="0" smtClean="0">
-              <a:hlinkClick r:id="rId3"/>
-            </a:endParaRPr>
           </a:p>
           <a:p>
             <a:pPr marL="0" indent="0">

</xml_diff>

<commit_message>
Updated PPT with Demo steps
</commit_message>
<xml_diff>
--- a/Meetup_DotNet_10_Aug_2019/ML_Net_Praveen_Raghuvanshi_10_Aug_2019.pptx
+++ b/Meetup_DotNet_10_Aug_2019/ML_Net_Praveen_Raghuvanshi_10_Aug_2019.pptx
@@ -5,7 +5,7 @@
     <p:sldMasterId id="2147483681" r:id="rId1"/>
   </p:sldMasterIdLst>
   <p:notesMasterIdLst>
-    <p:notesMasterId r:id="rId25"/>
+    <p:notesMasterId r:id="rId32"/>
   </p:notesMasterIdLst>
   <p:sldIdLst>
     <p:sldId id="256" r:id="rId2"/>
@@ -28,9 +28,16 @@
     <p:sldId id="273" r:id="rId19"/>
     <p:sldId id="274" r:id="rId20"/>
     <p:sldId id="275" r:id="rId21"/>
-    <p:sldId id="276" r:id="rId22"/>
-    <p:sldId id="277" r:id="rId23"/>
-    <p:sldId id="278" r:id="rId24"/>
+    <p:sldId id="280" r:id="rId22"/>
+    <p:sldId id="281" r:id="rId23"/>
+    <p:sldId id="282" r:id="rId24"/>
+    <p:sldId id="283" r:id="rId25"/>
+    <p:sldId id="284" r:id="rId26"/>
+    <p:sldId id="285" r:id="rId27"/>
+    <p:sldId id="286" r:id="rId28"/>
+    <p:sldId id="276" r:id="rId29"/>
+    <p:sldId id="277" r:id="rId30"/>
+    <p:sldId id="278" r:id="rId31"/>
   </p:sldIdLst>
   <p:sldSz cx="12192000" cy="6858000"/>
   <p:notesSz cx="6858000" cy="9144000"/>
@@ -6109,6 +6116,501 @@
 </p:notes>
 </file>
 
+<file path=ppt/notesSlides/notesSlide10.xml><?xml version="1.0" encoding="utf-8"?>
+<p:notes xmlns:a="http://schemas.openxmlformats.org/drawingml/2006/main" xmlns:r="http://schemas.openxmlformats.org/officeDocument/2006/relationships" xmlns:p="http://schemas.openxmlformats.org/presentationml/2006/main">
+  <p:cSld>
+    <p:spTree>
+      <p:nvGrpSpPr>
+        <p:cNvPr id="1" name=""/>
+        <p:cNvGrpSpPr/>
+        <p:nvPr/>
+      </p:nvGrpSpPr>
+      <p:grpSpPr>
+        <a:xfrm>
+          <a:off x="0" y="0"/>
+          <a:ext cx="0" cy="0"/>
+          <a:chOff x="0" y="0"/>
+          <a:chExt cx="0" cy="0"/>
+        </a:xfrm>
+      </p:grpSpPr>
+      <p:sp>
+        <p:nvSpPr>
+          <p:cNvPr id="2" name="Slide Image Placeholder 1"/>
+          <p:cNvSpPr>
+            <a:spLocks noGrp="1" noRot="1" noChangeAspect="1"/>
+          </p:cNvSpPr>
+          <p:nvPr>
+            <p:ph type="sldImg"/>
+          </p:nvPr>
+        </p:nvSpPr>
+        <p:spPr/>
+      </p:sp>
+      <p:sp>
+        <p:nvSpPr>
+          <p:cNvPr id="3" name="Notes Placeholder 2"/>
+          <p:cNvSpPr>
+            <a:spLocks noGrp="1"/>
+          </p:cNvSpPr>
+          <p:nvPr>
+            <p:ph type="body" idx="1"/>
+          </p:nvPr>
+        </p:nvSpPr>
+        <p:spPr/>
+        <p:txBody>
+          <a:bodyPr/>
+          <a:lstStyle/>
+          <a:p>
+            <a:r>
+              <a:rPr lang="en-US" dirty="0" smtClean="0"/>
+              <a:t>Predict for a single passenger</a:t>
+            </a:r>
+            <a:endParaRPr lang="en-US" dirty="0"/>
+          </a:p>
+        </p:txBody>
+      </p:sp>
+      <p:sp>
+        <p:nvSpPr>
+          <p:cNvPr id="4" name="Slide Number Placeholder 3"/>
+          <p:cNvSpPr>
+            <a:spLocks noGrp="1"/>
+          </p:cNvSpPr>
+          <p:nvPr>
+            <p:ph type="sldNum" sz="quarter" idx="10"/>
+          </p:nvPr>
+        </p:nvSpPr>
+        <p:spPr/>
+        <p:txBody>
+          <a:bodyPr/>
+          <a:lstStyle/>
+          <a:p>
+            <a:fld id="{55849CEA-452E-49F3-92ED-210B64DD3C6C}" type="slidenum">
+              <a:rPr lang="en-US" smtClean="0"/>
+              <a:t>27</a:t>
+            </a:fld>
+            <a:endParaRPr lang="en-US"/>
+          </a:p>
+        </p:txBody>
+      </p:sp>
+    </p:spTree>
+    <p:extLst>
+      <p:ext uri="{BB962C8B-B14F-4D97-AF65-F5344CB8AC3E}">
+        <p14:creationId xmlns:p14="http://schemas.microsoft.com/office/powerpoint/2010/main" val="2075469643"/>
+      </p:ext>
+    </p:extLst>
+  </p:cSld>
+  <p:clrMapOvr>
+    <a:masterClrMapping/>
+  </p:clrMapOvr>
+</p:notes>
+</file>
+
+<file path=ppt/notesSlides/notesSlide11.xml><?xml version="1.0" encoding="utf-8"?>
+<p:notes xmlns:a="http://schemas.openxmlformats.org/drawingml/2006/main" xmlns:r="http://schemas.openxmlformats.org/officeDocument/2006/relationships" xmlns:p="http://schemas.openxmlformats.org/presentationml/2006/main">
+  <p:cSld>
+    <p:spTree>
+      <p:nvGrpSpPr>
+        <p:cNvPr id="1" name=""/>
+        <p:cNvGrpSpPr/>
+        <p:nvPr/>
+      </p:nvGrpSpPr>
+      <p:grpSpPr>
+        <a:xfrm>
+          <a:off x="0" y="0"/>
+          <a:ext cx="0" cy="0"/>
+          <a:chOff x="0" y="0"/>
+          <a:chExt cx="0" cy="0"/>
+        </a:xfrm>
+      </p:grpSpPr>
+      <p:sp>
+        <p:nvSpPr>
+          <p:cNvPr id="2" name="Slide Image Placeholder 1"/>
+          <p:cNvSpPr>
+            <a:spLocks noGrp="1" noRot="1" noChangeAspect="1"/>
+          </p:cNvSpPr>
+          <p:nvPr>
+            <p:ph type="sldImg"/>
+          </p:nvPr>
+        </p:nvSpPr>
+        <p:spPr/>
+      </p:sp>
+      <p:sp>
+        <p:nvSpPr>
+          <p:cNvPr id="3" name="Notes Placeholder 2"/>
+          <p:cNvSpPr>
+            <a:spLocks noGrp="1"/>
+          </p:cNvSpPr>
+          <p:nvPr>
+            <p:ph type="body" idx="1"/>
+          </p:nvPr>
+        </p:nvSpPr>
+        <p:spPr/>
+        <p:txBody>
+          <a:bodyPr/>
+          <a:lstStyle/>
+          <a:p>
+            <a:pPr rtl="0"/>
+            <a:r>
+              <a:rPr lang="en-US" sz="1200" b="0" i="0" u="none" strike="noStrike" kern="1200" dirty="0" smtClean="0">
+                <a:solidFill>
+                  <a:schemeClr val="tx1"/>
+                </a:solidFill>
+                <a:effectLst/>
+                <a:latin typeface="+mn-lt"/>
+                <a:ea typeface="+mn-ea"/>
+                <a:cs typeface="+mn-cs"/>
+              </a:rPr>
+              <a:t>We are going to have a Photo-Search application. </a:t>
+            </a:r>
+            <a:endParaRPr lang="en-US" b="0" dirty="0" smtClean="0">
+              <a:effectLst/>
+            </a:endParaRPr>
+          </a:p>
+          <a:p>
+            <a:pPr rtl="0"/>
+            <a:r>
+              <a:rPr lang="en-US" sz="1200" b="0" i="0" u="none" strike="noStrike" kern="1200" dirty="0" smtClean="0">
+                <a:solidFill>
+                  <a:schemeClr val="tx1"/>
+                </a:solidFill>
+                <a:effectLst/>
+                <a:latin typeface="+mn-lt"/>
+                <a:ea typeface="+mn-ea"/>
+                <a:cs typeface="+mn-cs"/>
+              </a:rPr>
+              <a:t>It takes a model developed using </a:t>
+            </a:r>
+            <a:r>
+              <a:rPr lang="en-US" sz="1200" b="0" i="0" u="none" strike="noStrike" kern="1200" dirty="0" err="1" smtClean="0">
+                <a:solidFill>
+                  <a:schemeClr val="tx1"/>
+                </a:solidFill>
+                <a:effectLst/>
+                <a:latin typeface="+mn-lt"/>
+                <a:ea typeface="+mn-ea"/>
+                <a:cs typeface="+mn-cs"/>
+              </a:rPr>
+              <a:t>Keras</a:t>
+            </a:r>
+            <a:r>
+              <a:rPr lang="en-US" sz="1200" b="0" i="0" u="none" strike="noStrike" kern="1200" dirty="0" smtClean="0">
+                <a:solidFill>
+                  <a:schemeClr val="tx1"/>
+                </a:solidFill>
+                <a:effectLst/>
+                <a:latin typeface="+mn-lt"/>
+                <a:ea typeface="+mn-ea"/>
+                <a:cs typeface="+mn-cs"/>
+              </a:rPr>
+              <a:t> and converted to ONNX format</a:t>
+            </a:r>
+            <a:endParaRPr lang="en-US" b="0" dirty="0" smtClean="0">
+              <a:effectLst/>
+            </a:endParaRPr>
+          </a:p>
+          <a:p>
+            <a:pPr rtl="0"/>
+            <a:r>
+              <a:rPr lang="en-US" b="0" dirty="0" smtClean="0">
+                <a:effectLst/>
+              </a:rPr>
+              <a:t/>
+            </a:r>
+            <a:br>
+              <a:rPr lang="en-US" b="0" dirty="0" smtClean="0">
+                <a:effectLst/>
+              </a:rPr>
+            </a:br>
+            <a:r>
+              <a:rPr lang="en-US" sz="1200" b="0" i="0" u="none" strike="noStrike" kern="1200" dirty="0" smtClean="0">
+                <a:solidFill>
+                  <a:schemeClr val="tx1"/>
+                </a:solidFill>
+                <a:effectLst/>
+                <a:latin typeface="+mn-lt"/>
+                <a:ea typeface="+mn-ea"/>
+                <a:cs typeface="+mn-cs"/>
+              </a:rPr>
+              <a:t>Display </a:t>
+            </a:r>
+            <a:r>
+              <a:rPr lang="en-US" sz="1200" b="0" i="0" u="none" strike="noStrike" kern="1200" dirty="0" err="1" smtClean="0">
+                <a:solidFill>
+                  <a:schemeClr val="tx1"/>
+                </a:solidFill>
+                <a:effectLst/>
+                <a:latin typeface="+mn-lt"/>
+                <a:ea typeface="+mn-ea"/>
+                <a:cs typeface="+mn-cs"/>
+              </a:rPr>
+              <a:t>onnx</a:t>
+            </a:r>
+            <a:r>
+              <a:rPr lang="en-US" sz="1200" b="0" i="0" u="none" strike="noStrike" kern="1200" dirty="0" smtClean="0">
+                <a:solidFill>
+                  <a:schemeClr val="tx1"/>
+                </a:solidFill>
+                <a:effectLst/>
+                <a:latin typeface="+mn-lt"/>
+                <a:ea typeface="+mn-ea"/>
+                <a:cs typeface="+mn-cs"/>
+              </a:rPr>
+              <a:t> file in NETRON located at D:\Praveen\Personal\Technical\AI_ML\ML.Net\Meetup 29 June 2019\Demo\</a:t>
+            </a:r>
+            <a:r>
+              <a:rPr lang="en-US" sz="1200" b="0" i="0" u="none" strike="noStrike" kern="1200" dirty="0" err="1" smtClean="0">
+                <a:solidFill>
+                  <a:schemeClr val="tx1"/>
+                </a:solidFill>
+                <a:effectLst/>
+                <a:latin typeface="+mn-lt"/>
+                <a:ea typeface="+mn-ea"/>
+                <a:cs typeface="+mn-cs"/>
+              </a:rPr>
+              <a:t>MLDemoMeetup</a:t>
+            </a:r>
+            <a:r>
+              <a:rPr lang="en-US" sz="1200" b="0" i="0" u="none" strike="noStrike" kern="1200" dirty="0" smtClean="0">
+                <a:solidFill>
+                  <a:schemeClr val="tx1"/>
+                </a:solidFill>
+                <a:effectLst/>
+                <a:latin typeface="+mn-lt"/>
+                <a:ea typeface="+mn-ea"/>
+                <a:cs typeface="+mn-cs"/>
+              </a:rPr>
+              <a:t>\</a:t>
+            </a:r>
+            <a:r>
+              <a:rPr lang="en-US" sz="1200" b="0" i="0" u="none" strike="noStrike" kern="1200" dirty="0" err="1" smtClean="0">
+                <a:solidFill>
+                  <a:schemeClr val="tx1"/>
+                </a:solidFill>
+                <a:effectLst/>
+                <a:latin typeface="+mn-lt"/>
+                <a:ea typeface="+mn-ea"/>
+                <a:cs typeface="+mn-cs"/>
+              </a:rPr>
+              <a:t>PhotoSearchDemo</a:t>
+            </a:r>
+            <a:r>
+              <a:rPr lang="en-US" sz="1200" b="0" i="0" u="none" strike="noStrike" kern="1200" dirty="0" smtClean="0">
+                <a:solidFill>
+                  <a:schemeClr val="tx1"/>
+                </a:solidFill>
+                <a:effectLst/>
+                <a:latin typeface="+mn-lt"/>
+                <a:ea typeface="+mn-ea"/>
+                <a:cs typeface="+mn-cs"/>
+              </a:rPr>
+              <a:t>\PhotoSearchNetCore3\</a:t>
+            </a:r>
+            <a:r>
+              <a:rPr lang="en-US" sz="1200" b="0" i="0" u="none" strike="noStrike" kern="1200" dirty="0" err="1" smtClean="0">
+                <a:solidFill>
+                  <a:schemeClr val="tx1"/>
+                </a:solidFill>
+                <a:effectLst/>
+                <a:latin typeface="+mn-lt"/>
+                <a:ea typeface="+mn-ea"/>
+                <a:cs typeface="+mn-cs"/>
+              </a:rPr>
+              <a:t>model.onnx</a:t>
+            </a:r>
+            <a:endParaRPr lang="en-US" b="0" dirty="0" smtClean="0">
+              <a:effectLst/>
+            </a:endParaRPr>
+          </a:p>
+          <a:p>
+            <a:pPr rtl="0"/>
+            <a:r>
+              <a:rPr lang="en-US" b="0" dirty="0" smtClean="0">
+                <a:effectLst/>
+              </a:rPr>
+              <a:t/>
+            </a:r>
+            <a:br>
+              <a:rPr lang="en-US" b="0" dirty="0" smtClean="0">
+                <a:effectLst/>
+              </a:rPr>
+            </a:br>
+            <a:r>
+              <a:rPr lang="en-US" sz="1200" b="0" i="0" u="none" strike="noStrike" kern="1200" dirty="0" smtClean="0">
+                <a:solidFill>
+                  <a:schemeClr val="tx1"/>
+                </a:solidFill>
+                <a:effectLst/>
+                <a:latin typeface="+mn-lt"/>
+                <a:ea typeface="+mn-ea"/>
+                <a:cs typeface="+mn-cs"/>
+              </a:rPr>
+              <a:t>1. Run PhotoSearchNetCore3 project </a:t>
+            </a:r>
+            <a:endParaRPr lang="en-US" b="0" dirty="0" smtClean="0">
+              <a:effectLst/>
+            </a:endParaRPr>
+          </a:p>
+          <a:p>
+            <a:pPr rtl="0"/>
+            <a:r>
+              <a:rPr lang="en-US" sz="1200" b="0" i="0" u="none" strike="noStrike" kern="1200" dirty="0" smtClean="0">
+                <a:solidFill>
+                  <a:schemeClr val="tx1"/>
+                </a:solidFill>
+                <a:effectLst/>
+                <a:latin typeface="+mn-lt"/>
+                <a:ea typeface="+mn-ea"/>
+                <a:cs typeface="+mn-cs"/>
+              </a:rPr>
+              <a:t>2. Select ALL and click Search : Display all items within folder</a:t>
+            </a:r>
+            <a:endParaRPr lang="en-US" b="0" dirty="0" smtClean="0">
+              <a:effectLst/>
+            </a:endParaRPr>
+          </a:p>
+          <a:p>
+            <a:pPr rtl="0"/>
+            <a:r>
+              <a:rPr lang="en-US" sz="1200" b="0" i="0" u="none" strike="noStrike" kern="1200" dirty="0" smtClean="0">
+                <a:solidFill>
+                  <a:schemeClr val="tx1"/>
+                </a:solidFill>
+                <a:effectLst/>
+                <a:latin typeface="+mn-lt"/>
+                <a:ea typeface="+mn-ea"/>
+                <a:cs typeface="+mn-cs"/>
+              </a:rPr>
+              <a:t>3. Select Cat and select items</a:t>
+            </a:r>
+            <a:endParaRPr lang="en-US" b="0" dirty="0" smtClean="0">
+              <a:effectLst/>
+            </a:endParaRPr>
+          </a:p>
+          <a:p>
+            <a:pPr rtl="0"/>
+            <a:r>
+              <a:rPr lang="en-US" sz="1200" b="0" i="0" u="none" strike="noStrike" kern="1200" dirty="0" smtClean="0">
+                <a:solidFill>
+                  <a:schemeClr val="tx1"/>
+                </a:solidFill>
+                <a:effectLst/>
+                <a:latin typeface="+mn-lt"/>
+                <a:ea typeface="+mn-ea"/>
+                <a:cs typeface="+mn-cs"/>
+              </a:rPr>
+              <a:t>4. Stop application</a:t>
+            </a:r>
+            <a:endParaRPr lang="en-US" b="0" dirty="0" smtClean="0">
+              <a:effectLst/>
+            </a:endParaRPr>
+          </a:p>
+          <a:p>
+            <a:pPr rtl="0"/>
+            <a:r>
+              <a:rPr lang="en-US" sz="1200" b="0" i="0" u="none" strike="noStrike" kern="1200" dirty="0" smtClean="0">
+                <a:solidFill>
+                  <a:schemeClr val="tx1"/>
+                </a:solidFill>
+                <a:effectLst/>
+                <a:latin typeface="+mn-lt"/>
+                <a:ea typeface="+mn-ea"/>
+                <a:cs typeface="+mn-cs"/>
+              </a:rPr>
+              <a:t>5. Google horse image and save it to d:\temp\photos</a:t>
+            </a:r>
+            <a:endParaRPr lang="en-US" b="0" dirty="0" smtClean="0">
+              <a:effectLst/>
+            </a:endParaRPr>
+          </a:p>
+          <a:p>
+            <a:pPr rtl="0"/>
+            <a:r>
+              <a:rPr lang="en-US" sz="1200" b="0" i="0" u="none" strike="noStrike" kern="1200" dirty="0" smtClean="0">
+                <a:solidFill>
+                  <a:schemeClr val="tx1"/>
+                </a:solidFill>
+                <a:effectLst/>
+                <a:latin typeface="+mn-lt"/>
+                <a:ea typeface="+mn-ea"/>
+                <a:cs typeface="+mn-cs"/>
+              </a:rPr>
+              <a:t>5. Start app and search for horse</a:t>
+            </a:r>
+            <a:endParaRPr lang="en-US" b="0" dirty="0" smtClean="0">
+              <a:effectLst/>
+            </a:endParaRPr>
+          </a:p>
+          <a:p>
+            <a:pPr rtl="0"/>
+            <a:r>
+              <a:rPr lang="en-US" sz="1200" b="0" i="0" u="none" strike="noStrike" kern="1200" dirty="0" smtClean="0">
+                <a:solidFill>
+                  <a:schemeClr val="tx1"/>
+                </a:solidFill>
+                <a:effectLst/>
+                <a:latin typeface="+mn-lt"/>
+                <a:ea typeface="+mn-ea"/>
+                <a:cs typeface="+mn-cs"/>
+              </a:rPr>
+              <a:t> </a:t>
+            </a:r>
+            <a:endParaRPr lang="en-US" b="0" dirty="0" smtClean="0">
+              <a:effectLst/>
+            </a:endParaRPr>
+          </a:p>
+          <a:p>
+            <a:r>
+              <a:rPr lang="en-US" b="0" dirty="0" smtClean="0">
+                <a:effectLst/>
+              </a:rPr>
+              <a:t/>
+            </a:r>
+            <a:br>
+              <a:rPr lang="en-US" b="0" dirty="0" smtClean="0">
+                <a:effectLst/>
+              </a:rPr>
+            </a:br>
+            <a:endParaRPr lang="en-US" b="0" dirty="0" smtClean="0">
+              <a:effectLst/>
+            </a:endParaRPr>
+          </a:p>
+        </p:txBody>
+      </p:sp>
+      <p:sp>
+        <p:nvSpPr>
+          <p:cNvPr id="4" name="Slide Number Placeholder 3"/>
+          <p:cNvSpPr>
+            <a:spLocks noGrp="1"/>
+          </p:cNvSpPr>
+          <p:nvPr>
+            <p:ph type="sldNum" sz="quarter" idx="10"/>
+          </p:nvPr>
+        </p:nvSpPr>
+        <p:spPr/>
+        <p:txBody>
+          <a:bodyPr/>
+          <a:lstStyle/>
+          <a:p>
+            <a:fld id="{55849CEA-452E-49F3-92ED-210B64DD3C6C}" type="slidenum">
+              <a:rPr lang="en-US" smtClean="0"/>
+              <a:t>28</a:t>
+            </a:fld>
+            <a:endParaRPr lang="en-US"/>
+          </a:p>
+        </p:txBody>
+      </p:sp>
+    </p:spTree>
+    <p:extLst>
+      <p:ext uri="{BB962C8B-B14F-4D97-AF65-F5344CB8AC3E}">
+        <p14:creationId xmlns:p14="http://schemas.microsoft.com/office/powerpoint/2010/main" val="2097501140"/>
+      </p:ext>
+    </p:extLst>
+  </p:cSld>
+  <p:clrMapOvr>
+    <a:masterClrMapping/>
+  </p:clrMapOvr>
+</p:notes>
+</file>
+
 <file path=ppt/notesSlides/notesSlide2.xml><?xml version="1.0" encoding="utf-8"?>
 <p:notes xmlns:a="http://schemas.openxmlformats.org/drawingml/2006/main" xmlns:r="http://schemas.openxmlformats.org/officeDocument/2006/relationships" xmlns:p="http://schemas.openxmlformats.org/presentationml/2006/main">
   <p:cSld>
@@ -7983,330 +8485,22 @@
           <a:bodyPr/>
           <a:lstStyle/>
           <a:p>
-            <a:pPr rtl="0"/>
-            <a:r>
-              <a:rPr lang="en-US" sz="1200" b="0" i="0" u="none" strike="noStrike" kern="1200" dirty="0" smtClean="0">
-                <a:solidFill>
-                  <a:schemeClr val="tx1"/>
-                </a:solidFill>
-                <a:effectLst/>
-                <a:latin typeface="+mn-lt"/>
-                <a:ea typeface="+mn-ea"/>
-                <a:cs typeface="+mn-cs"/>
-              </a:rPr>
-              <a:t>We are going to have a Photo-Search application. </a:t>
-            </a:r>
-            <a:endParaRPr lang="en-US" b="0" dirty="0" smtClean="0">
-              <a:effectLst/>
-            </a:endParaRPr>
-          </a:p>
-          <a:p>
-            <a:pPr rtl="0"/>
-            <a:r>
-              <a:rPr lang="en-US" sz="1200" b="0" i="0" u="none" strike="noStrike" kern="1200" dirty="0" smtClean="0">
-                <a:solidFill>
-                  <a:schemeClr val="tx1"/>
-                </a:solidFill>
-                <a:effectLst/>
-                <a:latin typeface="+mn-lt"/>
-                <a:ea typeface="+mn-ea"/>
-                <a:cs typeface="+mn-cs"/>
-              </a:rPr>
-              <a:t>It takes a model developed using </a:t>
-            </a:r>
-            <a:r>
-              <a:rPr lang="en-US" sz="1200" b="0" i="0" u="none" strike="noStrike" kern="1200" dirty="0" err="1" smtClean="0">
-                <a:solidFill>
-                  <a:schemeClr val="tx1"/>
-                </a:solidFill>
-                <a:effectLst/>
-                <a:latin typeface="+mn-lt"/>
-                <a:ea typeface="+mn-ea"/>
-                <a:cs typeface="+mn-cs"/>
-              </a:rPr>
-              <a:t>Keras</a:t>
-            </a:r>
-            <a:r>
-              <a:rPr lang="en-US" sz="1200" b="0" i="0" u="none" strike="noStrike" kern="1200" dirty="0" smtClean="0">
-                <a:solidFill>
-                  <a:schemeClr val="tx1"/>
-                </a:solidFill>
-                <a:effectLst/>
-                <a:latin typeface="+mn-lt"/>
-                <a:ea typeface="+mn-ea"/>
-                <a:cs typeface="+mn-cs"/>
-              </a:rPr>
-              <a:t> and converted to ONNX format</a:t>
-            </a:r>
-            <a:endParaRPr lang="en-US" b="0" dirty="0" smtClean="0">
-              <a:effectLst/>
-            </a:endParaRPr>
-          </a:p>
-          <a:p>
-            <a:pPr rtl="0"/>
-            <a:r>
-              <a:rPr lang="en-US" b="0" dirty="0" smtClean="0">
-                <a:effectLst/>
-              </a:rPr>
-              <a:t/>
-            </a:r>
-            <a:br>
-              <a:rPr lang="en-US" b="0" dirty="0" smtClean="0">
-                <a:effectLst/>
-              </a:rPr>
-            </a:br>
-            <a:r>
-              <a:rPr lang="en-US" sz="1200" b="0" i="0" u="none" strike="noStrike" kern="1200" dirty="0" smtClean="0">
-                <a:solidFill>
-                  <a:schemeClr val="tx1"/>
-                </a:solidFill>
-                <a:effectLst/>
-                <a:latin typeface="+mn-lt"/>
-                <a:ea typeface="+mn-ea"/>
-                <a:cs typeface="+mn-cs"/>
-              </a:rPr>
-              <a:t>Display </a:t>
-            </a:r>
-            <a:r>
-              <a:rPr lang="en-US" sz="1200" b="0" i="0" u="none" strike="noStrike" kern="1200" dirty="0" err="1" smtClean="0">
-                <a:solidFill>
-                  <a:schemeClr val="tx1"/>
-                </a:solidFill>
-                <a:effectLst/>
-                <a:latin typeface="+mn-lt"/>
-                <a:ea typeface="+mn-ea"/>
-                <a:cs typeface="+mn-cs"/>
-              </a:rPr>
-              <a:t>onnx</a:t>
-            </a:r>
-            <a:r>
-              <a:rPr lang="en-US" sz="1200" b="0" i="0" u="none" strike="noStrike" kern="1200" dirty="0" smtClean="0">
-                <a:solidFill>
-                  <a:schemeClr val="tx1"/>
-                </a:solidFill>
-                <a:effectLst/>
-                <a:latin typeface="+mn-lt"/>
-                <a:ea typeface="+mn-ea"/>
-                <a:cs typeface="+mn-cs"/>
-              </a:rPr>
-              <a:t> file in NETRON located at D:\Praveen\Personal\Technical\AI_ML\ML.Net\Meetup 29 June 2019\Demo\</a:t>
-            </a:r>
-            <a:r>
-              <a:rPr lang="en-US" sz="1200" b="0" i="0" u="none" strike="noStrike" kern="1200" dirty="0" err="1" smtClean="0">
-                <a:solidFill>
-                  <a:schemeClr val="tx1"/>
-                </a:solidFill>
-                <a:effectLst/>
-                <a:latin typeface="+mn-lt"/>
-                <a:ea typeface="+mn-ea"/>
-                <a:cs typeface="+mn-cs"/>
-              </a:rPr>
-              <a:t>MLDemoMeetup</a:t>
-            </a:r>
-            <a:r>
-              <a:rPr lang="en-US" sz="1200" b="0" i="0" u="none" strike="noStrike" kern="1200" dirty="0" smtClean="0">
-                <a:solidFill>
-                  <a:schemeClr val="tx1"/>
-                </a:solidFill>
-                <a:effectLst/>
-                <a:latin typeface="+mn-lt"/>
-                <a:ea typeface="+mn-ea"/>
-                <a:cs typeface="+mn-cs"/>
-              </a:rPr>
-              <a:t>\</a:t>
-            </a:r>
-            <a:r>
-              <a:rPr lang="en-US" sz="1200" b="0" i="0" u="none" strike="noStrike" kern="1200" dirty="0" err="1" smtClean="0">
-                <a:solidFill>
-                  <a:schemeClr val="tx1"/>
-                </a:solidFill>
-                <a:effectLst/>
-                <a:latin typeface="+mn-lt"/>
-                <a:ea typeface="+mn-ea"/>
-                <a:cs typeface="+mn-cs"/>
-              </a:rPr>
-              <a:t>PhotoSearchDemo</a:t>
-            </a:r>
-            <a:r>
-              <a:rPr lang="en-US" sz="1200" b="0" i="0" u="none" strike="noStrike" kern="1200" dirty="0" smtClean="0">
-                <a:solidFill>
-                  <a:schemeClr val="tx1"/>
-                </a:solidFill>
-                <a:effectLst/>
-                <a:latin typeface="+mn-lt"/>
-                <a:ea typeface="+mn-ea"/>
-                <a:cs typeface="+mn-cs"/>
-              </a:rPr>
-              <a:t>\PhotoSearchNetCore3\</a:t>
-            </a:r>
-            <a:r>
-              <a:rPr lang="en-US" sz="1200" b="0" i="0" u="none" strike="noStrike" kern="1200" dirty="0" err="1" smtClean="0">
-                <a:solidFill>
-                  <a:schemeClr val="tx1"/>
-                </a:solidFill>
-                <a:effectLst/>
-                <a:latin typeface="+mn-lt"/>
-                <a:ea typeface="+mn-ea"/>
-                <a:cs typeface="+mn-cs"/>
-              </a:rPr>
-              <a:t>model.onnx</a:t>
-            </a:r>
-            <a:endParaRPr lang="en-US" b="0" dirty="0" smtClean="0">
-              <a:effectLst/>
-            </a:endParaRPr>
-          </a:p>
-          <a:p>
-            <a:pPr rtl="0"/>
-            <a:r>
-              <a:rPr lang="en-US" b="0" dirty="0" smtClean="0">
-                <a:effectLst/>
-              </a:rPr>
-              <a:t/>
-            </a:r>
-            <a:br>
-              <a:rPr lang="en-US" b="0" dirty="0" smtClean="0">
-                <a:effectLst/>
-              </a:rPr>
-            </a:br>
-            <a:r>
-              <a:rPr lang="en-US" sz="1200" b="0" i="0" u="none" strike="noStrike" kern="1200" dirty="0" smtClean="0">
-                <a:solidFill>
-                  <a:schemeClr val="tx1"/>
-                </a:solidFill>
-                <a:effectLst/>
-                <a:latin typeface="+mn-lt"/>
-                <a:ea typeface="+mn-ea"/>
-                <a:cs typeface="+mn-cs"/>
-              </a:rPr>
-              <a:t>1. Run PhotoSearchNetCore3 project </a:t>
-            </a:r>
-            <a:endParaRPr lang="en-US" b="0" dirty="0" smtClean="0">
-              <a:effectLst/>
-            </a:endParaRPr>
-          </a:p>
-          <a:p>
-            <a:pPr rtl="0"/>
-            <a:r>
-              <a:rPr lang="en-US" sz="1200" b="0" i="0" u="none" strike="noStrike" kern="1200" dirty="0" smtClean="0">
-                <a:solidFill>
-                  <a:schemeClr val="tx1"/>
-                </a:solidFill>
-                <a:effectLst/>
-                <a:latin typeface="+mn-lt"/>
-                <a:ea typeface="+mn-ea"/>
-                <a:cs typeface="+mn-cs"/>
-              </a:rPr>
-              <a:t>2. Select ALL and click Search : Display all items within folder</a:t>
-            </a:r>
-            <a:endParaRPr lang="en-US" b="0" dirty="0" smtClean="0">
-              <a:effectLst/>
-            </a:endParaRPr>
-          </a:p>
-          <a:p>
-            <a:pPr rtl="0"/>
-            <a:r>
-              <a:rPr lang="en-US" sz="1200" b="0" i="0" u="none" strike="noStrike" kern="1200" dirty="0" smtClean="0">
-                <a:solidFill>
-                  <a:schemeClr val="tx1"/>
-                </a:solidFill>
-                <a:effectLst/>
-                <a:latin typeface="+mn-lt"/>
-                <a:ea typeface="+mn-ea"/>
-                <a:cs typeface="+mn-cs"/>
-              </a:rPr>
-              <a:t>3. Select Cat and select items</a:t>
-            </a:r>
-            <a:endParaRPr lang="en-US" b="0" dirty="0" smtClean="0">
-              <a:effectLst/>
-            </a:endParaRPr>
-          </a:p>
-          <a:p>
-            <a:pPr rtl="0"/>
-            <a:r>
-              <a:rPr lang="en-US" sz="1200" b="0" i="0" u="none" strike="noStrike" kern="1200" dirty="0" smtClean="0">
-                <a:solidFill>
-                  <a:schemeClr val="tx1"/>
-                </a:solidFill>
-                <a:effectLst/>
-                <a:latin typeface="+mn-lt"/>
-                <a:ea typeface="+mn-ea"/>
-                <a:cs typeface="+mn-cs"/>
-              </a:rPr>
-              <a:t>4. Stop application</a:t>
-            </a:r>
-            <a:endParaRPr lang="en-US" b="0" dirty="0" smtClean="0">
-              <a:effectLst/>
-            </a:endParaRPr>
-          </a:p>
-          <a:p>
-            <a:pPr rtl="0"/>
-            <a:r>
-              <a:rPr lang="en-US" sz="1200" b="0" i="0" u="none" strike="noStrike" kern="1200" dirty="0" smtClean="0">
-                <a:solidFill>
-                  <a:schemeClr val="tx1"/>
-                </a:solidFill>
-                <a:effectLst/>
-                <a:latin typeface="+mn-lt"/>
-                <a:ea typeface="+mn-ea"/>
-                <a:cs typeface="+mn-cs"/>
-              </a:rPr>
-              <a:t>5. Google horse image and save it to d:\temp\photos</a:t>
-            </a:r>
-            <a:endParaRPr lang="en-US" b="0" dirty="0" smtClean="0">
-              <a:effectLst/>
-            </a:endParaRPr>
-          </a:p>
-          <a:p>
-            <a:pPr rtl="0"/>
-            <a:r>
-              <a:rPr lang="en-US" sz="1200" b="0" i="0" u="none" strike="noStrike" kern="1200" dirty="0" smtClean="0">
-                <a:solidFill>
-                  <a:schemeClr val="tx1"/>
-                </a:solidFill>
-                <a:effectLst/>
-                <a:latin typeface="+mn-lt"/>
-                <a:ea typeface="+mn-ea"/>
-                <a:cs typeface="+mn-cs"/>
-              </a:rPr>
-              <a:t>5. Start app and search for horse</a:t>
-            </a:r>
-            <a:endParaRPr lang="en-US" b="0" dirty="0" smtClean="0">
-              <a:effectLst/>
-            </a:endParaRPr>
-          </a:p>
-          <a:p>
-            <a:pPr rtl="0"/>
-            <a:r>
-              <a:rPr lang="en-US" sz="1200" b="0" i="0" u="none" strike="noStrike" kern="1200" dirty="0" smtClean="0">
-                <a:solidFill>
-                  <a:schemeClr val="tx1"/>
-                </a:solidFill>
-                <a:effectLst/>
-                <a:latin typeface="+mn-lt"/>
-                <a:ea typeface="+mn-ea"/>
-                <a:cs typeface="+mn-cs"/>
-              </a:rPr>
-              <a:t> </a:t>
-            </a:r>
-            <a:endParaRPr lang="en-US" b="0" dirty="0" smtClean="0">
-              <a:effectLst/>
-            </a:endParaRPr>
-          </a:p>
-          <a:p>
-            <a:r>
-              <a:rPr lang="en-US" b="0" dirty="0" smtClean="0">
-                <a:effectLst/>
-              </a:rPr>
-              <a:t/>
-            </a:r>
-            <a:br>
-              <a:rPr lang="en-US" b="0" dirty="0" smtClean="0">
-                <a:effectLst/>
-              </a:rPr>
-            </a:br>
-            <a:endParaRPr lang="en-US" b="0" dirty="0" smtClean="0">
-              <a:effectLst/>
-            </a:endParaRPr>
+            <a:r>
+              <a:rPr lang="en-US" dirty="0" smtClean="0"/>
+              <a:t>1. One-hot encoding : Sex </a:t>
+            </a:r>
+            <a:r>
+              <a:rPr lang="en-US" dirty="0" err="1" smtClean="0"/>
+              <a:t>colum</a:t>
+            </a:r>
+            <a:endParaRPr lang="en-US" dirty="0" smtClean="0"/>
+          </a:p>
+          <a:p>
+            <a:r>
+              <a:rPr lang="en-US" dirty="0" smtClean="0"/>
+              <a:t>2. Missing or wrong values : Average/Mean</a:t>
+            </a:r>
+            <a:endParaRPr lang="en-US" dirty="0"/>
           </a:p>
         </p:txBody>
       </p:sp>
@@ -8336,7 +8530,475 @@
     </p:spTree>
     <p:extLst>
       <p:ext uri="{BB962C8B-B14F-4D97-AF65-F5344CB8AC3E}">
-        <p14:creationId xmlns:p14="http://schemas.microsoft.com/office/powerpoint/2010/main" val="2097501140"/>
+        <p14:creationId xmlns:p14="http://schemas.microsoft.com/office/powerpoint/2010/main" val="2769389728"/>
+      </p:ext>
+    </p:extLst>
+  </p:cSld>
+  <p:clrMapOvr>
+    <a:masterClrMapping/>
+  </p:clrMapOvr>
+</p:notes>
+</file>
+
+<file path=ppt/notesSlides/notesSlide5.xml><?xml version="1.0" encoding="utf-8"?>
+<p:notes xmlns:a="http://schemas.openxmlformats.org/drawingml/2006/main" xmlns:r="http://schemas.openxmlformats.org/officeDocument/2006/relationships" xmlns:p="http://schemas.openxmlformats.org/presentationml/2006/main">
+  <p:cSld>
+    <p:spTree>
+      <p:nvGrpSpPr>
+        <p:cNvPr id="1" name=""/>
+        <p:cNvGrpSpPr/>
+        <p:nvPr/>
+      </p:nvGrpSpPr>
+      <p:grpSpPr>
+        <a:xfrm>
+          <a:off x="0" y="0"/>
+          <a:ext cx="0" cy="0"/>
+          <a:chOff x="0" y="0"/>
+          <a:chExt cx="0" cy="0"/>
+        </a:xfrm>
+      </p:grpSpPr>
+      <p:sp>
+        <p:nvSpPr>
+          <p:cNvPr id="2" name="Slide Image Placeholder 1"/>
+          <p:cNvSpPr>
+            <a:spLocks noGrp="1" noRot="1" noChangeAspect="1"/>
+          </p:cNvSpPr>
+          <p:nvPr>
+            <p:ph type="sldImg"/>
+          </p:nvPr>
+        </p:nvSpPr>
+        <p:spPr/>
+      </p:sp>
+      <p:sp>
+        <p:nvSpPr>
+          <p:cNvPr id="3" name="Notes Placeholder 2"/>
+          <p:cNvSpPr>
+            <a:spLocks noGrp="1"/>
+          </p:cNvSpPr>
+          <p:nvPr>
+            <p:ph type="body" idx="1"/>
+          </p:nvPr>
+        </p:nvSpPr>
+        <p:spPr/>
+        <p:txBody>
+          <a:bodyPr/>
+          <a:lstStyle/>
+          <a:p>
+            <a:r>
+              <a:rPr lang="en-US" dirty="0" smtClean="0"/>
+              <a:t>1. One-hot encoding : Sex </a:t>
+            </a:r>
+            <a:r>
+              <a:rPr lang="en-US" dirty="0" err="1" smtClean="0"/>
+              <a:t>colum</a:t>
+            </a:r>
+            <a:endParaRPr lang="en-US" dirty="0" smtClean="0"/>
+          </a:p>
+          <a:p>
+            <a:r>
+              <a:rPr lang="en-US" dirty="0" smtClean="0"/>
+              <a:t>2. Missing or wrong values : Average/Mean</a:t>
+            </a:r>
+            <a:endParaRPr lang="en-US" dirty="0"/>
+          </a:p>
+        </p:txBody>
+      </p:sp>
+      <p:sp>
+        <p:nvSpPr>
+          <p:cNvPr id="4" name="Slide Number Placeholder 3"/>
+          <p:cNvSpPr>
+            <a:spLocks noGrp="1"/>
+          </p:cNvSpPr>
+          <p:nvPr>
+            <p:ph type="sldNum" sz="quarter" idx="10"/>
+          </p:nvPr>
+        </p:nvSpPr>
+        <p:spPr/>
+        <p:txBody>
+          <a:bodyPr/>
+          <a:lstStyle/>
+          <a:p>
+            <a:fld id="{55849CEA-452E-49F3-92ED-210B64DD3C6C}" type="slidenum">
+              <a:rPr lang="en-US" smtClean="0"/>
+              <a:t>22</a:t>
+            </a:fld>
+            <a:endParaRPr lang="en-US"/>
+          </a:p>
+        </p:txBody>
+      </p:sp>
+    </p:spTree>
+    <p:extLst>
+      <p:ext uri="{BB962C8B-B14F-4D97-AF65-F5344CB8AC3E}">
+        <p14:creationId xmlns:p14="http://schemas.microsoft.com/office/powerpoint/2010/main" val="74304540"/>
+      </p:ext>
+    </p:extLst>
+  </p:cSld>
+  <p:clrMapOvr>
+    <a:masterClrMapping/>
+  </p:clrMapOvr>
+</p:notes>
+</file>
+
+<file path=ppt/notesSlides/notesSlide6.xml><?xml version="1.0" encoding="utf-8"?>
+<p:notes xmlns:a="http://schemas.openxmlformats.org/drawingml/2006/main" xmlns:r="http://schemas.openxmlformats.org/officeDocument/2006/relationships" xmlns:p="http://schemas.openxmlformats.org/presentationml/2006/main">
+  <p:cSld>
+    <p:spTree>
+      <p:nvGrpSpPr>
+        <p:cNvPr id="1" name=""/>
+        <p:cNvGrpSpPr/>
+        <p:nvPr/>
+      </p:nvGrpSpPr>
+      <p:grpSpPr>
+        <a:xfrm>
+          <a:off x="0" y="0"/>
+          <a:ext cx="0" cy="0"/>
+          <a:chOff x="0" y="0"/>
+          <a:chExt cx="0" cy="0"/>
+        </a:xfrm>
+      </p:grpSpPr>
+      <p:sp>
+        <p:nvSpPr>
+          <p:cNvPr id="2" name="Slide Image Placeholder 1"/>
+          <p:cNvSpPr>
+            <a:spLocks noGrp="1" noRot="1" noChangeAspect="1"/>
+          </p:cNvSpPr>
+          <p:nvPr>
+            <p:ph type="sldImg"/>
+          </p:nvPr>
+        </p:nvSpPr>
+        <p:spPr/>
+      </p:sp>
+      <p:sp>
+        <p:nvSpPr>
+          <p:cNvPr id="3" name="Notes Placeholder 2"/>
+          <p:cNvSpPr>
+            <a:spLocks noGrp="1"/>
+          </p:cNvSpPr>
+          <p:nvPr>
+            <p:ph type="body" idx="1"/>
+          </p:nvPr>
+        </p:nvSpPr>
+        <p:spPr/>
+        <p:txBody>
+          <a:bodyPr/>
+          <a:lstStyle/>
+          <a:p>
+            <a:r>
+              <a:rPr lang="en-US" dirty="0" smtClean="0"/>
+              <a:t>1. One-hot encoding : Sex </a:t>
+            </a:r>
+            <a:r>
+              <a:rPr lang="en-US" dirty="0" err="1" smtClean="0"/>
+              <a:t>colum</a:t>
+            </a:r>
+            <a:endParaRPr lang="en-US" dirty="0" smtClean="0"/>
+          </a:p>
+          <a:p>
+            <a:r>
+              <a:rPr lang="en-US" dirty="0" smtClean="0"/>
+              <a:t>2. Missing or wrong values : Average/Mean</a:t>
+            </a:r>
+            <a:endParaRPr lang="en-US" dirty="0"/>
+          </a:p>
+        </p:txBody>
+      </p:sp>
+      <p:sp>
+        <p:nvSpPr>
+          <p:cNvPr id="4" name="Slide Number Placeholder 3"/>
+          <p:cNvSpPr>
+            <a:spLocks noGrp="1"/>
+          </p:cNvSpPr>
+          <p:nvPr>
+            <p:ph type="sldNum" sz="quarter" idx="10"/>
+          </p:nvPr>
+        </p:nvSpPr>
+        <p:spPr/>
+        <p:txBody>
+          <a:bodyPr/>
+          <a:lstStyle/>
+          <a:p>
+            <a:fld id="{55849CEA-452E-49F3-92ED-210B64DD3C6C}" type="slidenum">
+              <a:rPr lang="en-US" smtClean="0"/>
+              <a:t>23</a:t>
+            </a:fld>
+            <a:endParaRPr lang="en-US"/>
+          </a:p>
+        </p:txBody>
+      </p:sp>
+    </p:spTree>
+    <p:extLst>
+      <p:ext uri="{BB962C8B-B14F-4D97-AF65-F5344CB8AC3E}">
+        <p14:creationId xmlns:p14="http://schemas.microsoft.com/office/powerpoint/2010/main" val="2114391985"/>
+      </p:ext>
+    </p:extLst>
+  </p:cSld>
+  <p:clrMapOvr>
+    <a:masterClrMapping/>
+  </p:clrMapOvr>
+</p:notes>
+</file>
+
+<file path=ppt/notesSlides/notesSlide7.xml><?xml version="1.0" encoding="utf-8"?>
+<p:notes xmlns:a="http://schemas.openxmlformats.org/drawingml/2006/main" xmlns:r="http://schemas.openxmlformats.org/officeDocument/2006/relationships" xmlns:p="http://schemas.openxmlformats.org/presentationml/2006/main">
+  <p:cSld>
+    <p:spTree>
+      <p:nvGrpSpPr>
+        <p:cNvPr id="1" name=""/>
+        <p:cNvGrpSpPr/>
+        <p:nvPr/>
+      </p:nvGrpSpPr>
+      <p:grpSpPr>
+        <a:xfrm>
+          <a:off x="0" y="0"/>
+          <a:ext cx="0" cy="0"/>
+          <a:chOff x="0" y="0"/>
+          <a:chExt cx="0" cy="0"/>
+        </a:xfrm>
+      </p:grpSpPr>
+      <p:sp>
+        <p:nvSpPr>
+          <p:cNvPr id="2" name="Slide Image Placeholder 1"/>
+          <p:cNvSpPr>
+            <a:spLocks noGrp="1" noRot="1" noChangeAspect="1"/>
+          </p:cNvSpPr>
+          <p:nvPr>
+            <p:ph type="sldImg"/>
+          </p:nvPr>
+        </p:nvSpPr>
+        <p:spPr/>
+      </p:sp>
+      <p:sp>
+        <p:nvSpPr>
+          <p:cNvPr id="3" name="Notes Placeholder 2"/>
+          <p:cNvSpPr>
+            <a:spLocks noGrp="1"/>
+          </p:cNvSpPr>
+          <p:nvPr>
+            <p:ph type="body" idx="1"/>
+          </p:nvPr>
+        </p:nvSpPr>
+        <p:spPr/>
+        <p:txBody>
+          <a:bodyPr/>
+          <a:lstStyle/>
+          <a:p>
+            <a:r>
+              <a:rPr lang="en-US" dirty="0" smtClean="0"/>
+              <a:t>1. Choose algorithm : Binary classification </a:t>
+            </a:r>
+            <a:endParaRPr lang="en-US" dirty="0"/>
+          </a:p>
+        </p:txBody>
+      </p:sp>
+      <p:sp>
+        <p:nvSpPr>
+          <p:cNvPr id="4" name="Slide Number Placeholder 3"/>
+          <p:cNvSpPr>
+            <a:spLocks noGrp="1"/>
+          </p:cNvSpPr>
+          <p:nvPr>
+            <p:ph type="sldNum" sz="quarter" idx="10"/>
+          </p:nvPr>
+        </p:nvSpPr>
+        <p:spPr/>
+        <p:txBody>
+          <a:bodyPr/>
+          <a:lstStyle/>
+          <a:p>
+            <a:fld id="{55849CEA-452E-49F3-92ED-210B64DD3C6C}" type="slidenum">
+              <a:rPr lang="en-US" smtClean="0"/>
+              <a:t>24</a:t>
+            </a:fld>
+            <a:endParaRPr lang="en-US"/>
+          </a:p>
+        </p:txBody>
+      </p:sp>
+    </p:spTree>
+    <p:extLst>
+      <p:ext uri="{BB962C8B-B14F-4D97-AF65-F5344CB8AC3E}">
+        <p14:creationId xmlns:p14="http://schemas.microsoft.com/office/powerpoint/2010/main" val="3363331460"/>
+      </p:ext>
+    </p:extLst>
+  </p:cSld>
+  <p:clrMapOvr>
+    <a:masterClrMapping/>
+  </p:clrMapOvr>
+</p:notes>
+</file>
+
+<file path=ppt/notesSlides/notesSlide8.xml><?xml version="1.0" encoding="utf-8"?>
+<p:notes xmlns:a="http://schemas.openxmlformats.org/drawingml/2006/main" xmlns:r="http://schemas.openxmlformats.org/officeDocument/2006/relationships" xmlns:p="http://schemas.openxmlformats.org/presentationml/2006/main">
+  <p:cSld>
+    <p:spTree>
+      <p:nvGrpSpPr>
+        <p:cNvPr id="1" name=""/>
+        <p:cNvGrpSpPr/>
+        <p:nvPr/>
+      </p:nvGrpSpPr>
+      <p:grpSpPr>
+        <a:xfrm>
+          <a:off x="0" y="0"/>
+          <a:ext cx="0" cy="0"/>
+          <a:chOff x="0" y="0"/>
+          <a:chExt cx="0" cy="0"/>
+        </a:xfrm>
+      </p:grpSpPr>
+      <p:sp>
+        <p:nvSpPr>
+          <p:cNvPr id="2" name="Slide Image Placeholder 1"/>
+          <p:cNvSpPr>
+            <a:spLocks noGrp="1" noRot="1" noChangeAspect="1"/>
+          </p:cNvSpPr>
+          <p:nvPr>
+            <p:ph type="sldImg"/>
+          </p:nvPr>
+        </p:nvSpPr>
+        <p:spPr/>
+      </p:sp>
+      <p:sp>
+        <p:nvSpPr>
+          <p:cNvPr id="3" name="Notes Placeholder 2"/>
+          <p:cNvSpPr>
+            <a:spLocks noGrp="1"/>
+          </p:cNvSpPr>
+          <p:nvPr>
+            <p:ph type="body" idx="1"/>
+          </p:nvPr>
+        </p:nvSpPr>
+        <p:spPr/>
+        <p:txBody>
+          <a:bodyPr/>
+          <a:lstStyle/>
+          <a:p>
+            <a:r>
+              <a:rPr lang="en-US" dirty="0" smtClean="0"/>
+              <a:t>1. Evaluate on Test</a:t>
+            </a:r>
+            <a:r>
+              <a:rPr lang="en-US" baseline="0" dirty="0" smtClean="0"/>
+              <a:t> data</a:t>
+            </a:r>
+          </a:p>
+          <a:p>
+            <a:endParaRPr lang="en-US" dirty="0"/>
+          </a:p>
+        </p:txBody>
+      </p:sp>
+      <p:sp>
+        <p:nvSpPr>
+          <p:cNvPr id="4" name="Slide Number Placeholder 3"/>
+          <p:cNvSpPr>
+            <a:spLocks noGrp="1"/>
+          </p:cNvSpPr>
+          <p:nvPr>
+            <p:ph type="sldNum" sz="quarter" idx="10"/>
+          </p:nvPr>
+        </p:nvSpPr>
+        <p:spPr/>
+        <p:txBody>
+          <a:bodyPr/>
+          <a:lstStyle/>
+          <a:p>
+            <a:fld id="{55849CEA-452E-49F3-92ED-210B64DD3C6C}" type="slidenum">
+              <a:rPr lang="en-US" smtClean="0"/>
+              <a:t>25</a:t>
+            </a:fld>
+            <a:endParaRPr lang="en-US"/>
+          </a:p>
+        </p:txBody>
+      </p:sp>
+    </p:spTree>
+    <p:extLst>
+      <p:ext uri="{BB962C8B-B14F-4D97-AF65-F5344CB8AC3E}">
+        <p14:creationId xmlns:p14="http://schemas.microsoft.com/office/powerpoint/2010/main" val="1699759432"/>
+      </p:ext>
+    </p:extLst>
+  </p:cSld>
+  <p:clrMapOvr>
+    <a:masterClrMapping/>
+  </p:clrMapOvr>
+</p:notes>
+</file>
+
+<file path=ppt/notesSlides/notesSlide9.xml><?xml version="1.0" encoding="utf-8"?>
+<p:notes xmlns:a="http://schemas.openxmlformats.org/drawingml/2006/main" xmlns:r="http://schemas.openxmlformats.org/officeDocument/2006/relationships" xmlns:p="http://schemas.openxmlformats.org/presentationml/2006/main">
+  <p:cSld>
+    <p:spTree>
+      <p:nvGrpSpPr>
+        <p:cNvPr id="1" name=""/>
+        <p:cNvGrpSpPr/>
+        <p:nvPr/>
+      </p:nvGrpSpPr>
+      <p:grpSpPr>
+        <a:xfrm>
+          <a:off x="0" y="0"/>
+          <a:ext cx="0" cy="0"/>
+          <a:chOff x="0" y="0"/>
+          <a:chExt cx="0" cy="0"/>
+        </a:xfrm>
+      </p:grpSpPr>
+      <p:sp>
+        <p:nvSpPr>
+          <p:cNvPr id="2" name="Slide Image Placeholder 1"/>
+          <p:cNvSpPr>
+            <a:spLocks noGrp="1" noRot="1" noChangeAspect="1"/>
+          </p:cNvSpPr>
+          <p:nvPr>
+            <p:ph type="sldImg"/>
+          </p:nvPr>
+        </p:nvSpPr>
+        <p:spPr/>
+      </p:sp>
+      <p:sp>
+        <p:nvSpPr>
+          <p:cNvPr id="3" name="Notes Placeholder 2"/>
+          <p:cNvSpPr>
+            <a:spLocks noGrp="1"/>
+          </p:cNvSpPr>
+          <p:nvPr>
+            <p:ph type="body" idx="1"/>
+          </p:nvPr>
+        </p:nvSpPr>
+        <p:spPr/>
+        <p:txBody>
+          <a:bodyPr/>
+          <a:lstStyle/>
+          <a:p>
+            <a:r>
+              <a:rPr lang="en-US" dirty="0" smtClean="0"/>
+              <a:t>1. Choose algorithm : Binary classification </a:t>
+            </a:r>
+            <a:endParaRPr lang="en-US" dirty="0"/>
+          </a:p>
+        </p:txBody>
+      </p:sp>
+      <p:sp>
+        <p:nvSpPr>
+          <p:cNvPr id="4" name="Slide Number Placeholder 3"/>
+          <p:cNvSpPr>
+            <a:spLocks noGrp="1"/>
+          </p:cNvSpPr>
+          <p:nvPr>
+            <p:ph type="sldNum" sz="quarter" idx="10"/>
+          </p:nvPr>
+        </p:nvSpPr>
+        <p:spPr/>
+        <p:txBody>
+          <a:bodyPr/>
+          <a:lstStyle/>
+          <a:p>
+            <a:fld id="{55849CEA-452E-49F3-92ED-210B64DD3C6C}" type="slidenum">
+              <a:rPr lang="en-US" smtClean="0"/>
+              <a:t>26</a:t>
+            </a:fld>
+            <a:endParaRPr lang="en-US"/>
+          </a:p>
+        </p:txBody>
+      </p:sp>
+    </p:spTree>
+    <p:extLst>
+      <p:ext uri="{BB962C8B-B14F-4D97-AF65-F5344CB8AC3E}">
+        <p14:creationId xmlns:p14="http://schemas.microsoft.com/office/powerpoint/2010/main" val="1656176896"/>
       </p:ext>
     </p:extLst>
   </p:cSld>
@@ -13964,6 +14626,790 @@
             <p:ph type="title"/>
           </p:nvPr>
         </p:nvSpPr>
+        <p:spPr/>
+        <p:txBody>
+          <a:bodyPr/>
+          <a:lstStyle/>
+          <a:p>
+            <a:r>
+              <a:rPr lang="en-US" dirty="0" smtClean="0"/>
+              <a:t>Titanic Data</a:t>
+            </a:r>
+            <a:endParaRPr lang="en-US" dirty="0"/>
+          </a:p>
+        </p:txBody>
+      </p:sp>
+      <p:pic>
+        <p:nvPicPr>
+          <p:cNvPr id="8" name="Picture 7"/>
+          <p:cNvPicPr>
+            <a:picLocks noChangeAspect="1"/>
+          </p:cNvPicPr>
+          <p:nvPr/>
+        </p:nvPicPr>
+        <p:blipFill>
+          <a:blip r:embed="rId3"/>
+          <a:stretch>
+            <a:fillRect/>
+          </a:stretch>
+        </p:blipFill>
+        <p:spPr>
+          <a:xfrm>
+            <a:off x="195072" y="2229666"/>
+            <a:ext cx="11862816" cy="3366946"/>
+          </a:xfrm>
+          <a:prstGeom prst="rect">
+            <a:avLst/>
+          </a:prstGeom>
+        </p:spPr>
+      </p:pic>
+    </p:spTree>
+    <p:extLst>
+      <p:ext uri="{BB962C8B-B14F-4D97-AF65-F5344CB8AC3E}">
+        <p14:creationId xmlns:p14="http://schemas.microsoft.com/office/powerpoint/2010/main" val="4049860910"/>
+      </p:ext>
+    </p:extLst>
+  </p:cSld>
+  <p:clrMapOvr>
+    <a:masterClrMapping/>
+  </p:clrMapOvr>
+</p:sld>
+</file>
+
+<file path=ppt/slides/slide22.xml><?xml version="1.0" encoding="utf-8"?>
+<p:sld xmlns:a="http://schemas.openxmlformats.org/drawingml/2006/main" xmlns:r="http://schemas.openxmlformats.org/officeDocument/2006/relationships" xmlns:p="http://schemas.openxmlformats.org/presentationml/2006/main">
+  <p:cSld>
+    <p:spTree>
+      <p:nvGrpSpPr>
+        <p:cNvPr id="1" name=""/>
+        <p:cNvGrpSpPr/>
+        <p:nvPr/>
+      </p:nvGrpSpPr>
+      <p:grpSpPr>
+        <a:xfrm>
+          <a:off x="0" y="0"/>
+          <a:ext cx="0" cy="0"/>
+          <a:chOff x="0" y="0"/>
+          <a:chExt cx="0" cy="0"/>
+        </a:xfrm>
+      </p:grpSpPr>
+      <p:sp>
+        <p:nvSpPr>
+          <p:cNvPr id="2" name="Title 1"/>
+          <p:cNvSpPr>
+            <a:spLocks noGrp="1"/>
+          </p:cNvSpPr>
+          <p:nvPr>
+            <p:ph type="title"/>
+          </p:nvPr>
+        </p:nvSpPr>
+        <p:spPr/>
+        <p:txBody>
+          <a:bodyPr/>
+          <a:lstStyle/>
+          <a:p>
+            <a:r>
+              <a:rPr lang="en-US" dirty="0" smtClean="0"/>
+              <a:t>Load Data</a:t>
+            </a:r>
+            <a:endParaRPr lang="en-US" dirty="0"/>
+          </a:p>
+        </p:txBody>
+      </p:sp>
+      <p:pic>
+        <p:nvPicPr>
+          <p:cNvPr id="6" name="Picture 5"/>
+          <p:cNvPicPr>
+            <a:picLocks noChangeAspect="1"/>
+          </p:cNvPicPr>
+          <p:nvPr/>
+        </p:nvPicPr>
+        <p:blipFill>
+          <a:blip r:embed="rId3"/>
+          <a:stretch>
+            <a:fillRect/>
+          </a:stretch>
+        </p:blipFill>
+        <p:spPr>
+          <a:xfrm>
+            <a:off x="105156" y="2397252"/>
+            <a:ext cx="11960825" cy="2028444"/>
+          </a:xfrm>
+          <a:prstGeom prst="rect">
+            <a:avLst/>
+          </a:prstGeom>
+        </p:spPr>
+      </p:pic>
+    </p:spTree>
+    <p:extLst>
+      <p:ext uri="{BB962C8B-B14F-4D97-AF65-F5344CB8AC3E}">
+        <p14:creationId xmlns:p14="http://schemas.microsoft.com/office/powerpoint/2010/main" val="2223252723"/>
+      </p:ext>
+    </p:extLst>
+  </p:cSld>
+  <p:clrMapOvr>
+    <a:masterClrMapping/>
+  </p:clrMapOvr>
+</p:sld>
+</file>
+
+<file path=ppt/slides/slide23.xml><?xml version="1.0" encoding="utf-8"?>
+<p:sld xmlns:a="http://schemas.openxmlformats.org/drawingml/2006/main" xmlns:r="http://schemas.openxmlformats.org/officeDocument/2006/relationships" xmlns:p="http://schemas.openxmlformats.org/presentationml/2006/main">
+  <p:cSld>
+    <p:spTree>
+      <p:nvGrpSpPr>
+        <p:cNvPr id="1" name=""/>
+        <p:cNvGrpSpPr/>
+        <p:nvPr/>
+      </p:nvGrpSpPr>
+      <p:grpSpPr>
+        <a:xfrm>
+          <a:off x="0" y="0"/>
+          <a:ext cx="0" cy="0"/>
+          <a:chOff x="0" y="0"/>
+          <a:chExt cx="0" cy="0"/>
+        </a:xfrm>
+      </p:grpSpPr>
+      <p:sp>
+        <p:nvSpPr>
+          <p:cNvPr id="2" name="Title 1"/>
+          <p:cNvSpPr>
+            <a:spLocks noGrp="1"/>
+          </p:cNvSpPr>
+          <p:nvPr>
+            <p:ph type="title"/>
+          </p:nvPr>
+        </p:nvSpPr>
+        <p:spPr/>
+        <p:txBody>
+          <a:bodyPr/>
+          <a:lstStyle/>
+          <a:p>
+            <a:r>
+              <a:rPr lang="en-US" dirty="0" smtClean="0"/>
+              <a:t>Transformation</a:t>
+            </a:r>
+            <a:endParaRPr lang="en-US" dirty="0"/>
+          </a:p>
+        </p:txBody>
+      </p:sp>
+      <p:pic>
+        <p:nvPicPr>
+          <p:cNvPr id="3" name="Picture 2"/>
+          <p:cNvPicPr>
+            <a:picLocks noChangeAspect="1"/>
+          </p:cNvPicPr>
+          <p:nvPr/>
+        </p:nvPicPr>
+        <p:blipFill>
+          <a:blip r:embed="rId3"/>
+          <a:stretch>
+            <a:fillRect/>
+          </a:stretch>
+        </p:blipFill>
+        <p:spPr>
+          <a:xfrm>
+            <a:off x="838286" y="2365248"/>
+            <a:ext cx="11268370" cy="3121152"/>
+          </a:xfrm>
+          <a:prstGeom prst="rect">
+            <a:avLst/>
+          </a:prstGeom>
+        </p:spPr>
+      </p:pic>
+      <p:cxnSp>
+        <p:nvCxnSpPr>
+          <p:cNvPr id="8" name="Straight Connector 7"/>
+          <p:cNvCxnSpPr/>
+          <p:nvPr/>
+        </p:nvCxnSpPr>
+        <p:spPr>
+          <a:xfrm>
+            <a:off x="6790944" y="4108704"/>
+            <a:ext cx="1499616" cy="0"/>
+          </a:xfrm>
+          <a:prstGeom prst="line">
+            <a:avLst/>
+          </a:prstGeom>
+          <a:ln w="38100">
+            <a:solidFill>
+              <a:srgbClr val="00B050"/>
+            </a:solidFill>
+          </a:ln>
+        </p:spPr>
+        <p:style>
+          <a:lnRef idx="3">
+            <a:schemeClr val="accent1"/>
+          </a:lnRef>
+          <a:fillRef idx="0">
+            <a:schemeClr val="accent1"/>
+          </a:fillRef>
+          <a:effectRef idx="2">
+            <a:schemeClr val="accent1"/>
+          </a:effectRef>
+          <a:fontRef idx="minor">
+            <a:schemeClr val="tx1"/>
+          </a:fontRef>
+        </p:style>
+      </p:cxnSp>
+      <p:cxnSp>
+        <p:nvCxnSpPr>
+          <p:cNvPr id="9" name="Straight Connector 8"/>
+          <p:cNvCxnSpPr/>
+          <p:nvPr/>
+        </p:nvCxnSpPr>
+        <p:spPr>
+          <a:xfrm>
+            <a:off x="4102608" y="4639056"/>
+            <a:ext cx="2200656" cy="6096"/>
+          </a:xfrm>
+          <a:prstGeom prst="line">
+            <a:avLst/>
+          </a:prstGeom>
+          <a:ln w="38100">
+            <a:solidFill>
+              <a:srgbClr val="00B050"/>
+            </a:solidFill>
+          </a:ln>
+        </p:spPr>
+        <p:style>
+          <a:lnRef idx="3">
+            <a:schemeClr val="accent1"/>
+          </a:lnRef>
+          <a:fillRef idx="0">
+            <a:schemeClr val="accent1"/>
+          </a:fillRef>
+          <a:effectRef idx="2">
+            <a:schemeClr val="accent1"/>
+          </a:effectRef>
+          <a:fontRef idx="minor">
+            <a:schemeClr val="tx1"/>
+          </a:fontRef>
+        </p:style>
+      </p:cxnSp>
+      <p:cxnSp>
+        <p:nvCxnSpPr>
+          <p:cNvPr id="12" name="Straight Connector 11"/>
+          <p:cNvCxnSpPr/>
+          <p:nvPr/>
+        </p:nvCxnSpPr>
+        <p:spPr>
+          <a:xfrm>
+            <a:off x="4200144" y="5151120"/>
+            <a:ext cx="1200912" cy="6096"/>
+          </a:xfrm>
+          <a:prstGeom prst="line">
+            <a:avLst/>
+          </a:prstGeom>
+          <a:ln w="38100">
+            <a:solidFill>
+              <a:srgbClr val="00B050"/>
+            </a:solidFill>
+          </a:ln>
+        </p:spPr>
+        <p:style>
+          <a:lnRef idx="3">
+            <a:schemeClr val="accent1"/>
+          </a:lnRef>
+          <a:fillRef idx="0">
+            <a:schemeClr val="accent1"/>
+          </a:fillRef>
+          <a:effectRef idx="2">
+            <a:schemeClr val="accent1"/>
+          </a:effectRef>
+          <a:fontRef idx="minor">
+            <a:schemeClr val="tx1"/>
+          </a:fontRef>
+        </p:style>
+      </p:cxnSp>
+    </p:spTree>
+    <p:extLst>
+      <p:ext uri="{BB962C8B-B14F-4D97-AF65-F5344CB8AC3E}">
+        <p14:creationId xmlns:p14="http://schemas.microsoft.com/office/powerpoint/2010/main" val="2160842583"/>
+      </p:ext>
+    </p:extLst>
+  </p:cSld>
+  <p:clrMapOvr>
+    <a:masterClrMapping/>
+  </p:clrMapOvr>
+</p:sld>
+</file>
+
+<file path=ppt/slides/slide24.xml><?xml version="1.0" encoding="utf-8"?>
+<p:sld xmlns:a="http://schemas.openxmlformats.org/drawingml/2006/main" xmlns:r="http://schemas.openxmlformats.org/officeDocument/2006/relationships" xmlns:p="http://schemas.openxmlformats.org/presentationml/2006/main">
+  <p:cSld>
+    <p:spTree>
+      <p:nvGrpSpPr>
+        <p:cNvPr id="1" name=""/>
+        <p:cNvGrpSpPr/>
+        <p:nvPr/>
+      </p:nvGrpSpPr>
+      <p:grpSpPr>
+        <a:xfrm>
+          <a:off x="0" y="0"/>
+          <a:ext cx="0" cy="0"/>
+          <a:chOff x="0" y="0"/>
+          <a:chExt cx="0" cy="0"/>
+        </a:xfrm>
+      </p:grpSpPr>
+      <p:sp>
+        <p:nvSpPr>
+          <p:cNvPr id="2" name="Title 1"/>
+          <p:cNvSpPr>
+            <a:spLocks noGrp="1"/>
+          </p:cNvSpPr>
+          <p:nvPr>
+            <p:ph type="title"/>
+          </p:nvPr>
+        </p:nvSpPr>
+        <p:spPr/>
+        <p:txBody>
+          <a:bodyPr/>
+          <a:lstStyle/>
+          <a:p>
+            <a:r>
+              <a:rPr lang="en-US" dirty="0" smtClean="0"/>
+              <a:t>Training</a:t>
+            </a:r>
+            <a:endParaRPr lang="en-US" dirty="0"/>
+          </a:p>
+        </p:txBody>
+      </p:sp>
+      <p:pic>
+        <p:nvPicPr>
+          <p:cNvPr id="4" name="Picture 3"/>
+          <p:cNvPicPr>
+            <a:picLocks noChangeAspect="1"/>
+          </p:cNvPicPr>
+          <p:nvPr/>
+        </p:nvPicPr>
+        <p:blipFill>
+          <a:blip r:embed="rId3"/>
+          <a:stretch>
+            <a:fillRect/>
+          </a:stretch>
+        </p:blipFill>
+        <p:spPr>
+          <a:xfrm>
+            <a:off x="411480" y="2901316"/>
+            <a:ext cx="11430000" cy="2066925"/>
+          </a:xfrm>
+          <a:prstGeom prst="rect">
+            <a:avLst/>
+          </a:prstGeom>
+        </p:spPr>
+      </p:pic>
+      <p:cxnSp>
+        <p:nvCxnSpPr>
+          <p:cNvPr id="8" name="Straight Connector 7"/>
+          <p:cNvCxnSpPr/>
+          <p:nvPr/>
+        </p:nvCxnSpPr>
+        <p:spPr>
+          <a:xfrm>
+            <a:off x="975360" y="4267200"/>
+            <a:ext cx="1207008" cy="12192"/>
+          </a:xfrm>
+          <a:prstGeom prst="line">
+            <a:avLst/>
+          </a:prstGeom>
+          <a:ln w="38100">
+            <a:solidFill>
+              <a:srgbClr val="00B050"/>
+            </a:solidFill>
+          </a:ln>
+        </p:spPr>
+        <p:style>
+          <a:lnRef idx="3">
+            <a:schemeClr val="accent1"/>
+          </a:lnRef>
+          <a:fillRef idx="0">
+            <a:schemeClr val="accent1"/>
+          </a:fillRef>
+          <a:effectRef idx="2">
+            <a:schemeClr val="accent1"/>
+          </a:effectRef>
+          <a:fontRef idx="minor">
+            <a:schemeClr val="tx1"/>
+          </a:fontRef>
+        </p:style>
+      </p:cxnSp>
+      <p:cxnSp>
+        <p:nvCxnSpPr>
+          <p:cNvPr id="10" name="Straight Connector 9"/>
+          <p:cNvCxnSpPr/>
+          <p:nvPr/>
+        </p:nvCxnSpPr>
+        <p:spPr>
+          <a:xfrm>
+            <a:off x="5419344" y="4956049"/>
+            <a:ext cx="542544" cy="12192"/>
+          </a:xfrm>
+          <a:prstGeom prst="line">
+            <a:avLst/>
+          </a:prstGeom>
+          <a:ln w="38100">
+            <a:solidFill>
+              <a:srgbClr val="00B050"/>
+            </a:solidFill>
+          </a:ln>
+        </p:spPr>
+        <p:style>
+          <a:lnRef idx="3">
+            <a:schemeClr val="accent1"/>
+          </a:lnRef>
+          <a:fillRef idx="0">
+            <a:schemeClr val="accent1"/>
+          </a:fillRef>
+          <a:effectRef idx="2">
+            <a:schemeClr val="accent1"/>
+          </a:effectRef>
+          <a:fontRef idx="minor">
+            <a:schemeClr val="tx1"/>
+          </a:fontRef>
+        </p:style>
+      </p:cxnSp>
+    </p:spTree>
+    <p:extLst>
+      <p:ext uri="{BB962C8B-B14F-4D97-AF65-F5344CB8AC3E}">
+        <p14:creationId xmlns:p14="http://schemas.microsoft.com/office/powerpoint/2010/main" val="971480250"/>
+      </p:ext>
+    </p:extLst>
+  </p:cSld>
+  <p:clrMapOvr>
+    <a:masterClrMapping/>
+  </p:clrMapOvr>
+</p:sld>
+</file>
+
+<file path=ppt/slides/slide25.xml><?xml version="1.0" encoding="utf-8"?>
+<p:sld xmlns:a="http://schemas.openxmlformats.org/drawingml/2006/main" xmlns:r="http://schemas.openxmlformats.org/officeDocument/2006/relationships" xmlns:p="http://schemas.openxmlformats.org/presentationml/2006/main">
+  <p:cSld>
+    <p:spTree>
+      <p:nvGrpSpPr>
+        <p:cNvPr id="1" name=""/>
+        <p:cNvGrpSpPr/>
+        <p:nvPr/>
+      </p:nvGrpSpPr>
+      <p:grpSpPr>
+        <a:xfrm>
+          <a:off x="0" y="0"/>
+          <a:ext cx="0" cy="0"/>
+          <a:chOff x="0" y="0"/>
+          <a:chExt cx="0" cy="0"/>
+        </a:xfrm>
+      </p:grpSpPr>
+      <p:sp>
+        <p:nvSpPr>
+          <p:cNvPr id="2" name="Title 1"/>
+          <p:cNvSpPr>
+            <a:spLocks noGrp="1"/>
+          </p:cNvSpPr>
+          <p:nvPr>
+            <p:ph type="title"/>
+          </p:nvPr>
+        </p:nvSpPr>
+        <p:spPr/>
+        <p:txBody>
+          <a:bodyPr/>
+          <a:lstStyle/>
+          <a:p>
+            <a:r>
+              <a:rPr lang="en-US" dirty="0" smtClean="0"/>
+              <a:t>Evaluate</a:t>
+            </a:r>
+            <a:endParaRPr lang="en-US" dirty="0"/>
+          </a:p>
+        </p:txBody>
+      </p:sp>
+      <p:pic>
+        <p:nvPicPr>
+          <p:cNvPr id="3" name="Picture 2"/>
+          <p:cNvPicPr>
+            <a:picLocks noChangeAspect="1"/>
+          </p:cNvPicPr>
+          <p:nvPr/>
+        </p:nvPicPr>
+        <p:blipFill>
+          <a:blip r:embed="rId3"/>
+          <a:stretch>
+            <a:fillRect/>
+          </a:stretch>
+        </p:blipFill>
+        <p:spPr>
+          <a:xfrm>
+            <a:off x="156591" y="2308479"/>
+            <a:ext cx="11913489" cy="1988622"/>
+          </a:xfrm>
+          <a:prstGeom prst="rect">
+            <a:avLst/>
+          </a:prstGeom>
+        </p:spPr>
+      </p:pic>
+      <p:cxnSp>
+        <p:nvCxnSpPr>
+          <p:cNvPr id="10" name="Straight Connector 9"/>
+          <p:cNvCxnSpPr/>
+          <p:nvPr/>
+        </p:nvCxnSpPr>
+        <p:spPr>
+          <a:xfrm>
+            <a:off x="6248400" y="3667309"/>
+            <a:ext cx="1127760" cy="2483"/>
+          </a:xfrm>
+          <a:prstGeom prst="line">
+            <a:avLst/>
+          </a:prstGeom>
+          <a:ln w="38100">
+            <a:solidFill>
+              <a:srgbClr val="00B050"/>
+            </a:solidFill>
+          </a:ln>
+        </p:spPr>
+        <p:style>
+          <a:lnRef idx="3">
+            <a:schemeClr val="accent1"/>
+          </a:lnRef>
+          <a:fillRef idx="0">
+            <a:schemeClr val="accent1"/>
+          </a:fillRef>
+          <a:effectRef idx="2">
+            <a:schemeClr val="accent1"/>
+          </a:effectRef>
+          <a:fontRef idx="minor">
+            <a:schemeClr val="tx1"/>
+          </a:fontRef>
+        </p:style>
+      </p:cxnSp>
+    </p:spTree>
+    <p:extLst>
+      <p:ext uri="{BB962C8B-B14F-4D97-AF65-F5344CB8AC3E}">
+        <p14:creationId xmlns:p14="http://schemas.microsoft.com/office/powerpoint/2010/main" val="1633879777"/>
+      </p:ext>
+    </p:extLst>
+  </p:cSld>
+  <p:clrMapOvr>
+    <a:masterClrMapping/>
+  </p:clrMapOvr>
+</p:sld>
+</file>
+
+<file path=ppt/slides/slide26.xml><?xml version="1.0" encoding="utf-8"?>
+<p:sld xmlns:a="http://schemas.openxmlformats.org/drawingml/2006/main" xmlns:r="http://schemas.openxmlformats.org/officeDocument/2006/relationships" xmlns:p="http://schemas.openxmlformats.org/presentationml/2006/main">
+  <p:cSld>
+    <p:spTree>
+      <p:nvGrpSpPr>
+        <p:cNvPr id="1" name=""/>
+        <p:cNvGrpSpPr/>
+        <p:nvPr/>
+      </p:nvGrpSpPr>
+      <p:grpSpPr>
+        <a:xfrm>
+          <a:off x="0" y="0"/>
+          <a:ext cx="0" cy="0"/>
+          <a:chOff x="0" y="0"/>
+          <a:chExt cx="0" cy="0"/>
+        </a:xfrm>
+      </p:grpSpPr>
+      <p:sp>
+        <p:nvSpPr>
+          <p:cNvPr id="2" name="Title 1"/>
+          <p:cNvSpPr>
+            <a:spLocks noGrp="1"/>
+          </p:cNvSpPr>
+          <p:nvPr>
+            <p:ph type="title"/>
+          </p:nvPr>
+        </p:nvSpPr>
+        <p:spPr/>
+        <p:txBody>
+          <a:bodyPr/>
+          <a:lstStyle/>
+          <a:p>
+            <a:r>
+              <a:rPr lang="en-US" dirty="0" smtClean="0"/>
+              <a:t>Save</a:t>
+            </a:r>
+            <a:endParaRPr lang="en-US" dirty="0"/>
+          </a:p>
+        </p:txBody>
+      </p:sp>
+      <p:cxnSp>
+        <p:nvCxnSpPr>
+          <p:cNvPr id="8" name="Straight Connector 7"/>
+          <p:cNvCxnSpPr/>
+          <p:nvPr/>
+        </p:nvCxnSpPr>
+        <p:spPr>
+          <a:xfrm>
+            <a:off x="2938272" y="4255008"/>
+            <a:ext cx="597408" cy="0"/>
+          </a:xfrm>
+          <a:prstGeom prst="line">
+            <a:avLst/>
+          </a:prstGeom>
+          <a:ln w="38100">
+            <a:solidFill>
+              <a:srgbClr val="00B050"/>
+            </a:solidFill>
+          </a:ln>
+        </p:spPr>
+        <p:style>
+          <a:lnRef idx="3">
+            <a:schemeClr val="accent1"/>
+          </a:lnRef>
+          <a:fillRef idx="0">
+            <a:schemeClr val="accent1"/>
+          </a:fillRef>
+          <a:effectRef idx="2">
+            <a:schemeClr val="accent1"/>
+          </a:effectRef>
+          <a:fontRef idx="minor">
+            <a:schemeClr val="tx1"/>
+          </a:fontRef>
+        </p:style>
+      </p:cxnSp>
+      <p:pic>
+        <p:nvPicPr>
+          <p:cNvPr id="3" name="Picture 2"/>
+          <p:cNvPicPr>
+            <a:picLocks noChangeAspect="1"/>
+          </p:cNvPicPr>
+          <p:nvPr/>
+        </p:nvPicPr>
+        <p:blipFill>
+          <a:blip r:embed="rId3"/>
+          <a:stretch>
+            <a:fillRect/>
+          </a:stretch>
+        </p:blipFill>
+        <p:spPr>
+          <a:xfrm>
+            <a:off x="619125" y="2719387"/>
+            <a:ext cx="10953750" cy="1419225"/>
+          </a:xfrm>
+          <a:prstGeom prst="rect">
+            <a:avLst/>
+          </a:prstGeom>
+        </p:spPr>
+      </p:pic>
+    </p:spTree>
+    <p:extLst>
+      <p:ext uri="{BB962C8B-B14F-4D97-AF65-F5344CB8AC3E}">
+        <p14:creationId xmlns:p14="http://schemas.microsoft.com/office/powerpoint/2010/main" val="2079758087"/>
+      </p:ext>
+    </p:extLst>
+  </p:cSld>
+  <p:clrMapOvr>
+    <a:masterClrMapping/>
+  </p:clrMapOvr>
+</p:sld>
+</file>
+
+<file path=ppt/slides/slide27.xml><?xml version="1.0" encoding="utf-8"?>
+<p:sld xmlns:a="http://schemas.openxmlformats.org/drawingml/2006/main" xmlns:r="http://schemas.openxmlformats.org/officeDocument/2006/relationships" xmlns:p="http://schemas.openxmlformats.org/presentationml/2006/main">
+  <p:cSld>
+    <p:spTree>
+      <p:nvGrpSpPr>
+        <p:cNvPr id="1" name=""/>
+        <p:cNvGrpSpPr/>
+        <p:nvPr/>
+      </p:nvGrpSpPr>
+      <p:grpSpPr>
+        <a:xfrm>
+          <a:off x="0" y="0"/>
+          <a:ext cx="0" cy="0"/>
+          <a:chOff x="0" y="0"/>
+          <a:chExt cx="0" cy="0"/>
+        </a:xfrm>
+      </p:grpSpPr>
+      <p:sp>
+        <p:nvSpPr>
+          <p:cNvPr id="2" name="Title 1"/>
+          <p:cNvSpPr>
+            <a:spLocks noGrp="1"/>
+          </p:cNvSpPr>
+          <p:nvPr>
+            <p:ph type="title"/>
+          </p:nvPr>
+        </p:nvSpPr>
+        <p:spPr/>
+        <p:txBody>
+          <a:bodyPr/>
+          <a:lstStyle/>
+          <a:p>
+            <a:r>
+              <a:rPr lang="en-US" dirty="0" smtClean="0"/>
+              <a:t>Predict</a:t>
+            </a:r>
+            <a:endParaRPr lang="en-US" dirty="0"/>
+          </a:p>
+        </p:txBody>
+      </p:sp>
+      <p:pic>
+        <p:nvPicPr>
+          <p:cNvPr id="4" name="Picture 3"/>
+          <p:cNvPicPr>
+            <a:picLocks noChangeAspect="1"/>
+          </p:cNvPicPr>
+          <p:nvPr/>
+        </p:nvPicPr>
+        <p:blipFill>
+          <a:blip r:embed="rId3"/>
+          <a:stretch>
+            <a:fillRect/>
+          </a:stretch>
+        </p:blipFill>
+        <p:spPr>
+          <a:xfrm>
+            <a:off x="1097280" y="1830202"/>
+            <a:ext cx="8193024" cy="4456404"/>
+          </a:xfrm>
+          <a:prstGeom prst="rect">
+            <a:avLst/>
+          </a:prstGeom>
+        </p:spPr>
+      </p:pic>
+    </p:spTree>
+    <p:extLst>
+      <p:ext uri="{BB962C8B-B14F-4D97-AF65-F5344CB8AC3E}">
+        <p14:creationId xmlns:p14="http://schemas.microsoft.com/office/powerpoint/2010/main" val="3764706984"/>
+      </p:ext>
+    </p:extLst>
+  </p:cSld>
+  <p:clrMapOvr>
+    <a:masterClrMapping/>
+  </p:clrMapOvr>
+</p:sld>
+</file>
+
+<file path=ppt/slides/slide28.xml><?xml version="1.0" encoding="utf-8"?>
+<p:sld xmlns:a="http://schemas.openxmlformats.org/drawingml/2006/main" xmlns:r="http://schemas.openxmlformats.org/officeDocument/2006/relationships" xmlns:p="http://schemas.openxmlformats.org/presentationml/2006/main">
+  <p:cSld>
+    <p:spTree>
+      <p:nvGrpSpPr>
+        <p:cNvPr id="1" name=""/>
+        <p:cNvGrpSpPr/>
+        <p:nvPr/>
+      </p:nvGrpSpPr>
+      <p:grpSpPr>
+        <a:xfrm>
+          <a:off x="0" y="0"/>
+          <a:ext cx="0" cy="0"/>
+          <a:chOff x="0" y="0"/>
+          <a:chExt cx="0" cy="0"/>
+        </a:xfrm>
+      </p:grpSpPr>
+      <p:sp>
+        <p:nvSpPr>
+          <p:cNvPr id="2" name="Title 1"/>
+          <p:cNvSpPr>
+            <a:spLocks noGrp="1"/>
+          </p:cNvSpPr>
+          <p:nvPr>
+            <p:ph type="title"/>
+          </p:nvPr>
+        </p:nvSpPr>
         <p:spPr>
           <a:xfrm>
             <a:off x="239485" y="993058"/>
@@ -14149,7 +15595,7 @@
 </p:sld>
 </file>
 
-<file path=ppt/slides/slide22.xml><?xml version="1.0" encoding="utf-8"?>
+<file path=ppt/slides/slide29.xml><?xml version="1.0" encoding="utf-8"?>
 <p:sld xmlns:a="http://schemas.openxmlformats.org/drawingml/2006/main" xmlns:r="http://schemas.openxmlformats.org/officeDocument/2006/relationships" xmlns:p="http://schemas.openxmlformats.org/presentationml/2006/main">
   <p:cSld>
     <p:spTree>
@@ -14416,425 +15862,6 @@
     <p:extLst>
       <p:ext uri="{BB962C8B-B14F-4D97-AF65-F5344CB8AC3E}">
         <p14:creationId xmlns:p14="http://schemas.microsoft.com/office/powerpoint/2010/main" val="3917071312"/>
-      </p:ext>
-    </p:extLst>
-  </p:cSld>
-  <p:clrMapOvr>
-    <a:masterClrMapping/>
-  </p:clrMapOvr>
-  <p:timing>
-    <p:tnLst>
-      <p:par>
-        <p:cTn id="1" dur="indefinite" restart="never" nodeType="tmRoot"/>
-      </p:par>
-    </p:tnLst>
-  </p:timing>
-</p:sld>
-</file>
-
-<file path=ppt/slides/slide23.xml><?xml version="1.0" encoding="utf-8"?>
-<p:sld xmlns:a="http://schemas.openxmlformats.org/drawingml/2006/main" xmlns:r="http://schemas.openxmlformats.org/officeDocument/2006/relationships" xmlns:p="http://schemas.openxmlformats.org/presentationml/2006/main">
-  <p:cSld>
-    <p:spTree>
-      <p:nvGrpSpPr>
-        <p:cNvPr id="1" name=""/>
-        <p:cNvGrpSpPr/>
-        <p:nvPr/>
-      </p:nvGrpSpPr>
-      <p:grpSpPr>
-        <a:xfrm>
-          <a:off x="0" y="0"/>
-          <a:ext cx="0" cy="0"/>
-          <a:chOff x="0" y="0"/>
-          <a:chExt cx="0" cy="0"/>
-        </a:xfrm>
-      </p:grpSpPr>
-      <p:sp>
-        <p:nvSpPr>
-          <p:cNvPr id="2" name="Title 1"/>
-          <p:cNvSpPr>
-            <a:spLocks noGrp="1"/>
-          </p:cNvSpPr>
-          <p:nvPr>
-            <p:ph type="title"/>
-          </p:nvPr>
-        </p:nvSpPr>
-        <p:spPr>
-          <a:xfrm>
-            <a:off x="962325" y="3092927"/>
-            <a:ext cx="2542068" cy="670067"/>
-          </a:xfrm>
-        </p:spPr>
-        <p:txBody>
-          <a:bodyPr>
-            <a:normAutofit fontScale="90000"/>
-          </a:bodyPr>
-          <a:lstStyle/>
-          <a:p>
-            <a:r>
-              <a:rPr lang="en-US" dirty="0" smtClean="0"/>
-              <a:t>Thank </a:t>
-            </a:r>
-            <a:r>
-              <a:rPr lang="en-US" dirty="0" smtClean="0"/>
-              <a:t>you</a:t>
-            </a:r>
-            <a:br>
-              <a:rPr lang="en-US" dirty="0" smtClean="0"/>
-            </a:br>
-            <a:r>
-              <a:rPr lang="en-US" dirty="0"/>
-              <a:t/>
-            </a:r>
-            <a:br>
-              <a:rPr lang="en-US" dirty="0"/>
-            </a:br>
-            <a:r>
-              <a:rPr lang="en-US" dirty="0"/>
-              <a:t>Q</a:t>
-            </a:r>
-            <a:r>
-              <a:rPr lang="en-US" dirty="0" smtClean="0"/>
-              <a:t> &amp; A</a:t>
-            </a:r>
-            <a:endParaRPr lang="en-US" dirty="0"/>
-          </a:p>
-        </p:txBody>
-      </p:sp>
-      <p:sp>
-        <p:nvSpPr>
-          <p:cNvPr id="3" name="Content Placeholder 2"/>
-          <p:cNvSpPr>
-            <a:spLocks noGrp="1"/>
-          </p:cNvSpPr>
-          <p:nvPr>
-            <p:ph idx="1"/>
-          </p:nvPr>
-        </p:nvSpPr>
-        <p:spPr>
-          <a:xfrm>
-            <a:off x="5324566" y="476070"/>
-            <a:ext cx="6654074" cy="6209210"/>
-          </a:xfrm>
-        </p:spPr>
-        <p:txBody>
-          <a:bodyPr>
-            <a:normAutofit fontScale="25000" lnSpcReduction="20000"/>
-          </a:bodyPr>
-          <a:lstStyle/>
-          <a:p>
-            <a:pPr marL="0" indent="0">
-              <a:lnSpc>
-                <a:spcPct val="320000"/>
-              </a:lnSpc>
-              <a:buNone/>
-            </a:pPr>
-            <a:r>
-              <a:rPr lang="en-US" sz="8000" dirty="0"/>
-              <a:t>praveenraghuvanshi@gmail.com</a:t>
-            </a:r>
-          </a:p>
-          <a:p>
-            <a:pPr marL="0" indent="0">
-              <a:lnSpc>
-                <a:spcPct val="320000"/>
-              </a:lnSpc>
-              <a:buNone/>
-            </a:pPr>
-            <a:r>
-              <a:rPr lang="en-US" sz="8000" dirty="0">
-                <a:hlinkClick r:id="rId2"/>
-              </a:rPr>
-              <a:t>https://</a:t>
-            </a:r>
-            <a:r>
-              <a:rPr lang="en-US" sz="8000" dirty="0" smtClean="0">
-                <a:hlinkClick r:id="rId2"/>
-              </a:rPr>
-              <a:t>in.linkedin.com/in/praveenraghuvanshi</a:t>
-            </a:r>
-            <a:endParaRPr lang="en-US" sz="8000" dirty="0" smtClean="0"/>
-          </a:p>
-          <a:p>
-            <a:pPr marL="0" indent="0">
-              <a:lnSpc>
-                <a:spcPct val="320000"/>
-              </a:lnSpc>
-              <a:buNone/>
-            </a:pPr>
-            <a:r>
-              <a:rPr lang="en-US" sz="8000" dirty="0" smtClean="0">
-                <a:hlinkClick r:id="rId3"/>
-              </a:rPr>
-              <a:t>https</a:t>
-            </a:r>
-            <a:r>
-              <a:rPr lang="en-US" sz="8000" dirty="0">
-                <a:hlinkClick r:id="rId3"/>
-              </a:rPr>
-              <a:t>://</a:t>
-            </a:r>
-            <a:r>
-              <a:rPr lang="en-US" sz="8000" dirty="0" smtClean="0">
-                <a:hlinkClick r:id="rId3"/>
-              </a:rPr>
-              <a:t>github.com/praveenraghuvanshi1512</a:t>
-            </a:r>
-          </a:p>
-          <a:p>
-            <a:pPr marL="0" indent="0">
-              <a:lnSpc>
-                <a:spcPct val="320000"/>
-              </a:lnSpc>
-              <a:buNone/>
-            </a:pPr>
-            <a:r>
-              <a:rPr lang="en-US" sz="8000" dirty="0" smtClean="0">
-                <a:hlinkClick r:id="rId3"/>
-              </a:rPr>
-              <a:t>@</a:t>
-            </a:r>
-            <a:r>
-              <a:rPr lang="en-US" sz="8000" dirty="0" err="1" smtClean="0">
-                <a:hlinkClick r:id="rId3"/>
-              </a:rPr>
-              <a:t>praveenraghuvan</a:t>
-            </a:r>
-            <a:endParaRPr lang="en-US" sz="8000" dirty="0" smtClean="0">
-              <a:hlinkClick r:id="rId3"/>
-            </a:endParaRPr>
-          </a:p>
-          <a:p>
-            <a:pPr marL="0" indent="0">
-              <a:lnSpc>
-                <a:spcPct val="320000"/>
-              </a:lnSpc>
-              <a:buNone/>
-            </a:pPr>
-            <a:r>
-              <a:rPr lang="en-US" sz="8000" dirty="0">
-                <a:hlinkClick r:id="rId4"/>
-              </a:rPr>
-              <a:t>https://</a:t>
-            </a:r>
-            <a:r>
-              <a:rPr lang="en-US" sz="8000" dirty="0" smtClean="0">
-                <a:hlinkClick r:id="rId4"/>
-              </a:rPr>
-              <a:t>www.surveymonkey.com/r/T9TD93G</a:t>
-            </a:r>
-            <a:endParaRPr lang="en-US" sz="8000" dirty="0" smtClean="0"/>
-          </a:p>
-          <a:p>
-            <a:pPr marL="0" indent="0">
-              <a:lnSpc>
-                <a:spcPct val="320000"/>
-              </a:lnSpc>
-              <a:buNone/>
-            </a:pPr>
-            <a:r>
-              <a:rPr lang="en-US" sz="5200" dirty="0">
-                <a:hlinkClick r:id="rId5"/>
-              </a:rPr>
-              <a:t>https://github.com/praveenraghuvanshi1512/AIML/tree/master/Meetup_DotNet_10_Aug_2019</a:t>
-            </a:r>
-            <a:endParaRPr lang="en-US" sz="5200" dirty="0" smtClean="0"/>
-          </a:p>
-          <a:p>
-            <a:pPr marL="0" indent="0">
-              <a:lnSpc>
-                <a:spcPct val="320000"/>
-              </a:lnSpc>
-              <a:buNone/>
-            </a:pPr>
-            <a:endParaRPr lang="en-US" sz="8000" dirty="0" smtClean="0"/>
-          </a:p>
-        </p:txBody>
-      </p:sp>
-      <p:pic>
-        <p:nvPicPr>
-          <p:cNvPr id="4" name="Picture 3"/>
-          <p:cNvPicPr>
-            <a:picLocks noChangeAspect="1"/>
-          </p:cNvPicPr>
-          <p:nvPr/>
-        </p:nvPicPr>
-        <p:blipFill>
-          <a:blip r:embed="rId6">
-            <a:extLst>
-              <a:ext uri="{28A0092B-C50C-407E-A947-70E740481C1C}">
-                <a14:useLocalDpi xmlns:a14="http://schemas.microsoft.com/office/drawing/2010/main" val="0"/>
-              </a:ext>
-            </a:extLst>
-          </a:blip>
-          <a:stretch>
-            <a:fillRect/>
-          </a:stretch>
-        </p:blipFill>
-        <p:spPr>
-          <a:xfrm>
-            <a:off x="4109448" y="745982"/>
-            <a:ext cx="1215118" cy="910349"/>
-          </a:xfrm>
-          <a:prstGeom prst="rect">
-            <a:avLst/>
-          </a:prstGeom>
-        </p:spPr>
-      </p:pic>
-      <p:pic>
-        <p:nvPicPr>
-          <p:cNvPr id="5" name="Picture 4"/>
-          <p:cNvPicPr>
-            <a:picLocks noChangeAspect="1"/>
-          </p:cNvPicPr>
-          <p:nvPr/>
-        </p:nvPicPr>
-        <p:blipFill>
-          <a:blip r:embed="rId7">
-            <a:extLst>
-              <a:ext uri="{28A0092B-C50C-407E-A947-70E740481C1C}">
-                <a14:useLocalDpi xmlns:a14="http://schemas.microsoft.com/office/drawing/2010/main" val="0"/>
-              </a:ext>
-            </a:extLst>
-          </a:blip>
-          <a:stretch>
-            <a:fillRect/>
-          </a:stretch>
-        </p:blipFill>
-        <p:spPr>
-          <a:xfrm>
-            <a:off x="4456989" y="1950042"/>
-            <a:ext cx="580782" cy="580782"/>
-          </a:xfrm>
-          <a:prstGeom prst="rect">
-            <a:avLst/>
-          </a:prstGeom>
-        </p:spPr>
-      </p:pic>
-      <p:pic>
-        <p:nvPicPr>
-          <p:cNvPr id="6" name="Picture 5"/>
-          <p:cNvPicPr>
-            <a:picLocks noChangeAspect="1"/>
-          </p:cNvPicPr>
-          <p:nvPr/>
-        </p:nvPicPr>
-        <p:blipFill>
-          <a:blip r:embed="rId8">
-            <a:extLst>
-              <a:ext uri="{28A0092B-C50C-407E-A947-70E740481C1C}">
-                <a14:useLocalDpi xmlns:a14="http://schemas.microsoft.com/office/drawing/2010/main" val="0"/>
-              </a:ext>
-            </a:extLst>
-          </a:blip>
-          <a:stretch>
-            <a:fillRect/>
-          </a:stretch>
-        </p:blipFill>
-        <p:spPr>
-          <a:xfrm>
-            <a:off x="4537028" y="3123160"/>
-            <a:ext cx="500743" cy="500743"/>
-          </a:xfrm>
-          <a:prstGeom prst="rect">
-            <a:avLst/>
-          </a:prstGeom>
-        </p:spPr>
-      </p:pic>
-      <p:pic>
-        <p:nvPicPr>
-          <p:cNvPr id="8" name="Picture 7"/>
-          <p:cNvPicPr>
-            <a:picLocks noChangeAspect="1"/>
-          </p:cNvPicPr>
-          <p:nvPr/>
-        </p:nvPicPr>
-        <p:blipFill>
-          <a:blip r:embed="rId9">
-            <a:extLst>
-              <a:ext uri="{28A0092B-C50C-407E-A947-70E740481C1C}">
-                <a14:useLocalDpi xmlns:a14="http://schemas.microsoft.com/office/drawing/2010/main" val="0"/>
-              </a:ext>
-            </a:extLst>
-          </a:blip>
-          <a:stretch>
-            <a:fillRect/>
-          </a:stretch>
-        </p:blipFill>
-        <p:spPr>
-          <a:xfrm>
-            <a:off x="4557348" y="5242204"/>
-            <a:ext cx="481011" cy="481011"/>
-          </a:xfrm>
-          <a:prstGeom prst="rect">
-            <a:avLst/>
-          </a:prstGeom>
-        </p:spPr>
-      </p:pic>
-      <p:pic>
-        <p:nvPicPr>
-          <p:cNvPr id="9" name="Picture 8"/>
-          <p:cNvPicPr>
-            <a:picLocks noChangeAspect="1"/>
-          </p:cNvPicPr>
-          <p:nvPr/>
-        </p:nvPicPr>
-        <p:blipFill>
-          <a:blip r:embed="rId10">
-            <a:extLst>
-              <a:ext uri="{28A0092B-C50C-407E-A947-70E740481C1C}">
-                <a14:useLocalDpi xmlns:a14="http://schemas.microsoft.com/office/drawing/2010/main" val="0"/>
-              </a:ext>
-            </a:extLst>
-          </a:blip>
-          <a:stretch>
-            <a:fillRect/>
-          </a:stretch>
-        </p:blipFill>
-        <p:spPr>
-          <a:xfrm>
-            <a:off x="4557348" y="4197748"/>
-            <a:ext cx="470611" cy="470611"/>
-          </a:xfrm>
-          <a:prstGeom prst="rect">
-            <a:avLst/>
-          </a:prstGeom>
-        </p:spPr>
-      </p:pic>
-      <p:pic>
-        <p:nvPicPr>
-          <p:cNvPr id="7" name="Picture 6"/>
-          <p:cNvPicPr>
-            <a:picLocks noChangeAspect="1"/>
-          </p:cNvPicPr>
-          <p:nvPr/>
-        </p:nvPicPr>
-        <p:blipFill>
-          <a:blip r:embed="rId11">
-            <a:extLst>
-              <a:ext uri="{28A0092B-C50C-407E-A947-70E740481C1C}">
-                <a14:useLocalDpi xmlns:a14="http://schemas.microsoft.com/office/drawing/2010/main" val="0"/>
-              </a:ext>
-            </a:extLst>
-          </a:blip>
-          <a:stretch>
-            <a:fillRect/>
-          </a:stretch>
-        </p:blipFill>
-        <p:spPr>
-          <a:xfrm>
-            <a:off x="4537028" y="6116697"/>
-            <a:ext cx="492237" cy="492237"/>
-          </a:xfrm>
-          <a:prstGeom prst="rect">
-            <a:avLst/>
-          </a:prstGeom>
-        </p:spPr>
-      </p:pic>
-    </p:spTree>
-    <p:extLst>
-      <p:ext uri="{BB962C8B-B14F-4D97-AF65-F5344CB8AC3E}">
-        <p14:creationId xmlns:p14="http://schemas.microsoft.com/office/powerpoint/2010/main" val="1389745110"/>
       </p:ext>
     </p:extLst>
   </p:cSld>
@@ -15536,6 +16563,421 @@
             </p:seq>
           </p:childTnLst>
         </p:cTn>
+      </p:par>
+    </p:tnLst>
+  </p:timing>
+</p:sld>
+</file>
+
+<file path=ppt/slides/slide30.xml><?xml version="1.0" encoding="utf-8"?>
+<p:sld xmlns:a="http://schemas.openxmlformats.org/drawingml/2006/main" xmlns:r="http://schemas.openxmlformats.org/officeDocument/2006/relationships" xmlns:p="http://schemas.openxmlformats.org/presentationml/2006/main">
+  <p:cSld>
+    <p:spTree>
+      <p:nvGrpSpPr>
+        <p:cNvPr id="1" name=""/>
+        <p:cNvGrpSpPr/>
+        <p:nvPr/>
+      </p:nvGrpSpPr>
+      <p:grpSpPr>
+        <a:xfrm>
+          <a:off x="0" y="0"/>
+          <a:ext cx="0" cy="0"/>
+          <a:chOff x="0" y="0"/>
+          <a:chExt cx="0" cy="0"/>
+        </a:xfrm>
+      </p:grpSpPr>
+      <p:sp>
+        <p:nvSpPr>
+          <p:cNvPr id="2" name="Title 1"/>
+          <p:cNvSpPr>
+            <a:spLocks noGrp="1"/>
+          </p:cNvSpPr>
+          <p:nvPr>
+            <p:ph type="title"/>
+          </p:nvPr>
+        </p:nvSpPr>
+        <p:spPr>
+          <a:xfrm>
+            <a:off x="962325" y="3092927"/>
+            <a:ext cx="2542068" cy="670067"/>
+          </a:xfrm>
+        </p:spPr>
+        <p:txBody>
+          <a:bodyPr>
+            <a:normAutofit fontScale="90000"/>
+          </a:bodyPr>
+          <a:lstStyle/>
+          <a:p>
+            <a:r>
+              <a:rPr lang="en-US" dirty="0" smtClean="0"/>
+              <a:t>Thank you</a:t>
+            </a:r>
+            <a:br>
+              <a:rPr lang="en-US" dirty="0" smtClean="0"/>
+            </a:br>
+            <a:r>
+              <a:rPr lang="en-US" dirty="0"/>
+              <a:t/>
+            </a:r>
+            <a:br>
+              <a:rPr lang="en-US" dirty="0"/>
+            </a:br>
+            <a:r>
+              <a:rPr lang="en-US" dirty="0"/>
+              <a:t>Q</a:t>
+            </a:r>
+            <a:r>
+              <a:rPr lang="en-US" dirty="0" smtClean="0"/>
+              <a:t> &amp; A</a:t>
+            </a:r>
+            <a:endParaRPr lang="en-US" dirty="0"/>
+          </a:p>
+        </p:txBody>
+      </p:sp>
+      <p:sp>
+        <p:nvSpPr>
+          <p:cNvPr id="3" name="Content Placeholder 2"/>
+          <p:cNvSpPr>
+            <a:spLocks noGrp="1"/>
+          </p:cNvSpPr>
+          <p:nvPr>
+            <p:ph idx="1"/>
+          </p:nvPr>
+        </p:nvSpPr>
+        <p:spPr>
+          <a:xfrm>
+            <a:off x="5324566" y="476070"/>
+            <a:ext cx="6654074" cy="6209210"/>
+          </a:xfrm>
+        </p:spPr>
+        <p:txBody>
+          <a:bodyPr>
+            <a:normAutofit fontScale="25000" lnSpcReduction="20000"/>
+          </a:bodyPr>
+          <a:lstStyle/>
+          <a:p>
+            <a:pPr marL="0" indent="0">
+              <a:lnSpc>
+                <a:spcPct val="320000"/>
+              </a:lnSpc>
+              <a:buNone/>
+            </a:pPr>
+            <a:r>
+              <a:rPr lang="en-US" sz="8000" dirty="0"/>
+              <a:t>praveenraghuvanshi@gmail.com</a:t>
+            </a:r>
+          </a:p>
+          <a:p>
+            <a:pPr marL="0" indent="0">
+              <a:lnSpc>
+                <a:spcPct val="320000"/>
+              </a:lnSpc>
+              <a:buNone/>
+            </a:pPr>
+            <a:r>
+              <a:rPr lang="en-US" sz="8000" dirty="0">
+                <a:hlinkClick r:id="rId2"/>
+              </a:rPr>
+              <a:t>https://</a:t>
+            </a:r>
+            <a:r>
+              <a:rPr lang="en-US" sz="8000" dirty="0" smtClean="0">
+                <a:hlinkClick r:id="rId2"/>
+              </a:rPr>
+              <a:t>in.linkedin.com/in/praveenraghuvanshi</a:t>
+            </a:r>
+            <a:endParaRPr lang="en-US" sz="8000" dirty="0" smtClean="0"/>
+          </a:p>
+          <a:p>
+            <a:pPr marL="0" indent="0">
+              <a:lnSpc>
+                <a:spcPct val="320000"/>
+              </a:lnSpc>
+              <a:buNone/>
+            </a:pPr>
+            <a:r>
+              <a:rPr lang="en-US" sz="8000" dirty="0" smtClean="0">
+                <a:hlinkClick r:id="rId3"/>
+              </a:rPr>
+              <a:t>https</a:t>
+            </a:r>
+            <a:r>
+              <a:rPr lang="en-US" sz="8000" dirty="0">
+                <a:hlinkClick r:id="rId3"/>
+              </a:rPr>
+              <a:t>://</a:t>
+            </a:r>
+            <a:r>
+              <a:rPr lang="en-US" sz="8000" dirty="0" smtClean="0">
+                <a:hlinkClick r:id="rId3"/>
+              </a:rPr>
+              <a:t>github.com/praveenraghuvanshi1512</a:t>
+            </a:r>
+          </a:p>
+          <a:p>
+            <a:pPr marL="0" indent="0">
+              <a:lnSpc>
+                <a:spcPct val="320000"/>
+              </a:lnSpc>
+              <a:buNone/>
+            </a:pPr>
+            <a:r>
+              <a:rPr lang="en-US" sz="8000" dirty="0" smtClean="0">
+                <a:hlinkClick r:id="rId3"/>
+              </a:rPr>
+              <a:t>@</a:t>
+            </a:r>
+            <a:r>
+              <a:rPr lang="en-US" sz="8000" dirty="0" err="1" smtClean="0">
+                <a:hlinkClick r:id="rId3"/>
+              </a:rPr>
+              <a:t>praveenraghuvan</a:t>
+            </a:r>
+            <a:endParaRPr lang="en-US" sz="8000" dirty="0" smtClean="0">
+              <a:hlinkClick r:id="rId3"/>
+            </a:endParaRPr>
+          </a:p>
+          <a:p>
+            <a:pPr marL="0" indent="0">
+              <a:lnSpc>
+                <a:spcPct val="320000"/>
+              </a:lnSpc>
+              <a:buNone/>
+            </a:pPr>
+            <a:r>
+              <a:rPr lang="en-US" sz="8000" dirty="0">
+                <a:hlinkClick r:id="rId4"/>
+              </a:rPr>
+              <a:t>https://</a:t>
+            </a:r>
+            <a:r>
+              <a:rPr lang="en-US" sz="8000" dirty="0" smtClean="0">
+                <a:hlinkClick r:id="rId4"/>
+              </a:rPr>
+              <a:t>www.surveymonkey.com/r/T9TD93G</a:t>
+            </a:r>
+            <a:endParaRPr lang="en-US" sz="8000" dirty="0" smtClean="0"/>
+          </a:p>
+          <a:p>
+            <a:pPr marL="0" indent="0">
+              <a:lnSpc>
+                <a:spcPct val="320000"/>
+              </a:lnSpc>
+              <a:buNone/>
+            </a:pPr>
+            <a:r>
+              <a:rPr lang="en-US" sz="5200" dirty="0">
+                <a:hlinkClick r:id="rId5"/>
+              </a:rPr>
+              <a:t>https://github.com/praveenraghuvanshi1512/AIML/tree/master/Meetup_DotNet_10_Aug_2019</a:t>
+            </a:r>
+            <a:endParaRPr lang="en-US" sz="5200" dirty="0" smtClean="0"/>
+          </a:p>
+          <a:p>
+            <a:pPr marL="0" indent="0">
+              <a:lnSpc>
+                <a:spcPct val="320000"/>
+              </a:lnSpc>
+              <a:buNone/>
+            </a:pPr>
+            <a:endParaRPr lang="en-US" sz="8000" dirty="0" smtClean="0"/>
+          </a:p>
+        </p:txBody>
+      </p:sp>
+      <p:pic>
+        <p:nvPicPr>
+          <p:cNvPr id="4" name="Picture 3"/>
+          <p:cNvPicPr>
+            <a:picLocks noChangeAspect="1"/>
+          </p:cNvPicPr>
+          <p:nvPr/>
+        </p:nvPicPr>
+        <p:blipFill>
+          <a:blip r:embed="rId6">
+            <a:extLst>
+              <a:ext uri="{28A0092B-C50C-407E-A947-70E740481C1C}">
+                <a14:useLocalDpi xmlns:a14="http://schemas.microsoft.com/office/drawing/2010/main" val="0"/>
+              </a:ext>
+            </a:extLst>
+          </a:blip>
+          <a:stretch>
+            <a:fillRect/>
+          </a:stretch>
+        </p:blipFill>
+        <p:spPr>
+          <a:xfrm>
+            <a:off x="4109448" y="745982"/>
+            <a:ext cx="1215118" cy="910349"/>
+          </a:xfrm>
+          <a:prstGeom prst="rect">
+            <a:avLst/>
+          </a:prstGeom>
+        </p:spPr>
+      </p:pic>
+      <p:pic>
+        <p:nvPicPr>
+          <p:cNvPr id="5" name="Picture 4"/>
+          <p:cNvPicPr>
+            <a:picLocks noChangeAspect="1"/>
+          </p:cNvPicPr>
+          <p:nvPr/>
+        </p:nvPicPr>
+        <p:blipFill>
+          <a:blip r:embed="rId7">
+            <a:extLst>
+              <a:ext uri="{28A0092B-C50C-407E-A947-70E740481C1C}">
+                <a14:useLocalDpi xmlns:a14="http://schemas.microsoft.com/office/drawing/2010/main" val="0"/>
+              </a:ext>
+            </a:extLst>
+          </a:blip>
+          <a:stretch>
+            <a:fillRect/>
+          </a:stretch>
+        </p:blipFill>
+        <p:spPr>
+          <a:xfrm>
+            <a:off x="4456989" y="1950042"/>
+            <a:ext cx="580782" cy="580782"/>
+          </a:xfrm>
+          <a:prstGeom prst="rect">
+            <a:avLst/>
+          </a:prstGeom>
+        </p:spPr>
+      </p:pic>
+      <p:pic>
+        <p:nvPicPr>
+          <p:cNvPr id="6" name="Picture 5"/>
+          <p:cNvPicPr>
+            <a:picLocks noChangeAspect="1"/>
+          </p:cNvPicPr>
+          <p:nvPr/>
+        </p:nvPicPr>
+        <p:blipFill>
+          <a:blip r:embed="rId8">
+            <a:extLst>
+              <a:ext uri="{28A0092B-C50C-407E-A947-70E740481C1C}">
+                <a14:useLocalDpi xmlns:a14="http://schemas.microsoft.com/office/drawing/2010/main" val="0"/>
+              </a:ext>
+            </a:extLst>
+          </a:blip>
+          <a:stretch>
+            <a:fillRect/>
+          </a:stretch>
+        </p:blipFill>
+        <p:spPr>
+          <a:xfrm>
+            <a:off x="4537028" y="3123160"/>
+            <a:ext cx="500743" cy="500743"/>
+          </a:xfrm>
+          <a:prstGeom prst="rect">
+            <a:avLst/>
+          </a:prstGeom>
+        </p:spPr>
+      </p:pic>
+      <p:pic>
+        <p:nvPicPr>
+          <p:cNvPr id="8" name="Picture 7"/>
+          <p:cNvPicPr>
+            <a:picLocks noChangeAspect="1"/>
+          </p:cNvPicPr>
+          <p:nvPr/>
+        </p:nvPicPr>
+        <p:blipFill>
+          <a:blip r:embed="rId9">
+            <a:extLst>
+              <a:ext uri="{28A0092B-C50C-407E-A947-70E740481C1C}">
+                <a14:useLocalDpi xmlns:a14="http://schemas.microsoft.com/office/drawing/2010/main" val="0"/>
+              </a:ext>
+            </a:extLst>
+          </a:blip>
+          <a:stretch>
+            <a:fillRect/>
+          </a:stretch>
+        </p:blipFill>
+        <p:spPr>
+          <a:xfrm>
+            <a:off x="4557348" y="5242204"/>
+            <a:ext cx="481011" cy="481011"/>
+          </a:xfrm>
+          <a:prstGeom prst="rect">
+            <a:avLst/>
+          </a:prstGeom>
+        </p:spPr>
+      </p:pic>
+      <p:pic>
+        <p:nvPicPr>
+          <p:cNvPr id="9" name="Picture 8"/>
+          <p:cNvPicPr>
+            <a:picLocks noChangeAspect="1"/>
+          </p:cNvPicPr>
+          <p:nvPr/>
+        </p:nvPicPr>
+        <p:blipFill>
+          <a:blip r:embed="rId10">
+            <a:extLst>
+              <a:ext uri="{28A0092B-C50C-407E-A947-70E740481C1C}">
+                <a14:useLocalDpi xmlns:a14="http://schemas.microsoft.com/office/drawing/2010/main" val="0"/>
+              </a:ext>
+            </a:extLst>
+          </a:blip>
+          <a:stretch>
+            <a:fillRect/>
+          </a:stretch>
+        </p:blipFill>
+        <p:spPr>
+          <a:xfrm>
+            <a:off x="4557348" y="4197748"/>
+            <a:ext cx="470611" cy="470611"/>
+          </a:xfrm>
+          <a:prstGeom prst="rect">
+            <a:avLst/>
+          </a:prstGeom>
+        </p:spPr>
+      </p:pic>
+      <p:pic>
+        <p:nvPicPr>
+          <p:cNvPr id="7" name="Picture 6"/>
+          <p:cNvPicPr>
+            <a:picLocks noChangeAspect="1"/>
+          </p:cNvPicPr>
+          <p:nvPr/>
+        </p:nvPicPr>
+        <p:blipFill>
+          <a:blip r:embed="rId11">
+            <a:extLst>
+              <a:ext uri="{28A0092B-C50C-407E-A947-70E740481C1C}">
+                <a14:useLocalDpi xmlns:a14="http://schemas.microsoft.com/office/drawing/2010/main" val="0"/>
+              </a:ext>
+            </a:extLst>
+          </a:blip>
+          <a:stretch>
+            <a:fillRect/>
+          </a:stretch>
+        </p:blipFill>
+        <p:spPr>
+          <a:xfrm>
+            <a:off x="4537028" y="6116697"/>
+            <a:ext cx="492237" cy="492237"/>
+          </a:xfrm>
+          <a:prstGeom prst="rect">
+            <a:avLst/>
+          </a:prstGeom>
+        </p:spPr>
+      </p:pic>
+    </p:spTree>
+    <p:extLst>
+      <p:ext uri="{BB962C8B-B14F-4D97-AF65-F5344CB8AC3E}">
+        <p14:creationId xmlns:p14="http://schemas.microsoft.com/office/powerpoint/2010/main" val="1389745110"/>
+      </p:ext>
+    </p:extLst>
+  </p:cSld>
+  <p:clrMapOvr>
+    <a:masterClrMapping/>
+  </p:clrMapOvr>
+  <p:timing>
+    <p:tnLst>
+      <p:par>
+        <p:cTn id="1" dur="indefinite" restart="never" nodeType="tmRoot"/>
       </p:par>
     </p:tnLst>
   </p:timing>

</xml_diff>

<commit_message>
Updated PPT to include loading of existing model.
</commit_message>
<xml_diff>
--- a/Meetup_DotNet_10_Aug_2019/ML_Net_Praveen_Raghuvanshi_10_Aug_2019.pptx
+++ b/Meetup_DotNet_10_Aug_2019/ML_Net_Praveen_Raghuvanshi_10_Aug_2019.pptx
@@ -5,7 +5,7 @@
     <p:sldMasterId id="2147483681" r:id="rId1"/>
   </p:sldMasterIdLst>
   <p:notesMasterIdLst>
-    <p:notesMasterId r:id="rId33"/>
+    <p:notesMasterId r:id="rId34"/>
   </p:notesMasterIdLst>
   <p:sldIdLst>
     <p:sldId id="256" r:id="rId2"/>
@@ -35,10 +35,11 @@
     <p:sldId id="284" r:id="rId26"/>
     <p:sldId id="285" r:id="rId27"/>
     <p:sldId id="286" r:id="rId28"/>
-    <p:sldId id="287" r:id="rId29"/>
-    <p:sldId id="276" r:id="rId30"/>
-    <p:sldId id="277" r:id="rId31"/>
-    <p:sldId id="278" r:id="rId32"/>
+    <p:sldId id="288" r:id="rId29"/>
+    <p:sldId id="287" r:id="rId30"/>
+    <p:sldId id="276" r:id="rId31"/>
+    <p:sldId id="277" r:id="rId32"/>
+    <p:sldId id="278" r:id="rId33"/>
   </p:sldIdLst>
   <p:sldSz cx="12192000" cy="6858000"/>
   <p:notesSz cx="6858000" cy="9144000"/>
@@ -5683,7 +5684,7 @@
           <a:p>
             <a:fld id="{154FEC57-6F76-4D9A-BEBF-4431325DB260}" type="datetimeFigureOut">
               <a:rPr lang="en-US" smtClean="0"/>
-              <a:t>8/9/2019</a:t>
+              <a:t>8/10/2019</a:t>
             </a:fld>
             <a:endParaRPr lang="en-US" dirty="0"/>
           </a:p>
@@ -6013,7 +6014,19 @@
           <a:p>
             <a:r>
               <a:rPr lang="en-US" baseline="0" dirty="0" smtClean="0"/>
-              <a:t>Thanks to the organizing members : .Net Community, Anand and DevOn</a:t>
+              <a:t>Thanks to </a:t>
+            </a:r>
+            <a:r>
+              <a:rPr lang="en-US" baseline="0" smtClean="0"/>
+              <a:t>the </a:t>
+            </a:r>
+            <a:r>
+              <a:rPr lang="en-US" baseline="0" smtClean="0"/>
+              <a:t>particip </a:t>
+            </a:r>
+            <a:r>
+              <a:rPr lang="en-US" baseline="0" dirty="0" smtClean="0"/>
+              <a:t>members : .Net Community, Anand and DevOn</a:t>
             </a:r>
           </a:p>
           <a:p>
@@ -6153,7 +6166,7 @@
           <a:p>
             <a:fld id="{55849CEA-452E-49F3-92ED-210B64DD3C6C}" type="slidenum">
               <a:rPr lang="en-US" smtClean="0"/>
-              <a:t>26</a:t>
+              <a:t>24</a:t>
             </a:fld>
             <a:endParaRPr lang="en-US" dirty="0"/>
           </a:p>
@@ -6162,7 +6175,7 @@
     </p:spTree>
     <p:extLst>
       <p:ext uri="{BB962C8B-B14F-4D97-AF65-F5344CB8AC3E}">
-        <p14:creationId xmlns:p14="http://schemas.microsoft.com/office/powerpoint/2010/main" val="1656176896"/>
+        <p14:creationId xmlns:p14="http://schemas.microsoft.com/office/powerpoint/2010/main" val="3363331460"/>
       </p:ext>
     </p:extLst>
   </p:cSld>
@@ -6218,8 +6231,14 @@
           <a:p>
             <a:r>
               <a:rPr lang="en-US" dirty="0" smtClean="0"/>
-              <a:t>Predict for a single passenger</a:t>
-            </a:r>
+              <a:t>1. Evaluate on Test</a:t>
+            </a:r>
+            <a:r>
+              <a:rPr lang="en-US" baseline="0" dirty="0" smtClean="0"/>
+              <a:t> data</a:t>
+            </a:r>
+          </a:p>
+          <a:p>
             <a:endParaRPr lang="en-US" dirty="0"/>
           </a:p>
         </p:txBody>
@@ -6241,7 +6260,7 @@
           <a:p>
             <a:fld id="{55849CEA-452E-49F3-92ED-210B64DD3C6C}" type="slidenum">
               <a:rPr lang="en-US" smtClean="0"/>
-              <a:t>27</a:t>
+              <a:t>25</a:t>
             </a:fld>
             <a:endParaRPr lang="en-US" dirty="0"/>
           </a:p>
@@ -6250,7 +6269,7 @@
     </p:spTree>
     <p:extLst>
       <p:ext uri="{BB962C8B-B14F-4D97-AF65-F5344CB8AC3E}">
-        <p14:creationId xmlns:p14="http://schemas.microsoft.com/office/powerpoint/2010/main" val="2075469643"/>
+        <p14:creationId xmlns:p14="http://schemas.microsoft.com/office/powerpoint/2010/main" val="1699759432"/>
       </p:ext>
     </p:extLst>
   </p:cSld>
@@ -6306,51 +6325,8 @@
           <a:p>
             <a:r>
               <a:rPr lang="en-US" dirty="0" smtClean="0"/>
-              <a:t>- Auto ML comparison</a:t>
-            </a:r>
-          </a:p>
-          <a:p>
-            <a:pPr marL="171450" indent="-171450">
-              <a:buFontTx/>
-              <a:buChar char="-"/>
-            </a:pPr>
-            <a:r>
-              <a:rPr lang="en-US" dirty="0" smtClean="0"/>
-              <a:t>Execute command </a:t>
-            </a:r>
-          </a:p>
-          <a:p>
-            <a:pPr marL="171450" marR="0" lvl="0" indent="-171450" algn="l" defTabSz="914400" rtl="0" eaLnBrk="1" fontAlgn="auto" latinLnBrk="0" hangingPunct="1">
-              <a:lnSpc>
-                <a:spcPct val="100000"/>
-              </a:lnSpc>
-              <a:spcBef>
-                <a:spcPts val="0"/>
-              </a:spcBef>
-              <a:spcAft>
-                <a:spcPts val="0"/>
-              </a:spcAft>
-              <a:buClrTx/>
-              <a:buSzTx/>
-              <a:buFontTx/>
-              <a:buChar char="-"/>
-              <a:tabLst/>
-              <a:defRPr/>
-            </a:pPr>
-            <a:r>
-              <a:rPr lang="en-US" dirty="0" err="1" smtClean="0"/>
-              <a:t>mlnet</a:t>
-            </a:r>
-            <a:r>
-              <a:rPr lang="en-US" dirty="0" smtClean="0"/>
-              <a:t> auto-train --task binary-classification --dataset "titanic.csv" --label-column-index 0 --has-header true --max-exploration-time 30</a:t>
-            </a:r>
-          </a:p>
-          <a:p>
-            <a:pPr marL="171450" indent="-171450">
-              <a:buFontTx/>
-              <a:buChar char="-"/>
-            </a:pPr>
+              <a:t>1. Choose algorithm : Binary classification </a:t>
+            </a:r>
             <a:endParaRPr lang="en-US" dirty="0"/>
           </a:p>
         </p:txBody>
@@ -6372,7 +6348,7 @@
           <a:p>
             <a:fld id="{55849CEA-452E-49F3-92ED-210B64DD3C6C}" type="slidenum">
               <a:rPr lang="en-US" smtClean="0"/>
-              <a:t>28</a:t>
+              <a:t>26</a:t>
             </a:fld>
             <a:endParaRPr lang="en-US" dirty="0"/>
           </a:p>
@@ -6381,7 +6357,7 @@
     </p:spTree>
     <p:extLst>
       <p:ext uri="{BB962C8B-B14F-4D97-AF65-F5344CB8AC3E}">
-        <p14:creationId xmlns:p14="http://schemas.microsoft.com/office/powerpoint/2010/main" val="1931978529"/>
+        <p14:creationId xmlns:p14="http://schemas.microsoft.com/office/powerpoint/2010/main" val="1656176896"/>
       </p:ext>
     </p:extLst>
   </p:cSld>
@@ -6435,222 +6411,11 @@
           <a:bodyPr/>
           <a:lstStyle/>
           <a:p>
-            <a:pPr rtl="0"/>
-            <a:r>
-              <a:rPr lang="en-US" sz="1200" b="0" i="0" u="none" strike="noStrike" kern="1200" dirty="0" smtClean="0">
-                <a:solidFill>
-                  <a:schemeClr val="tx1"/>
-                </a:solidFill>
-                <a:effectLst/>
-                <a:latin typeface="+mn-lt"/>
-                <a:ea typeface="+mn-ea"/>
-                <a:cs typeface="+mn-cs"/>
-              </a:rPr>
-              <a:t>We are going to have a Photo-Search application. </a:t>
-            </a:r>
-            <a:endParaRPr lang="en-US" b="0" dirty="0" smtClean="0">
-              <a:effectLst/>
-            </a:endParaRPr>
-          </a:p>
-          <a:p>
-            <a:pPr rtl="0"/>
-            <a:r>
-              <a:rPr lang="en-US" sz="1200" b="0" i="0" u="none" strike="noStrike" kern="1200" dirty="0" smtClean="0">
-                <a:solidFill>
-                  <a:schemeClr val="tx1"/>
-                </a:solidFill>
-                <a:effectLst/>
-                <a:latin typeface="+mn-lt"/>
-                <a:ea typeface="+mn-ea"/>
-                <a:cs typeface="+mn-cs"/>
-              </a:rPr>
-              <a:t>It takes a model developed using Keras and converted to ONNX format</a:t>
-            </a:r>
-            <a:endParaRPr lang="en-US" b="0" dirty="0" smtClean="0">
-              <a:effectLst/>
-            </a:endParaRPr>
-          </a:p>
-          <a:p>
-            <a:pPr rtl="0"/>
-            <a:r>
-              <a:rPr lang="en-US" b="0" dirty="0" smtClean="0">
-                <a:effectLst/>
-              </a:rPr>
-              <a:t/>
-            </a:r>
-            <a:br>
-              <a:rPr lang="en-US" b="0" dirty="0" smtClean="0">
-                <a:effectLst/>
-              </a:rPr>
-            </a:br>
-            <a:r>
-              <a:rPr lang="en-US" sz="1200" b="0" i="0" u="none" strike="noStrike" kern="1200" dirty="0" smtClean="0">
-                <a:solidFill>
-                  <a:schemeClr val="tx1"/>
-                </a:solidFill>
-                <a:effectLst/>
-                <a:latin typeface="+mn-lt"/>
-                <a:ea typeface="+mn-ea"/>
-                <a:cs typeface="+mn-cs"/>
-              </a:rPr>
-              <a:t>Display onnx file in NETRON located at D:\Praveen\Personal\Technical\AI_ML\ML.Net\Meetup 29 June 2019\Demo\MLDemoMeetup\PhotoSearchDemo\PhotoSearchNetCore3\model.onnx</a:t>
-            </a:r>
-            <a:endParaRPr lang="en-US" b="0" dirty="0" smtClean="0">
-              <a:effectLst/>
-            </a:endParaRPr>
-          </a:p>
-          <a:p>
-            <a:pPr rtl="0"/>
-            <a:r>
-              <a:rPr lang="en-US" b="0" dirty="0" smtClean="0">
-                <a:effectLst/>
-              </a:rPr>
-              <a:t/>
-            </a:r>
-            <a:br>
-              <a:rPr lang="en-US" b="0" dirty="0" smtClean="0">
-                <a:effectLst/>
-              </a:rPr>
-            </a:br>
-            <a:r>
-              <a:rPr lang="en-US" sz="1200" b="0" i="0" u="none" strike="noStrike" kern="1200" dirty="0" smtClean="0">
-                <a:solidFill>
-                  <a:schemeClr val="tx1"/>
-                </a:solidFill>
-                <a:effectLst/>
-                <a:latin typeface="+mn-lt"/>
-                <a:ea typeface="+mn-ea"/>
-                <a:cs typeface="+mn-cs"/>
-              </a:rPr>
-              <a:t>1. Run PhotoSearchNetCore3 project </a:t>
-            </a:r>
-            <a:endParaRPr lang="en-US" b="0" dirty="0" smtClean="0">
-              <a:effectLst/>
-            </a:endParaRPr>
-          </a:p>
-          <a:p>
-            <a:pPr rtl="0"/>
-            <a:r>
-              <a:rPr lang="en-US" sz="1200" b="0" i="0" u="none" strike="noStrike" kern="1200" dirty="0" smtClean="0">
-                <a:solidFill>
-                  <a:schemeClr val="tx1"/>
-                </a:solidFill>
-                <a:effectLst/>
-                <a:latin typeface="+mn-lt"/>
-                <a:ea typeface="+mn-ea"/>
-                <a:cs typeface="+mn-cs"/>
-              </a:rPr>
-              <a:t>2. Select ALL and click Search : Display all items within folder</a:t>
-            </a:r>
-            <a:endParaRPr lang="en-US" b="0" dirty="0" smtClean="0">
-              <a:effectLst/>
-            </a:endParaRPr>
-          </a:p>
-          <a:p>
-            <a:pPr rtl="0"/>
-            <a:r>
-              <a:rPr lang="en-US" sz="1200" b="0" i="0" u="none" strike="noStrike" kern="1200" dirty="0" smtClean="0">
-                <a:solidFill>
-                  <a:schemeClr val="tx1"/>
-                </a:solidFill>
-                <a:effectLst/>
-                <a:latin typeface="+mn-lt"/>
-                <a:ea typeface="+mn-ea"/>
-                <a:cs typeface="+mn-cs"/>
-              </a:rPr>
-              <a:t>3. Select Cat and select items</a:t>
-            </a:r>
-            <a:endParaRPr lang="en-US" b="0" dirty="0" smtClean="0">
-              <a:effectLst/>
-            </a:endParaRPr>
-          </a:p>
-          <a:p>
-            <a:pPr rtl="0"/>
-            <a:r>
-              <a:rPr lang="en-US" sz="1200" b="0" i="0" u="none" strike="noStrike" kern="1200" dirty="0" smtClean="0">
-                <a:solidFill>
-                  <a:schemeClr val="tx1"/>
-                </a:solidFill>
-                <a:effectLst/>
-                <a:latin typeface="+mn-lt"/>
-                <a:ea typeface="+mn-ea"/>
-                <a:cs typeface="+mn-cs"/>
-              </a:rPr>
-              <a:t>4. Stop application</a:t>
-            </a:r>
-            <a:endParaRPr lang="en-US" b="0" dirty="0" smtClean="0">
-              <a:effectLst/>
-            </a:endParaRPr>
-          </a:p>
-          <a:p>
-            <a:pPr rtl="0"/>
-            <a:r>
-              <a:rPr lang="en-US" sz="1200" b="0" i="0" u="none" strike="noStrike" kern="1200" dirty="0" smtClean="0">
-                <a:solidFill>
-                  <a:schemeClr val="tx1"/>
-                </a:solidFill>
-                <a:effectLst/>
-                <a:latin typeface="+mn-lt"/>
-                <a:ea typeface="+mn-ea"/>
-                <a:cs typeface="+mn-cs"/>
-              </a:rPr>
-              <a:t>5. Google horse image and save it to d:\temp\photos</a:t>
-            </a:r>
-            <a:endParaRPr lang="en-US" b="0" dirty="0" smtClean="0">
-              <a:effectLst/>
-            </a:endParaRPr>
-          </a:p>
-          <a:p>
-            <a:pPr rtl="0"/>
-            <a:r>
-              <a:rPr lang="en-US" sz="1200" b="0" i="0" u="none" strike="noStrike" kern="1200" dirty="0" smtClean="0">
-                <a:solidFill>
-                  <a:schemeClr val="tx1"/>
-                </a:solidFill>
-                <a:effectLst/>
-                <a:latin typeface="+mn-lt"/>
-                <a:ea typeface="+mn-ea"/>
-                <a:cs typeface="+mn-cs"/>
-              </a:rPr>
-              <a:t>5. Start app and search for horse</a:t>
-            </a:r>
-            <a:endParaRPr lang="en-US" b="0" dirty="0" smtClean="0">
-              <a:effectLst/>
-            </a:endParaRPr>
-          </a:p>
-          <a:p>
-            <a:pPr rtl="0"/>
-            <a:r>
-              <a:rPr lang="en-US" sz="1200" b="0" i="0" u="none" strike="noStrike" kern="1200" dirty="0" smtClean="0">
-                <a:solidFill>
-                  <a:schemeClr val="tx1"/>
-                </a:solidFill>
-                <a:effectLst/>
-                <a:latin typeface="+mn-lt"/>
-                <a:ea typeface="+mn-ea"/>
-                <a:cs typeface="+mn-cs"/>
-              </a:rPr>
-              <a:t> </a:t>
-            </a:r>
-            <a:endParaRPr lang="en-US" b="0" dirty="0" smtClean="0">
-              <a:effectLst/>
-            </a:endParaRPr>
-          </a:p>
-          <a:p>
-            <a:r>
-              <a:rPr lang="en-US" b="0" dirty="0" smtClean="0">
-                <a:effectLst/>
-              </a:rPr>
-              <a:t/>
-            </a:r>
-            <a:br>
-              <a:rPr lang="en-US" b="0" dirty="0" smtClean="0">
-                <a:effectLst/>
-              </a:rPr>
-            </a:br>
-            <a:endParaRPr lang="en-US" b="0" dirty="0" smtClean="0">
-              <a:effectLst/>
-            </a:endParaRPr>
+            <a:r>
+              <a:rPr lang="en-US" dirty="0" smtClean="0"/>
+              <a:t>Predict for a single passenger</a:t>
+            </a:r>
+            <a:endParaRPr lang="en-US" dirty="0"/>
           </a:p>
         </p:txBody>
       </p:sp>
@@ -6671,7 +6436,525 @@
           <a:p>
             <a:fld id="{55849CEA-452E-49F3-92ED-210B64DD3C6C}" type="slidenum">
               <a:rPr lang="en-US" smtClean="0"/>
+              <a:t>27</a:t>
+            </a:fld>
+            <a:endParaRPr lang="en-US" dirty="0"/>
+          </a:p>
+        </p:txBody>
+      </p:sp>
+    </p:spTree>
+    <p:extLst>
+      <p:ext uri="{BB962C8B-B14F-4D97-AF65-F5344CB8AC3E}">
+        <p14:creationId xmlns:p14="http://schemas.microsoft.com/office/powerpoint/2010/main" val="2075469643"/>
+      </p:ext>
+    </p:extLst>
+  </p:cSld>
+  <p:clrMapOvr>
+    <a:masterClrMapping/>
+  </p:clrMapOvr>
+</p:notes>
+</file>
+
+<file path=ppt/notesSlides/notesSlide14.xml><?xml version="1.0" encoding="utf-8"?>
+<p:notes xmlns:a="http://schemas.openxmlformats.org/drawingml/2006/main" xmlns:r="http://schemas.openxmlformats.org/officeDocument/2006/relationships" xmlns:p="http://schemas.openxmlformats.org/presentationml/2006/main">
+  <p:cSld>
+    <p:spTree>
+      <p:nvGrpSpPr>
+        <p:cNvPr id="1" name=""/>
+        <p:cNvGrpSpPr/>
+        <p:nvPr/>
+      </p:nvGrpSpPr>
+      <p:grpSpPr>
+        <a:xfrm>
+          <a:off x="0" y="0"/>
+          <a:ext cx="0" cy="0"/>
+          <a:chOff x="0" y="0"/>
+          <a:chExt cx="0" cy="0"/>
+        </a:xfrm>
+      </p:grpSpPr>
+      <p:sp>
+        <p:nvSpPr>
+          <p:cNvPr id="2" name="Slide Image Placeholder 1"/>
+          <p:cNvSpPr>
+            <a:spLocks noGrp="1" noRot="1" noChangeAspect="1"/>
+          </p:cNvSpPr>
+          <p:nvPr>
+            <p:ph type="sldImg"/>
+          </p:nvPr>
+        </p:nvSpPr>
+        <p:spPr/>
+      </p:sp>
+      <p:sp>
+        <p:nvSpPr>
+          <p:cNvPr id="3" name="Notes Placeholder 2"/>
+          <p:cNvSpPr>
+            <a:spLocks noGrp="1"/>
+          </p:cNvSpPr>
+          <p:nvPr>
+            <p:ph type="body" idx="1"/>
+          </p:nvPr>
+        </p:nvSpPr>
+        <p:spPr/>
+        <p:txBody>
+          <a:bodyPr/>
+          <a:lstStyle/>
+          <a:p>
+            <a:r>
+              <a:rPr lang="en-US" dirty="0" smtClean="0"/>
+              <a:t>Load a model</a:t>
+            </a:r>
+            <a:endParaRPr lang="en-US" dirty="0"/>
+          </a:p>
+        </p:txBody>
+      </p:sp>
+      <p:sp>
+        <p:nvSpPr>
+          <p:cNvPr id="4" name="Slide Number Placeholder 3"/>
+          <p:cNvSpPr>
+            <a:spLocks noGrp="1"/>
+          </p:cNvSpPr>
+          <p:nvPr>
+            <p:ph type="sldNum" sz="quarter" idx="10"/>
+          </p:nvPr>
+        </p:nvSpPr>
+        <p:spPr/>
+        <p:txBody>
+          <a:bodyPr/>
+          <a:lstStyle/>
+          <a:p>
+            <a:fld id="{55849CEA-452E-49F3-92ED-210B64DD3C6C}" type="slidenum">
+              <a:rPr lang="en-US" smtClean="0"/>
+              <a:t>28</a:t>
+            </a:fld>
+            <a:endParaRPr lang="en-US" dirty="0"/>
+          </a:p>
+        </p:txBody>
+      </p:sp>
+    </p:spTree>
+    <p:extLst>
+      <p:ext uri="{BB962C8B-B14F-4D97-AF65-F5344CB8AC3E}">
+        <p14:creationId xmlns:p14="http://schemas.microsoft.com/office/powerpoint/2010/main" val="1517850410"/>
+      </p:ext>
+    </p:extLst>
+  </p:cSld>
+  <p:clrMapOvr>
+    <a:masterClrMapping/>
+  </p:clrMapOvr>
+</p:notes>
+</file>
+
+<file path=ppt/notesSlides/notesSlide15.xml><?xml version="1.0" encoding="utf-8"?>
+<p:notes xmlns:a="http://schemas.openxmlformats.org/drawingml/2006/main" xmlns:r="http://schemas.openxmlformats.org/officeDocument/2006/relationships" xmlns:p="http://schemas.openxmlformats.org/presentationml/2006/main">
+  <p:cSld>
+    <p:spTree>
+      <p:nvGrpSpPr>
+        <p:cNvPr id="1" name=""/>
+        <p:cNvGrpSpPr/>
+        <p:nvPr/>
+      </p:nvGrpSpPr>
+      <p:grpSpPr>
+        <a:xfrm>
+          <a:off x="0" y="0"/>
+          <a:ext cx="0" cy="0"/>
+          <a:chOff x="0" y="0"/>
+          <a:chExt cx="0" cy="0"/>
+        </a:xfrm>
+      </p:grpSpPr>
+      <p:sp>
+        <p:nvSpPr>
+          <p:cNvPr id="2" name="Slide Image Placeholder 1"/>
+          <p:cNvSpPr>
+            <a:spLocks noGrp="1" noRot="1" noChangeAspect="1"/>
+          </p:cNvSpPr>
+          <p:nvPr>
+            <p:ph type="sldImg"/>
+          </p:nvPr>
+        </p:nvSpPr>
+        <p:spPr/>
+      </p:sp>
+      <p:sp>
+        <p:nvSpPr>
+          <p:cNvPr id="3" name="Notes Placeholder 2"/>
+          <p:cNvSpPr>
+            <a:spLocks noGrp="1"/>
+          </p:cNvSpPr>
+          <p:nvPr>
+            <p:ph type="body" idx="1"/>
+          </p:nvPr>
+        </p:nvSpPr>
+        <p:spPr/>
+        <p:txBody>
+          <a:bodyPr/>
+          <a:lstStyle/>
+          <a:p>
+            <a:r>
+              <a:rPr lang="en-US" dirty="0" smtClean="0"/>
+              <a:t>- Auto ML comparison</a:t>
+            </a:r>
+          </a:p>
+          <a:p>
+            <a:pPr marL="171450" indent="-171450">
+              <a:buFontTx/>
+              <a:buChar char="-"/>
+            </a:pPr>
+            <a:r>
+              <a:rPr lang="en-US" dirty="0" smtClean="0"/>
+              <a:t>Execute command </a:t>
+            </a:r>
+          </a:p>
+          <a:p>
+            <a:pPr marL="171450" marR="0" lvl="0" indent="-171450" algn="l" defTabSz="914400" rtl="0" eaLnBrk="1" fontAlgn="auto" latinLnBrk="0" hangingPunct="1">
+              <a:lnSpc>
+                <a:spcPct val="100000"/>
+              </a:lnSpc>
+              <a:spcBef>
+                <a:spcPts val="0"/>
+              </a:spcBef>
+              <a:spcAft>
+                <a:spcPts val="0"/>
+              </a:spcAft>
+              <a:buClrTx/>
+              <a:buSzTx/>
+              <a:buFontTx/>
+              <a:buChar char="-"/>
+              <a:tabLst/>
+              <a:defRPr/>
+            </a:pPr>
+            <a:r>
+              <a:rPr lang="en-US" dirty="0" err="1" smtClean="0"/>
+              <a:t>mlnet</a:t>
+            </a:r>
+            <a:r>
+              <a:rPr lang="en-US" dirty="0" smtClean="0"/>
+              <a:t> auto-train --task binary-classification --dataset "titanic.csv" --label-column-index 0 --has-header true --max-exploration-time 30</a:t>
+            </a:r>
+          </a:p>
+          <a:p>
+            <a:pPr marL="171450" indent="-171450">
+              <a:buFontTx/>
+              <a:buChar char="-"/>
+            </a:pPr>
+            <a:endParaRPr lang="en-US" dirty="0"/>
+          </a:p>
+        </p:txBody>
+      </p:sp>
+      <p:sp>
+        <p:nvSpPr>
+          <p:cNvPr id="4" name="Slide Number Placeholder 3"/>
+          <p:cNvSpPr>
+            <a:spLocks noGrp="1"/>
+          </p:cNvSpPr>
+          <p:nvPr>
+            <p:ph type="sldNum" sz="quarter" idx="10"/>
+          </p:nvPr>
+        </p:nvSpPr>
+        <p:spPr/>
+        <p:txBody>
+          <a:bodyPr/>
+          <a:lstStyle/>
+          <a:p>
+            <a:fld id="{55849CEA-452E-49F3-92ED-210B64DD3C6C}" type="slidenum">
+              <a:rPr lang="en-US" smtClean="0"/>
               <a:t>29</a:t>
+            </a:fld>
+            <a:endParaRPr lang="en-US" dirty="0"/>
+          </a:p>
+        </p:txBody>
+      </p:sp>
+    </p:spTree>
+    <p:extLst>
+      <p:ext uri="{BB962C8B-B14F-4D97-AF65-F5344CB8AC3E}">
+        <p14:creationId xmlns:p14="http://schemas.microsoft.com/office/powerpoint/2010/main" val="1931978529"/>
+      </p:ext>
+    </p:extLst>
+  </p:cSld>
+  <p:clrMapOvr>
+    <a:masterClrMapping/>
+  </p:clrMapOvr>
+</p:notes>
+</file>
+
+<file path=ppt/notesSlides/notesSlide16.xml><?xml version="1.0" encoding="utf-8"?>
+<p:notes xmlns:a="http://schemas.openxmlformats.org/drawingml/2006/main" xmlns:r="http://schemas.openxmlformats.org/officeDocument/2006/relationships" xmlns:p="http://schemas.openxmlformats.org/presentationml/2006/main">
+  <p:cSld>
+    <p:spTree>
+      <p:nvGrpSpPr>
+        <p:cNvPr id="1" name=""/>
+        <p:cNvGrpSpPr/>
+        <p:nvPr/>
+      </p:nvGrpSpPr>
+      <p:grpSpPr>
+        <a:xfrm>
+          <a:off x="0" y="0"/>
+          <a:ext cx="0" cy="0"/>
+          <a:chOff x="0" y="0"/>
+          <a:chExt cx="0" cy="0"/>
+        </a:xfrm>
+      </p:grpSpPr>
+      <p:sp>
+        <p:nvSpPr>
+          <p:cNvPr id="2" name="Slide Image Placeholder 1"/>
+          <p:cNvSpPr>
+            <a:spLocks noGrp="1" noRot="1" noChangeAspect="1"/>
+          </p:cNvSpPr>
+          <p:nvPr>
+            <p:ph type="sldImg"/>
+          </p:nvPr>
+        </p:nvSpPr>
+        <p:spPr/>
+      </p:sp>
+      <p:sp>
+        <p:nvSpPr>
+          <p:cNvPr id="3" name="Notes Placeholder 2"/>
+          <p:cNvSpPr>
+            <a:spLocks noGrp="1"/>
+          </p:cNvSpPr>
+          <p:nvPr>
+            <p:ph type="body" idx="1"/>
+          </p:nvPr>
+        </p:nvSpPr>
+        <p:spPr/>
+        <p:txBody>
+          <a:bodyPr/>
+          <a:lstStyle/>
+          <a:p>
+            <a:pPr rtl="0"/>
+            <a:r>
+              <a:rPr lang="en-US" sz="1200" b="0" i="0" u="none" strike="noStrike" kern="1200" dirty="0" smtClean="0">
+                <a:solidFill>
+                  <a:schemeClr val="tx1"/>
+                </a:solidFill>
+                <a:effectLst/>
+                <a:latin typeface="+mn-lt"/>
+                <a:ea typeface="+mn-ea"/>
+                <a:cs typeface="+mn-cs"/>
+              </a:rPr>
+              <a:t>We are going to have a Photo-Search application. </a:t>
+            </a:r>
+            <a:endParaRPr lang="en-US" b="0" dirty="0" smtClean="0">
+              <a:effectLst/>
+            </a:endParaRPr>
+          </a:p>
+          <a:p>
+            <a:pPr rtl="0"/>
+            <a:r>
+              <a:rPr lang="en-US" sz="1200" b="0" i="0" u="none" strike="noStrike" kern="1200" dirty="0" smtClean="0">
+                <a:solidFill>
+                  <a:schemeClr val="tx1"/>
+                </a:solidFill>
+                <a:effectLst/>
+                <a:latin typeface="+mn-lt"/>
+                <a:ea typeface="+mn-ea"/>
+                <a:cs typeface="+mn-cs"/>
+              </a:rPr>
+              <a:t>It takes a model developed using Keras and converted to ONNX format</a:t>
+            </a:r>
+            <a:endParaRPr lang="en-US" b="0" dirty="0" smtClean="0">
+              <a:effectLst/>
+            </a:endParaRPr>
+          </a:p>
+          <a:p>
+            <a:pPr rtl="0"/>
+            <a:r>
+              <a:rPr lang="en-US" b="0" dirty="0" smtClean="0">
+                <a:effectLst/>
+              </a:rPr>
+              <a:t/>
+            </a:r>
+            <a:br>
+              <a:rPr lang="en-US" b="0" dirty="0" smtClean="0">
+                <a:effectLst/>
+              </a:rPr>
+            </a:br>
+            <a:r>
+              <a:rPr lang="en-US" sz="1200" b="0" i="0" u="none" strike="noStrike" kern="1200" dirty="0" smtClean="0">
+                <a:solidFill>
+                  <a:schemeClr val="tx1"/>
+                </a:solidFill>
+                <a:effectLst/>
+                <a:latin typeface="+mn-lt"/>
+                <a:ea typeface="+mn-ea"/>
+                <a:cs typeface="+mn-cs"/>
+              </a:rPr>
+              <a:t>Display onnx file in NETRON located at D:\Praveen\Personal\Technical\AI_ML\ML.Net\Meetup 29 June 2019\Demo\MLDemoMeetup\PhotoSearchDemo\PhotoSearchNetCore3\model.onnx</a:t>
+            </a:r>
+            <a:endParaRPr lang="en-US" b="0" dirty="0" smtClean="0">
+              <a:effectLst/>
+            </a:endParaRPr>
+          </a:p>
+          <a:p>
+            <a:pPr rtl="0"/>
+            <a:r>
+              <a:rPr lang="en-US" b="0" dirty="0" smtClean="0">
+                <a:effectLst/>
+              </a:rPr>
+              <a:t/>
+            </a:r>
+            <a:br>
+              <a:rPr lang="en-US" b="0" dirty="0" smtClean="0">
+                <a:effectLst/>
+              </a:rPr>
+            </a:br>
+            <a:r>
+              <a:rPr lang="en-US" sz="1200" b="0" i="0" u="none" strike="noStrike" kern="1200" dirty="0" smtClean="0">
+                <a:solidFill>
+                  <a:schemeClr val="tx1"/>
+                </a:solidFill>
+                <a:effectLst/>
+                <a:latin typeface="+mn-lt"/>
+                <a:ea typeface="+mn-ea"/>
+                <a:cs typeface="+mn-cs"/>
+              </a:rPr>
+              <a:t>1. Run PhotoSearchNetCore3 project </a:t>
+            </a:r>
+            <a:endParaRPr lang="en-US" b="0" dirty="0" smtClean="0">
+              <a:effectLst/>
+            </a:endParaRPr>
+          </a:p>
+          <a:p>
+            <a:pPr rtl="0"/>
+            <a:r>
+              <a:rPr lang="en-US" sz="1200" b="0" i="0" u="none" strike="noStrike" kern="1200" dirty="0" smtClean="0">
+                <a:solidFill>
+                  <a:schemeClr val="tx1"/>
+                </a:solidFill>
+                <a:effectLst/>
+                <a:latin typeface="+mn-lt"/>
+                <a:ea typeface="+mn-ea"/>
+                <a:cs typeface="+mn-cs"/>
+              </a:rPr>
+              <a:t>2. Select ALL and click Search : Display all items within folder</a:t>
+            </a:r>
+            <a:endParaRPr lang="en-US" b="0" dirty="0" smtClean="0">
+              <a:effectLst/>
+            </a:endParaRPr>
+          </a:p>
+          <a:p>
+            <a:pPr rtl="0"/>
+            <a:r>
+              <a:rPr lang="en-US" sz="1200" b="0" i="0" u="none" strike="noStrike" kern="1200" dirty="0" smtClean="0">
+                <a:solidFill>
+                  <a:schemeClr val="tx1"/>
+                </a:solidFill>
+                <a:effectLst/>
+                <a:latin typeface="+mn-lt"/>
+                <a:ea typeface="+mn-ea"/>
+                <a:cs typeface="+mn-cs"/>
+              </a:rPr>
+              <a:t>3. Select Cat and select items</a:t>
+            </a:r>
+            <a:endParaRPr lang="en-US" b="0" dirty="0" smtClean="0">
+              <a:effectLst/>
+            </a:endParaRPr>
+          </a:p>
+          <a:p>
+            <a:pPr rtl="0"/>
+            <a:r>
+              <a:rPr lang="en-US" sz="1200" b="0" i="0" u="none" strike="noStrike" kern="1200" dirty="0" smtClean="0">
+                <a:solidFill>
+                  <a:schemeClr val="tx1"/>
+                </a:solidFill>
+                <a:effectLst/>
+                <a:latin typeface="+mn-lt"/>
+                <a:ea typeface="+mn-ea"/>
+                <a:cs typeface="+mn-cs"/>
+              </a:rPr>
+              <a:t>4. Stop application</a:t>
+            </a:r>
+            <a:endParaRPr lang="en-US" b="0" dirty="0" smtClean="0">
+              <a:effectLst/>
+            </a:endParaRPr>
+          </a:p>
+          <a:p>
+            <a:pPr rtl="0"/>
+            <a:r>
+              <a:rPr lang="en-US" sz="1200" b="0" i="0" u="none" strike="noStrike" kern="1200" dirty="0" smtClean="0">
+                <a:solidFill>
+                  <a:schemeClr val="tx1"/>
+                </a:solidFill>
+                <a:effectLst/>
+                <a:latin typeface="+mn-lt"/>
+                <a:ea typeface="+mn-ea"/>
+                <a:cs typeface="+mn-cs"/>
+              </a:rPr>
+              <a:t>5. Google horse image and save it to d:\temp\photos</a:t>
+            </a:r>
+            <a:endParaRPr lang="en-US" b="0" dirty="0" smtClean="0">
+              <a:effectLst/>
+            </a:endParaRPr>
+          </a:p>
+          <a:p>
+            <a:pPr rtl="0"/>
+            <a:r>
+              <a:rPr lang="en-US" sz="1200" b="0" i="0" u="none" strike="noStrike" kern="1200" dirty="0" smtClean="0">
+                <a:solidFill>
+                  <a:schemeClr val="tx1"/>
+                </a:solidFill>
+                <a:effectLst/>
+                <a:latin typeface="+mn-lt"/>
+                <a:ea typeface="+mn-ea"/>
+                <a:cs typeface="+mn-cs"/>
+              </a:rPr>
+              <a:t>5. Start app and search for horse</a:t>
+            </a:r>
+            <a:endParaRPr lang="en-US" b="0" dirty="0" smtClean="0">
+              <a:effectLst/>
+            </a:endParaRPr>
+          </a:p>
+          <a:p>
+            <a:pPr rtl="0"/>
+            <a:r>
+              <a:rPr lang="en-US" sz="1200" b="0" i="0" u="none" strike="noStrike" kern="1200" dirty="0" smtClean="0">
+                <a:solidFill>
+                  <a:schemeClr val="tx1"/>
+                </a:solidFill>
+                <a:effectLst/>
+                <a:latin typeface="+mn-lt"/>
+                <a:ea typeface="+mn-ea"/>
+                <a:cs typeface="+mn-cs"/>
+              </a:rPr>
+              <a:t> </a:t>
+            </a:r>
+            <a:endParaRPr lang="en-US" b="0" dirty="0" smtClean="0">
+              <a:effectLst/>
+            </a:endParaRPr>
+          </a:p>
+          <a:p>
+            <a:r>
+              <a:rPr lang="en-US" b="0" dirty="0" smtClean="0">
+                <a:effectLst/>
+              </a:rPr>
+              <a:t/>
+            </a:r>
+            <a:br>
+              <a:rPr lang="en-US" b="0" dirty="0" smtClean="0">
+                <a:effectLst/>
+              </a:rPr>
+            </a:br>
+            <a:endParaRPr lang="en-US" b="0" dirty="0" smtClean="0">
+              <a:effectLst/>
+            </a:endParaRPr>
+          </a:p>
+        </p:txBody>
+      </p:sp>
+      <p:sp>
+        <p:nvSpPr>
+          <p:cNvPr id="4" name="Slide Number Placeholder 3"/>
+          <p:cNvSpPr>
+            <a:spLocks noGrp="1"/>
+          </p:cNvSpPr>
+          <p:nvPr>
+            <p:ph type="sldNum" sz="quarter" idx="10"/>
+          </p:nvPr>
+        </p:nvSpPr>
+        <p:spPr/>
+        <p:txBody>
+          <a:bodyPr/>
+          <a:lstStyle/>
+          <a:p>
+            <a:fld id="{55849CEA-452E-49F3-92ED-210B64DD3C6C}" type="slidenum">
+              <a:rPr lang="en-US" smtClean="0"/>
+              <a:t>30</a:t>
             </a:fld>
             <a:endParaRPr lang="en-US" dirty="0"/>
           </a:p>
@@ -6850,22 +7133,6 @@
           <a:bodyPr/>
           <a:lstStyle/>
           <a:p>
-            <a:r>
-              <a:rPr lang="en-US" dirty="0" smtClean="0"/>
-              <a:t>Machine Learning (ML) deals with making your machine learn from the external environment.</a:t>
-            </a:r>
-          </a:p>
-          <a:p>
-            <a:r>
-              <a:rPr lang="en-US" dirty="0" smtClean="0"/>
-              <a:t>This external environment can be in the form of sensors, electronic components, external data storage devices and many other. </a:t>
-            </a:r>
-          </a:p>
-          <a:p>
-            <a:r>
-              <a:rPr lang="en-US" dirty="0" smtClean="0"/>
-              <a:t>What ML does is, based on the user input or a query by the user, the system checks whether it is present in the knowledge base or not. If it is present, it will return the result to the user associated with that query, but if it is not stored initially, the machine will learn the user input and will improve its knowledge base, so as to provide better value to the end user.</a:t>
-            </a:r>
             <a:endParaRPr lang="en-US" dirty="0"/>
           </a:p>
         </p:txBody>
@@ -6887,7 +7154,7 @@
           <a:p>
             <a:fld id="{55849CEA-452E-49F3-92ED-210B64DD3C6C}" type="slidenum">
               <a:rPr lang="en-US" smtClean="0"/>
-              <a:t>4</a:t>
+              <a:t>3</a:t>
             </a:fld>
             <a:endParaRPr lang="en-US" dirty="0"/>
           </a:p>
@@ -6896,7 +7163,7 @@
     </p:spTree>
     <p:extLst>
       <p:ext uri="{BB962C8B-B14F-4D97-AF65-F5344CB8AC3E}">
-        <p14:creationId xmlns:p14="http://schemas.microsoft.com/office/powerpoint/2010/main" val="3068319189"/>
+        <p14:creationId xmlns:p14="http://schemas.microsoft.com/office/powerpoint/2010/main" val="149940454"/>
       </p:ext>
     </p:extLst>
   </p:cSld>
@@ -6950,1221 +7217,37 @@
           <a:bodyPr/>
           <a:lstStyle/>
           <a:p>
-            <a:pPr rtl="0"/>
-            <a:r>
-              <a:rPr lang="en-US" sz="1200" b="0" i="0" u="none" strike="noStrike" kern="1200" dirty="0" smtClean="0">
-                <a:solidFill>
-                  <a:schemeClr val="tx1"/>
-                </a:solidFill>
-                <a:effectLst/>
-                <a:latin typeface="+mn-lt"/>
-                <a:ea typeface="+mn-ea"/>
-                <a:cs typeface="+mn-cs"/>
-              </a:rPr>
-              <a:t>British Passenger ship sunk in </a:t>
-            </a:r>
-            <a:r>
-              <a:rPr lang="en-US" sz="1200" b="1" i="0" u="none" strike="noStrike" kern="1200" dirty="0" smtClean="0">
-                <a:solidFill>
-                  <a:schemeClr val="tx1"/>
-                </a:solidFill>
-                <a:effectLst/>
-                <a:latin typeface="+mn-lt"/>
-                <a:ea typeface="+mn-ea"/>
-                <a:cs typeface="+mn-cs"/>
-              </a:rPr>
-              <a:t>1912</a:t>
-            </a:r>
-            <a:r>
-              <a:rPr lang="en-US" sz="1200" b="0" i="0" u="none" strike="noStrike" kern="1200" dirty="0" smtClean="0">
-                <a:solidFill>
-                  <a:schemeClr val="tx1"/>
-                </a:solidFill>
-                <a:effectLst/>
-                <a:latin typeface="+mn-lt"/>
-                <a:ea typeface="+mn-ea"/>
-                <a:cs typeface="+mn-cs"/>
-              </a:rPr>
-              <a:t> after colliding with an iceberg. Around </a:t>
-            </a:r>
-            <a:r>
-              <a:rPr lang="en-US" sz="1200" b="1" i="0" u="none" strike="noStrike" kern="1200" dirty="0" smtClean="0">
-                <a:solidFill>
-                  <a:schemeClr val="tx1"/>
-                </a:solidFill>
-                <a:effectLst/>
-                <a:latin typeface="+mn-lt"/>
-                <a:ea typeface="+mn-ea"/>
-                <a:cs typeface="+mn-cs"/>
-              </a:rPr>
-              <a:t>2000</a:t>
-            </a:r>
-            <a:r>
-              <a:rPr lang="en-US" sz="1200" b="0" i="0" u="none" strike="noStrike" kern="1200" dirty="0" smtClean="0">
-                <a:solidFill>
-                  <a:schemeClr val="tx1"/>
-                </a:solidFill>
-                <a:effectLst/>
-                <a:latin typeface="+mn-lt"/>
-                <a:ea typeface="+mn-ea"/>
-                <a:cs typeface="+mn-cs"/>
-              </a:rPr>
-              <a:t> passengers and crew were aboard and more than 1500 died.</a:t>
-            </a:r>
-            <a:endParaRPr lang="en-US" b="0" dirty="0" smtClean="0">
-              <a:effectLst/>
-            </a:endParaRPr>
-          </a:p>
-          <a:p>
-            <a:pPr rtl="0"/>
-            <a:r>
-              <a:rPr lang="en-US" b="0" dirty="0" smtClean="0">
-                <a:effectLst/>
-              </a:rPr>
-              <a:t/>
-            </a:r>
-            <a:br>
-              <a:rPr lang="en-US" b="0" dirty="0" smtClean="0">
-                <a:effectLst/>
-              </a:rPr>
-            </a:br>
-            <a:r>
-              <a:rPr lang="en-US" sz="1200" b="0" i="0" u="none" strike="noStrike" kern="1200" dirty="0" smtClean="0">
-                <a:solidFill>
-                  <a:schemeClr val="tx1"/>
-                </a:solidFill>
-                <a:effectLst/>
-                <a:latin typeface="+mn-lt"/>
-                <a:ea typeface="+mn-ea"/>
-                <a:cs typeface="+mn-cs"/>
-              </a:rPr>
-              <a:t>Let’s see if we can use ML.Net to predict the chance of survival for any passenger onboard</a:t>
-            </a:r>
-            <a:endParaRPr lang="en-US" b="0" dirty="0" smtClean="0">
-              <a:effectLst/>
-            </a:endParaRPr>
-          </a:p>
-          <a:p>
-            <a:pPr rtl="0" fontAlgn="base"/>
-            <a:r>
-              <a:rPr lang="en-US" b="0" dirty="0" smtClean="0">
-                <a:effectLst/>
-              </a:rPr>
-              <a:t/>
-            </a:r>
-            <a:br>
-              <a:rPr lang="en-US" b="0" dirty="0" smtClean="0">
-                <a:effectLst/>
-              </a:rPr>
-            </a:br>
-            <a:r>
-              <a:rPr lang="en-US" sz="1200" b="1" i="0" u="none" strike="noStrike" kern="1200" dirty="0" smtClean="0">
-                <a:solidFill>
-                  <a:schemeClr val="tx1"/>
-                </a:solidFill>
-                <a:effectLst/>
-                <a:latin typeface="+mn-lt"/>
-                <a:ea typeface="+mn-ea"/>
-                <a:cs typeface="+mn-cs"/>
-              </a:rPr>
-              <a:t>Start by walking through sample data and introduce what we are trying to do</a:t>
-            </a:r>
-            <a:endParaRPr lang="en-US" sz="1600" b="1" i="0" u="none" strike="noStrike" kern="1200" dirty="0" smtClean="0">
-              <a:solidFill>
-                <a:schemeClr val="tx1"/>
-              </a:solidFill>
-              <a:effectLst/>
-              <a:latin typeface="+mn-lt"/>
-              <a:ea typeface="+mn-ea"/>
-              <a:cs typeface="+mn-cs"/>
-            </a:endParaRPr>
-          </a:p>
-          <a:p>
-            <a:pPr rtl="0" fontAlgn="base"/>
-            <a:r>
-              <a:rPr lang="en-US" sz="1200" b="0" i="0" u="none" strike="noStrike" kern="1200" dirty="0" smtClean="0">
-                <a:solidFill>
-                  <a:schemeClr val="tx1"/>
-                </a:solidFill>
-                <a:effectLst/>
-                <a:latin typeface="+mn-lt"/>
-                <a:ea typeface="+mn-ea"/>
-                <a:cs typeface="+mn-cs"/>
-              </a:rPr>
-              <a:t>1. Create Solution</a:t>
-            </a:r>
-            <a:endParaRPr lang="en-US" sz="1600" b="0" i="0" u="none" strike="noStrike" kern="1200" dirty="0" smtClean="0">
-              <a:solidFill>
-                <a:schemeClr val="tx1"/>
-              </a:solidFill>
-              <a:effectLst/>
-              <a:latin typeface="+mn-lt"/>
-              <a:ea typeface="+mn-ea"/>
-              <a:cs typeface="+mn-cs"/>
-            </a:endParaRPr>
-          </a:p>
-          <a:p>
-            <a:pPr lvl="1" rtl="0" fontAlgn="base"/>
-            <a:r>
-              <a:rPr lang="en-US" sz="1200" b="0" i="0" u="none" strike="noStrike" kern="1200" dirty="0" smtClean="0">
-                <a:solidFill>
-                  <a:schemeClr val="tx1"/>
-                </a:solidFill>
-                <a:effectLst/>
-                <a:latin typeface="+mn-lt"/>
-                <a:ea typeface="+mn-ea"/>
-                <a:cs typeface="+mn-cs"/>
-              </a:rPr>
-              <a:t>dotnet new console -o titanicPredictions</a:t>
-            </a:r>
-            <a:endParaRPr lang="en-US" sz="1600" b="0" i="0" u="none" strike="noStrike" kern="1200" dirty="0" smtClean="0">
-              <a:solidFill>
-                <a:schemeClr val="tx1"/>
-              </a:solidFill>
-              <a:effectLst/>
-              <a:latin typeface="+mn-lt"/>
-              <a:ea typeface="+mn-ea"/>
-              <a:cs typeface="+mn-cs"/>
-            </a:endParaRPr>
-          </a:p>
-          <a:p>
-            <a:pPr lvl="1" rtl="0" fontAlgn="base"/>
-            <a:r>
-              <a:rPr lang="en-US" sz="1200" b="0" i="0" u="none" strike="noStrike" kern="1200" dirty="0" smtClean="0">
-                <a:solidFill>
-                  <a:schemeClr val="tx1"/>
-                </a:solidFill>
-                <a:effectLst/>
-                <a:latin typeface="+mn-lt"/>
-                <a:ea typeface="+mn-ea"/>
-                <a:cs typeface="+mn-cs"/>
-              </a:rPr>
-              <a:t>dotnet add package Microsoft.ML</a:t>
-            </a:r>
-            <a:endParaRPr lang="en-US" sz="1600" b="0" i="0" u="none" strike="noStrike" kern="1200" dirty="0" smtClean="0">
-              <a:solidFill>
-                <a:schemeClr val="tx1"/>
-              </a:solidFill>
-              <a:effectLst/>
-              <a:latin typeface="+mn-lt"/>
-              <a:ea typeface="+mn-ea"/>
-              <a:cs typeface="+mn-cs"/>
-            </a:endParaRPr>
-          </a:p>
-          <a:p>
-            <a:pPr rtl="0"/>
-            <a:r>
-              <a:rPr lang="en-US" sz="1200" b="0" i="0" u="none" strike="noStrike" kern="1200" dirty="0" smtClean="0">
-                <a:solidFill>
-                  <a:schemeClr val="tx1"/>
-                </a:solidFill>
-                <a:effectLst/>
-                <a:latin typeface="+mn-lt"/>
-                <a:ea typeface="+mn-ea"/>
-                <a:cs typeface="+mn-cs"/>
-              </a:rPr>
-              <a:t>2.   Open solution - command Load, Transform, Train, Evaluate and Predict</a:t>
-            </a:r>
-            <a:endParaRPr lang="en-US" b="0" dirty="0" smtClean="0">
-              <a:effectLst/>
-            </a:endParaRPr>
-          </a:p>
-          <a:p>
-            <a:pPr rtl="0"/>
-            <a:r>
-              <a:rPr lang="en-US" sz="1200" b="0" i="0" u="none" strike="noStrike" kern="1200" dirty="0" smtClean="0">
-                <a:solidFill>
-                  <a:schemeClr val="tx1"/>
-                </a:solidFill>
-                <a:effectLst/>
-                <a:latin typeface="+mn-lt"/>
-                <a:ea typeface="+mn-ea"/>
-                <a:cs typeface="+mn-cs"/>
-              </a:rPr>
-              <a:t>3.   Talk about train/test and add csv to solution.</a:t>
-            </a:r>
-            <a:endParaRPr lang="en-US" b="0" dirty="0" smtClean="0">
-              <a:effectLst/>
-            </a:endParaRPr>
-          </a:p>
-          <a:p>
-            <a:pPr rtl="0"/>
-            <a:r>
-              <a:rPr lang="en-US" sz="1200" b="0" i="0" u="none" strike="noStrike" kern="1200" dirty="0" smtClean="0">
-                <a:solidFill>
-                  <a:schemeClr val="tx1"/>
-                </a:solidFill>
-                <a:effectLst/>
-                <a:latin typeface="+mn-lt"/>
-                <a:ea typeface="+mn-ea"/>
-                <a:cs typeface="+mn-cs"/>
-              </a:rPr>
-              <a:t>4.   Set them to Copy Always</a:t>
-            </a:r>
-            <a:endParaRPr lang="en-US" b="0" dirty="0" smtClean="0">
-              <a:effectLst/>
-            </a:endParaRPr>
-          </a:p>
-          <a:p>
-            <a:pPr rtl="0"/>
-            <a:r>
-              <a:rPr lang="en-US" sz="1200" b="0" i="0" u="none" strike="noStrike" kern="1200" dirty="0" smtClean="0">
-                <a:solidFill>
-                  <a:schemeClr val="tx1"/>
-                </a:solidFill>
-                <a:effectLst/>
-                <a:latin typeface="+mn-lt"/>
-                <a:ea typeface="+mn-ea"/>
-                <a:cs typeface="+mn-cs"/>
-              </a:rPr>
-              <a:t>5.   Explore the training data : 0-Survived 1-Not survived, Passenger class 0-3, Sex - male/female, Name(non-float values) : One-hot encoding, Age - missing (mean), delete age record</a:t>
-            </a:r>
-            <a:endParaRPr lang="en-US" b="0" dirty="0" smtClean="0">
-              <a:effectLst/>
-            </a:endParaRPr>
-          </a:p>
-          <a:p>
-            <a:pPr rtl="0"/>
-            <a:r>
-              <a:rPr lang="en-US" sz="1200" b="0" i="0" u="none" strike="noStrike" kern="1200" dirty="0" smtClean="0">
-                <a:solidFill>
-                  <a:schemeClr val="tx1"/>
-                </a:solidFill>
-                <a:effectLst/>
-                <a:latin typeface="+mn-lt"/>
-                <a:ea typeface="+mn-ea"/>
-                <a:cs typeface="+mn-cs"/>
-              </a:rPr>
-              <a:t>6.   Mention that the algorithms only works on float vectors - thus we need to convert SEX.</a:t>
-            </a:r>
-            <a:endParaRPr lang="en-US" b="0" dirty="0" smtClean="0">
-              <a:effectLst/>
-            </a:endParaRPr>
-          </a:p>
-          <a:p>
-            <a:pPr rtl="0"/>
-            <a:r>
-              <a:rPr lang="en-US" sz="1200" b="0" i="0" u="none" strike="noStrike" kern="1200" dirty="0" smtClean="0">
-                <a:solidFill>
-                  <a:schemeClr val="tx1"/>
-                </a:solidFill>
-                <a:effectLst/>
-                <a:latin typeface="+mn-lt"/>
-                <a:ea typeface="+mn-ea"/>
-                <a:cs typeface="+mn-cs"/>
-              </a:rPr>
-              <a:t>7.   Add Microsoft.ML nuget package</a:t>
-            </a:r>
-            <a:endParaRPr lang="en-US" b="0" dirty="0" smtClean="0">
-              <a:effectLst/>
-            </a:endParaRPr>
-          </a:p>
-          <a:p>
-            <a:pPr rtl="0"/>
-            <a:r>
-              <a:rPr lang="en-US" sz="1200" b="0" i="0" u="none" strike="noStrike" kern="1200" dirty="0" smtClean="0">
-                <a:solidFill>
-                  <a:schemeClr val="tx1"/>
-                </a:solidFill>
-                <a:effectLst/>
-                <a:latin typeface="+mn-lt"/>
-                <a:ea typeface="+mn-ea"/>
-                <a:cs typeface="+mn-cs"/>
-              </a:rPr>
-              <a:t>8.   Create ML Context</a:t>
-            </a:r>
-            <a:endParaRPr lang="en-US" b="0" dirty="0" smtClean="0">
-              <a:effectLst/>
-            </a:endParaRPr>
-          </a:p>
-          <a:p>
-            <a:pPr rtl="0"/>
-            <a:r>
-              <a:rPr lang="en-US" sz="1200" b="0" i="0" u="none" strike="noStrike" kern="1200" dirty="0" smtClean="0">
-                <a:solidFill>
-                  <a:schemeClr val="tx1"/>
-                </a:solidFill>
-                <a:effectLst/>
-                <a:latin typeface="+mn-lt"/>
-                <a:ea typeface="+mn-ea"/>
-                <a:cs typeface="+mn-cs"/>
-              </a:rPr>
-              <a:t>9.   Create schema object </a:t>
-            </a:r>
-            <a:r>
-              <a:rPr lang="en-US" sz="1200" b="1" i="0" u="none" strike="noStrike" kern="1200" dirty="0" smtClean="0">
-                <a:solidFill>
-                  <a:schemeClr val="tx1"/>
-                </a:solidFill>
-                <a:effectLst/>
-                <a:latin typeface="+mn-lt"/>
-                <a:ea typeface="+mn-ea"/>
-                <a:cs typeface="+mn-cs"/>
-              </a:rPr>
-              <a:t>Passenger</a:t>
-            </a:r>
-            <a:r>
-              <a:rPr lang="en-US" sz="1200" b="0" i="0" u="none" strike="noStrike" kern="1200" dirty="0" smtClean="0">
-                <a:solidFill>
-                  <a:schemeClr val="tx1"/>
-                </a:solidFill>
-                <a:effectLst/>
-                <a:latin typeface="+mn-lt"/>
-                <a:ea typeface="+mn-ea"/>
-                <a:cs typeface="+mn-cs"/>
-              </a:rPr>
-              <a:t> (float and bool)</a:t>
-            </a:r>
-            <a:endParaRPr lang="en-US" b="0" dirty="0" smtClean="0">
-              <a:effectLst/>
-            </a:endParaRPr>
-          </a:p>
-          <a:p>
-            <a:pPr rtl="0"/>
-            <a:r>
-              <a:rPr lang="en-US" sz="1200" b="0" i="0" u="none" strike="noStrike" kern="1200" dirty="0" smtClean="0">
-                <a:solidFill>
-                  <a:schemeClr val="tx1"/>
-                </a:solidFill>
-                <a:effectLst/>
-                <a:latin typeface="+mn-lt"/>
-                <a:ea typeface="+mn-ea"/>
-                <a:cs typeface="+mn-cs"/>
-              </a:rPr>
-              <a:t>10. </a:t>
-            </a:r>
-            <a:r>
-              <a:rPr lang="en-US" sz="1200" b="1" i="0" u="none" strike="noStrike" kern="1200" dirty="0" smtClean="0">
-                <a:solidFill>
-                  <a:schemeClr val="tx1"/>
-                </a:solidFill>
-                <a:effectLst/>
-                <a:latin typeface="+mn-lt"/>
-                <a:ea typeface="+mn-ea"/>
-                <a:cs typeface="+mn-cs"/>
-              </a:rPr>
-              <a:t>Read </a:t>
-            </a:r>
-            <a:r>
-              <a:rPr lang="en-US" sz="1200" b="0" i="0" u="none" strike="noStrike" kern="1200" dirty="0" smtClean="0">
-                <a:solidFill>
-                  <a:schemeClr val="tx1"/>
-                </a:solidFill>
-                <a:effectLst/>
-                <a:latin typeface="+mn-lt"/>
-                <a:ea typeface="+mn-ea"/>
-                <a:cs typeface="+mn-cs"/>
-              </a:rPr>
-              <a:t>data via </a:t>
-            </a:r>
-            <a:r>
-              <a:rPr lang="en-US" sz="1200" b="1" i="0" u="none" strike="noStrike" kern="1200" dirty="0" smtClean="0">
-                <a:solidFill>
-                  <a:schemeClr val="tx1"/>
-                </a:solidFill>
-                <a:effectLst/>
-                <a:latin typeface="+mn-lt"/>
-                <a:ea typeface="+mn-ea"/>
-                <a:cs typeface="+mn-cs"/>
-              </a:rPr>
-              <a:t>LoadFromTextFile</a:t>
-            </a:r>
-            <a:r>
-              <a:rPr lang="en-US" sz="1200" b="0" i="0" u="none" strike="noStrike" kern="1200" dirty="0" smtClean="0">
-                <a:solidFill>
-                  <a:schemeClr val="tx1"/>
-                </a:solidFill>
-                <a:effectLst/>
-                <a:latin typeface="+mn-lt"/>
-                <a:ea typeface="+mn-ea"/>
-                <a:cs typeface="+mn-cs"/>
-              </a:rPr>
-              <a:t>&lt;Passenger&gt;. Specify hasHeader and SeparatorChar ‘,’</a:t>
-            </a:r>
-            <a:endParaRPr lang="en-US" b="0" dirty="0" smtClean="0">
-              <a:effectLst/>
-            </a:endParaRPr>
-          </a:p>
-          <a:p>
-            <a:pPr rtl="0"/>
-            <a:r>
-              <a:rPr lang="en-US" sz="1200" b="0" i="0" u="none" strike="noStrike" kern="1200" dirty="0" smtClean="0">
-                <a:solidFill>
-                  <a:schemeClr val="tx1"/>
-                </a:solidFill>
-                <a:effectLst/>
-                <a:latin typeface="+mn-lt"/>
-                <a:ea typeface="+mn-ea"/>
-                <a:cs typeface="+mn-cs"/>
-              </a:rPr>
-              <a:t>	a. Set hasHeaderSplit to true</a:t>
-            </a:r>
-            <a:endParaRPr lang="en-US" b="0" dirty="0" smtClean="0">
-              <a:effectLst/>
-            </a:endParaRPr>
-          </a:p>
-          <a:p>
-            <a:pPr rtl="0"/>
-            <a:r>
-              <a:rPr lang="en-US" sz="1200" b="0" i="0" u="none" strike="noStrike" kern="1200" dirty="0" smtClean="0">
-                <a:solidFill>
-                  <a:schemeClr val="tx1"/>
-                </a:solidFill>
-                <a:effectLst/>
-                <a:latin typeface="+mn-lt"/>
-                <a:ea typeface="+mn-ea"/>
-                <a:cs typeface="+mn-cs"/>
-              </a:rPr>
-              <a:t>	b. Specify SeparatorChar as comma ‘,’.</a:t>
-            </a:r>
-            <a:endParaRPr lang="en-US" b="0" dirty="0" smtClean="0">
-              <a:effectLst/>
-            </a:endParaRPr>
-          </a:p>
-          <a:p>
-            <a:pPr rtl="0"/>
-            <a:r>
-              <a:rPr lang="en-US" sz="1200" b="0" i="0" u="none" strike="noStrike" kern="1200" dirty="0" smtClean="0">
-                <a:solidFill>
-                  <a:schemeClr val="tx1"/>
-                </a:solidFill>
-                <a:effectLst/>
-                <a:latin typeface="+mn-lt"/>
-                <a:ea typeface="+mn-ea"/>
-                <a:cs typeface="+mn-cs"/>
-              </a:rPr>
-              <a:t>	c. Split data using </a:t>
-            </a:r>
-            <a:r>
-              <a:rPr lang="en-US" sz="1200" b="1" i="0" u="none" strike="noStrike" kern="1200" dirty="0" smtClean="0">
-                <a:solidFill>
-                  <a:schemeClr val="tx1"/>
-                </a:solidFill>
-                <a:effectLst/>
-                <a:latin typeface="+mn-lt"/>
-                <a:ea typeface="+mn-ea"/>
-                <a:cs typeface="+mn-cs"/>
-              </a:rPr>
-              <a:t>TrainTestSplit (80/20) </a:t>
-            </a:r>
-            <a:endParaRPr lang="en-US" b="0" dirty="0" smtClean="0">
-              <a:effectLst/>
-            </a:endParaRPr>
-          </a:p>
-          <a:p>
-            <a:pPr rtl="0"/>
-            <a:r>
-              <a:rPr lang="en-US" b="0" dirty="0" smtClean="0">
-                <a:effectLst/>
-              </a:rPr>
-              <a:t/>
-            </a:r>
-            <a:br>
-              <a:rPr lang="en-US" b="0" dirty="0" smtClean="0">
-                <a:effectLst/>
-              </a:rPr>
-            </a:br>
-            <a:r>
-              <a:rPr lang="en-US" sz="1200" b="0" i="0" u="none" strike="noStrike" kern="1200" dirty="0" smtClean="0">
-                <a:solidFill>
-                  <a:schemeClr val="tx1"/>
-                </a:solidFill>
-                <a:effectLst/>
-                <a:latin typeface="+mn-lt"/>
-                <a:ea typeface="+mn-ea"/>
-                <a:cs typeface="+mn-cs"/>
-              </a:rPr>
-              <a:t>11. </a:t>
-            </a:r>
-            <a:r>
-              <a:rPr lang="en-US" sz="1200" b="1" i="0" u="none" strike="noStrike" kern="1200" dirty="0" smtClean="0">
-                <a:solidFill>
-                  <a:schemeClr val="tx1"/>
-                </a:solidFill>
-                <a:effectLst/>
-                <a:latin typeface="+mn-lt"/>
-                <a:ea typeface="+mn-ea"/>
-                <a:cs typeface="+mn-cs"/>
-              </a:rPr>
-              <a:t>Transform </a:t>
-            </a:r>
-            <a:r>
-              <a:rPr lang="en-US" sz="1200" b="0" i="0" u="none" strike="noStrike" kern="1200" dirty="0" smtClean="0">
-                <a:solidFill>
-                  <a:schemeClr val="tx1"/>
-                </a:solidFill>
-                <a:effectLst/>
-                <a:latin typeface="+mn-lt"/>
-                <a:ea typeface="+mn-ea"/>
-                <a:cs typeface="+mn-cs"/>
-              </a:rPr>
-              <a:t>data:</a:t>
-            </a:r>
-            <a:endParaRPr lang="en-US" b="0" dirty="0" smtClean="0">
-              <a:effectLst/>
-            </a:endParaRPr>
-          </a:p>
-          <a:p>
-            <a:pPr rtl="0"/>
-            <a:r>
-              <a:rPr lang="en-US" sz="1200" b="0" i="0" u="none" strike="noStrike" kern="1200" dirty="0" smtClean="0">
-                <a:solidFill>
-                  <a:schemeClr val="tx1"/>
-                </a:solidFill>
-                <a:effectLst/>
-                <a:latin typeface="+mn-lt"/>
-                <a:ea typeface="+mn-ea"/>
-                <a:cs typeface="+mn-cs"/>
-              </a:rPr>
-              <a:t>	a. Convert non-float(Sex : male/female) to float (0/1) using One-hot encoding</a:t>
-            </a:r>
-            <a:endParaRPr lang="en-US" b="0" dirty="0" smtClean="0">
-              <a:effectLst/>
-            </a:endParaRPr>
-          </a:p>
-          <a:p>
-            <a:pPr rtl="0"/>
-            <a:r>
-              <a:rPr lang="en-US" sz="1200" b="0" i="0" u="none" strike="noStrike" kern="1200" dirty="0" smtClean="0">
-                <a:solidFill>
-                  <a:schemeClr val="tx1"/>
-                </a:solidFill>
-                <a:effectLst/>
-                <a:latin typeface="+mn-lt"/>
-                <a:ea typeface="+mn-ea"/>
-                <a:cs typeface="+mn-cs"/>
-              </a:rPr>
-              <a:t>	b. Replace missing values : Age - Mean</a:t>
-            </a:r>
-            <a:endParaRPr lang="en-US" b="0" dirty="0" smtClean="0">
-              <a:effectLst/>
-            </a:endParaRPr>
-          </a:p>
-          <a:p>
-            <a:pPr rtl="0"/>
-            <a:r>
-              <a:rPr lang="en-US" sz="1200" b="0" i="0" u="none" strike="noStrike" kern="1200" dirty="0" smtClean="0">
-                <a:solidFill>
-                  <a:schemeClr val="tx1"/>
-                </a:solidFill>
-                <a:effectLst/>
-                <a:latin typeface="+mn-lt"/>
-                <a:ea typeface="+mn-ea"/>
-                <a:cs typeface="+mn-cs"/>
-              </a:rPr>
-              <a:t>	b. Concatenate feature : Columns to be used for prediction - PClass, Sex, SiblingsAboard, ParentsAboard</a:t>
-            </a:r>
-            <a:endParaRPr lang="en-US" b="0" dirty="0" smtClean="0">
-              <a:effectLst/>
-            </a:endParaRPr>
-          </a:p>
-          <a:p>
-            <a:pPr rtl="0"/>
-            <a:r>
-              <a:rPr lang="en-US" b="0" dirty="0" smtClean="0">
-                <a:effectLst/>
-              </a:rPr>
-              <a:t/>
-            </a:r>
-            <a:br>
-              <a:rPr lang="en-US" b="0" dirty="0" smtClean="0">
-                <a:effectLst/>
-              </a:rPr>
-            </a:br>
-            <a:r>
-              <a:rPr lang="en-US" sz="1200" b="0" i="0" u="none" strike="noStrike" kern="1200" dirty="0" smtClean="0">
-                <a:solidFill>
-                  <a:schemeClr val="tx1"/>
-                </a:solidFill>
-                <a:effectLst/>
-                <a:latin typeface="+mn-lt"/>
-                <a:ea typeface="+mn-ea"/>
-                <a:cs typeface="+mn-cs"/>
-              </a:rPr>
-              <a:t>12. </a:t>
-            </a:r>
-            <a:r>
-              <a:rPr lang="en-US" sz="1200" b="1" i="0" u="none" strike="noStrike" kern="1200" dirty="0" smtClean="0">
-                <a:solidFill>
-                  <a:schemeClr val="tx1"/>
-                </a:solidFill>
-                <a:effectLst/>
-                <a:latin typeface="+mn-lt"/>
-                <a:ea typeface="+mn-ea"/>
-                <a:cs typeface="+mn-cs"/>
-              </a:rPr>
-              <a:t>Train </a:t>
-            </a:r>
-            <a:r>
-              <a:rPr lang="en-US" sz="1200" b="0" i="0" u="none" strike="noStrike" kern="1200" dirty="0" smtClean="0">
-                <a:solidFill>
-                  <a:schemeClr val="tx1"/>
-                </a:solidFill>
-                <a:effectLst/>
-                <a:latin typeface="+mn-lt"/>
-                <a:ea typeface="+mn-ea"/>
-                <a:cs typeface="+mn-cs"/>
-              </a:rPr>
-              <a:t>model </a:t>
-            </a:r>
-            <a:endParaRPr lang="en-US" b="0" dirty="0" smtClean="0">
-              <a:effectLst/>
-            </a:endParaRPr>
-          </a:p>
-          <a:p>
-            <a:pPr rtl="0"/>
-            <a:r>
-              <a:rPr lang="en-US" sz="1200" b="0" i="0" u="none" strike="noStrike" kern="1200" dirty="0" smtClean="0">
-                <a:solidFill>
-                  <a:schemeClr val="tx1"/>
-                </a:solidFill>
-                <a:effectLst/>
-                <a:latin typeface="+mn-lt"/>
-                <a:ea typeface="+mn-ea"/>
-                <a:cs typeface="+mn-cs"/>
-              </a:rPr>
-              <a:t>	a. Assign algorithm : Binary Classification with Logistic regression. It’s a hit and trial. Not sure if this is the best algorithm </a:t>
-            </a:r>
-            <a:endParaRPr lang="en-US" b="0" dirty="0" smtClean="0">
-              <a:effectLst/>
-            </a:endParaRPr>
-          </a:p>
-          <a:p>
-            <a:pPr rtl="0"/>
-            <a:r>
-              <a:rPr lang="en-US" sz="1200" b="0" i="0" u="none" strike="noStrike" kern="1200" dirty="0" smtClean="0">
-                <a:solidFill>
-                  <a:schemeClr val="tx1"/>
-                </a:solidFill>
-                <a:effectLst/>
-                <a:latin typeface="+mn-lt"/>
-                <a:ea typeface="+mn-ea"/>
-                <a:cs typeface="+mn-cs"/>
-              </a:rPr>
-              <a:t>	b. Train/Fit Model: pass training set</a:t>
-            </a:r>
-            <a:endParaRPr lang="en-US" b="0" dirty="0" smtClean="0">
-              <a:effectLst/>
-            </a:endParaRPr>
-          </a:p>
-          <a:p>
-            <a:pPr rtl="0"/>
-            <a:r>
-              <a:rPr lang="en-US" sz="1200" b="0" i="0" u="none" strike="noStrike" kern="1200" dirty="0" smtClean="0">
-                <a:solidFill>
-                  <a:schemeClr val="tx1"/>
-                </a:solidFill>
-                <a:effectLst/>
-                <a:latin typeface="+mn-lt"/>
-                <a:ea typeface="+mn-ea"/>
-                <a:cs typeface="+mn-cs"/>
-              </a:rPr>
-              <a:t>13. </a:t>
-            </a:r>
-            <a:r>
-              <a:rPr lang="en-US" sz="1200" b="1" i="0" u="none" strike="noStrike" kern="1200" dirty="0" smtClean="0">
-                <a:solidFill>
-                  <a:schemeClr val="tx1"/>
-                </a:solidFill>
-                <a:effectLst/>
-                <a:latin typeface="+mn-lt"/>
-                <a:ea typeface="+mn-ea"/>
-                <a:cs typeface="+mn-cs"/>
-              </a:rPr>
-              <a:t>Evaluate</a:t>
-            </a:r>
-            <a:r>
-              <a:rPr lang="en-US" sz="1200" b="0" i="0" u="none" strike="noStrike" kern="1200" dirty="0" smtClean="0">
-                <a:solidFill>
-                  <a:schemeClr val="tx1"/>
-                </a:solidFill>
-                <a:effectLst/>
-                <a:latin typeface="+mn-lt"/>
-                <a:ea typeface="+mn-ea"/>
-                <a:cs typeface="+mn-cs"/>
-              </a:rPr>
-              <a:t> model</a:t>
-            </a:r>
-            <a:endParaRPr lang="en-US" b="0" dirty="0" smtClean="0">
-              <a:effectLst/>
-            </a:endParaRPr>
-          </a:p>
-          <a:p>
-            <a:pPr rtl="0"/>
-            <a:r>
-              <a:rPr lang="en-US" sz="1200" b="0" i="0" u="none" strike="noStrike" kern="1200" dirty="0" smtClean="0">
-                <a:solidFill>
-                  <a:schemeClr val="tx1"/>
-                </a:solidFill>
-                <a:effectLst/>
-                <a:latin typeface="+mn-lt"/>
-                <a:ea typeface="+mn-ea"/>
-                <a:cs typeface="+mn-cs"/>
-              </a:rPr>
-              <a:t>	a. Get the score </a:t>
-            </a:r>
-            <a:endParaRPr lang="en-US" b="0" dirty="0" smtClean="0">
-              <a:effectLst/>
-            </a:endParaRPr>
-          </a:p>
-          <a:p>
-            <a:pPr rtl="0"/>
-            <a:r>
-              <a:rPr lang="en-US" sz="1200" b="0" i="0" u="none" strike="noStrike" kern="1200" dirty="0" smtClean="0">
-                <a:solidFill>
-                  <a:schemeClr val="tx1"/>
-                </a:solidFill>
-                <a:effectLst/>
-                <a:latin typeface="+mn-lt"/>
-                <a:ea typeface="+mn-ea"/>
-                <a:cs typeface="+mn-cs"/>
-              </a:rPr>
-              <a:t>	b. Evaluate gives various score that help determine accuracy of model based on output column.</a:t>
-            </a:r>
-            <a:endParaRPr lang="en-US" b="0" dirty="0" smtClean="0">
-              <a:effectLst/>
-            </a:endParaRPr>
-          </a:p>
-          <a:p>
-            <a:pPr rtl="0"/>
-            <a:r>
-              <a:rPr lang="en-US" sz="1200" b="0" i="0" u="none" strike="noStrike" kern="1200" dirty="0" smtClean="0">
-                <a:solidFill>
-                  <a:schemeClr val="tx1"/>
-                </a:solidFill>
-                <a:effectLst/>
-                <a:latin typeface="+mn-lt"/>
-                <a:ea typeface="+mn-ea"/>
-                <a:cs typeface="+mn-cs"/>
-              </a:rPr>
-              <a:t>		Gives accuracy of 80%</a:t>
-            </a:r>
-            <a:endParaRPr lang="en-US" b="0" dirty="0" smtClean="0">
-              <a:effectLst/>
-            </a:endParaRPr>
-          </a:p>
-          <a:p>
-            <a:pPr rtl="0"/>
-            <a:r>
-              <a:rPr lang="en-US" b="0" dirty="0" smtClean="0">
-                <a:effectLst/>
-              </a:rPr>
-              <a:t/>
-            </a:r>
-            <a:br>
-              <a:rPr lang="en-US" b="0" dirty="0" smtClean="0">
-                <a:effectLst/>
-              </a:rPr>
-            </a:br>
-            <a:r>
-              <a:rPr lang="en-US" sz="1200" b="0" i="0" u="none" strike="noStrike" kern="1200" dirty="0" smtClean="0">
-                <a:solidFill>
-                  <a:schemeClr val="tx1"/>
-                </a:solidFill>
-                <a:effectLst/>
-                <a:latin typeface="+mn-lt"/>
-                <a:ea typeface="+mn-ea"/>
-                <a:cs typeface="+mn-cs"/>
-              </a:rPr>
-              <a:t>14. Modify anything(Add/remove Features/Parameters/algorithm) and try to get better accuracy</a:t>
-            </a:r>
-            <a:endParaRPr lang="en-US" b="0" dirty="0" smtClean="0">
-              <a:effectLst/>
-            </a:endParaRPr>
-          </a:p>
-          <a:p>
-            <a:pPr rtl="0"/>
-            <a:r>
-              <a:rPr lang="en-US" sz="1200" b="0" i="0" u="none" strike="noStrike" kern="1200" dirty="0" smtClean="0">
-                <a:solidFill>
-                  <a:schemeClr val="tx1"/>
-                </a:solidFill>
-                <a:effectLst/>
-                <a:latin typeface="+mn-lt"/>
-                <a:ea typeface="+mn-ea"/>
-                <a:cs typeface="+mn-cs"/>
-              </a:rPr>
-              <a:t>15. </a:t>
-            </a:r>
-            <a:r>
-              <a:rPr lang="en-US" sz="1200" b="1" i="0" u="none" strike="noStrike" kern="1200" dirty="0" smtClean="0">
-                <a:solidFill>
-                  <a:schemeClr val="tx1"/>
-                </a:solidFill>
-                <a:effectLst/>
-                <a:latin typeface="+mn-lt"/>
-                <a:ea typeface="+mn-ea"/>
-                <a:cs typeface="+mn-cs"/>
-              </a:rPr>
-              <a:t>Save</a:t>
-            </a:r>
-            <a:endParaRPr lang="en-US" b="1" dirty="0" smtClean="0">
-              <a:effectLst/>
-            </a:endParaRPr>
-          </a:p>
-          <a:p>
-            <a:pPr rtl="0"/>
-            <a:r>
-              <a:rPr lang="en-US" sz="1200" b="0" i="0" u="none" strike="noStrike" kern="1200" dirty="0" smtClean="0">
-                <a:solidFill>
-                  <a:schemeClr val="tx1"/>
-                </a:solidFill>
-                <a:effectLst/>
-                <a:latin typeface="+mn-lt"/>
-                <a:ea typeface="+mn-ea"/>
-                <a:cs typeface="+mn-cs"/>
-              </a:rPr>
-              <a:t>	a. Save Model schema as Model.zip to be re-used </a:t>
-            </a:r>
-            <a:endParaRPr lang="en-US" b="0" dirty="0" smtClean="0">
-              <a:effectLst/>
-            </a:endParaRPr>
-          </a:p>
-          <a:p>
-            <a:pPr rtl="0"/>
-            <a:r>
-              <a:rPr lang="en-US" sz="1200" b="0" i="0" u="none" strike="noStrike" kern="1200" dirty="0" smtClean="0">
-                <a:solidFill>
-                  <a:schemeClr val="tx1"/>
-                </a:solidFill>
-                <a:effectLst/>
-                <a:latin typeface="+mn-lt"/>
-                <a:ea typeface="+mn-ea"/>
-                <a:cs typeface="+mn-cs"/>
-              </a:rPr>
-              <a:t>	b. Reuse this model.zip in various application such as web, desktop, Azure serverless functions</a:t>
-            </a:r>
-            <a:endParaRPr lang="en-US" b="0" dirty="0" smtClean="0">
-              <a:effectLst/>
-            </a:endParaRPr>
-          </a:p>
-          <a:p>
-            <a:pPr rtl="0"/>
-            <a:r>
-              <a:rPr lang="en-US" sz="1200" b="0" i="0" u="none" strike="noStrike" kern="1200" dirty="0" smtClean="0">
-                <a:solidFill>
-                  <a:schemeClr val="tx1"/>
-                </a:solidFill>
-                <a:effectLst/>
-                <a:latin typeface="+mn-lt"/>
-                <a:ea typeface="+mn-ea"/>
-                <a:cs typeface="+mn-cs"/>
-              </a:rPr>
-              <a:t>16. Completed in less than 40 lines of code.</a:t>
-            </a:r>
-            <a:endParaRPr lang="en-US" b="0" dirty="0" smtClean="0">
-              <a:effectLst/>
-            </a:endParaRPr>
-          </a:p>
-          <a:p>
-            <a:pPr rtl="0"/>
-            <a:r>
-              <a:rPr lang="en-US" sz="1200" b="0" i="0" u="none" strike="noStrike" kern="1200" dirty="0" smtClean="0">
-                <a:solidFill>
-                  <a:schemeClr val="tx1"/>
-                </a:solidFill>
-                <a:effectLst/>
-                <a:latin typeface="+mn-lt"/>
-                <a:ea typeface="+mn-ea"/>
-                <a:cs typeface="+mn-cs"/>
-              </a:rPr>
-              <a:t>17. </a:t>
-            </a:r>
-            <a:r>
-              <a:rPr lang="en-US" sz="1200" b="1" i="0" u="none" strike="noStrike" kern="1200" dirty="0" smtClean="0">
-                <a:solidFill>
-                  <a:schemeClr val="tx1"/>
-                </a:solidFill>
-                <a:effectLst/>
-                <a:latin typeface="+mn-lt"/>
-                <a:ea typeface="+mn-ea"/>
-                <a:cs typeface="+mn-cs"/>
-              </a:rPr>
-              <a:t>Predict</a:t>
-            </a:r>
-            <a:r>
-              <a:rPr lang="en-US" sz="1200" b="0" i="0" u="none" strike="noStrike" kern="1200" dirty="0" smtClean="0">
-                <a:solidFill>
-                  <a:schemeClr val="tx1"/>
-                </a:solidFill>
-                <a:effectLst/>
-                <a:latin typeface="+mn-lt"/>
-                <a:ea typeface="+mn-ea"/>
-                <a:cs typeface="+mn-cs"/>
-              </a:rPr>
-              <a:t> : PredictionEngine, Prediction class and Sample, </a:t>
-            </a:r>
-            <a:endParaRPr lang="en-US" b="0" dirty="0" smtClean="0">
-              <a:effectLst/>
-            </a:endParaRPr>
-          </a:p>
-          <a:p>
-            <a:pPr rtl="0"/>
-            <a:r>
-              <a:rPr lang="en-US" sz="1200" b="0" i="0" u="none" strike="noStrike" kern="1200" dirty="0" smtClean="0">
-                <a:solidFill>
-                  <a:schemeClr val="tx1"/>
-                </a:solidFill>
-                <a:effectLst/>
-                <a:latin typeface="+mn-lt"/>
-                <a:ea typeface="+mn-ea"/>
-                <a:cs typeface="+mn-cs"/>
-              </a:rPr>
-              <a:t>18. </a:t>
-            </a:r>
-            <a:r>
-              <a:rPr lang="en-US" sz="1200" b="1" i="0" u="none" strike="noStrike" kern="1200" dirty="0" smtClean="0">
-                <a:solidFill>
-                  <a:schemeClr val="tx1"/>
-                </a:solidFill>
-                <a:effectLst/>
-                <a:latin typeface="+mn-lt"/>
-                <a:ea typeface="+mn-ea"/>
-                <a:cs typeface="+mn-cs"/>
-              </a:rPr>
-              <a:t>AutoML</a:t>
-            </a:r>
-            <a:r>
-              <a:rPr lang="en-US" sz="1200" b="0" i="0" u="none" strike="noStrike" kern="1200" dirty="0" smtClean="0">
-                <a:solidFill>
-                  <a:schemeClr val="tx1"/>
-                </a:solidFill>
-                <a:effectLst/>
-                <a:latin typeface="+mn-lt"/>
-                <a:ea typeface="+mn-ea"/>
-                <a:cs typeface="+mn-cs"/>
-              </a:rPr>
-              <a:t> : Automatic Machine learning using ML.Net - PREVIEW</a:t>
-            </a:r>
-            <a:endParaRPr lang="en-US" b="0" dirty="0" smtClean="0">
-              <a:effectLst/>
-            </a:endParaRPr>
-          </a:p>
-          <a:p>
-            <a:pPr rtl="0"/>
-            <a:r>
-              <a:rPr lang="en-US" sz="1200" b="0" i="0" u="none" strike="noStrike" kern="1200" dirty="0" smtClean="0">
-                <a:solidFill>
-                  <a:schemeClr val="tx1"/>
-                </a:solidFill>
-                <a:effectLst/>
-                <a:latin typeface="+mn-lt"/>
-                <a:ea typeface="+mn-ea"/>
-                <a:cs typeface="+mn-cs"/>
-              </a:rPr>
-              <a:t>	a. Manual process is a tedious</a:t>
-            </a:r>
-            <a:endParaRPr lang="en-US" b="0" dirty="0" smtClean="0">
-              <a:effectLst/>
-            </a:endParaRPr>
-          </a:p>
-          <a:p>
-            <a:pPr rtl="0"/>
-            <a:r>
-              <a:rPr lang="en-US" sz="1200" b="0" i="0" u="none" strike="noStrike" kern="1200" dirty="0" smtClean="0">
-                <a:solidFill>
-                  <a:schemeClr val="tx1"/>
-                </a:solidFill>
-                <a:effectLst/>
-                <a:latin typeface="+mn-lt"/>
-                <a:ea typeface="+mn-ea"/>
-                <a:cs typeface="+mn-cs"/>
-              </a:rPr>
-              <a:t>		i. Selecting algorithm</a:t>
-            </a:r>
-            <a:endParaRPr lang="en-US" b="0" dirty="0" smtClean="0">
-              <a:effectLst/>
-            </a:endParaRPr>
-          </a:p>
-          <a:p>
-            <a:pPr rtl="0"/>
-            <a:r>
-              <a:rPr lang="en-US" sz="1200" b="0" i="0" u="none" strike="noStrike" kern="1200" dirty="0" smtClean="0">
-                <a:solidFill>
-                  <a:schemeClr val="tx1"/>
-                </a:solidFill>
-                <a:effectLst/>
-                <a:latin typeface="+mn-lt"/>
-                <a:ea typeface="+mn-ea"/>
-                <a:cs typeface="+mn-cs"/>
-              </a:rPr>
-              <a:t>		Ii.Time consuming (running models for different algorithms/hyperparameters)</a:t>
-            </a:r>
-            <a:endParaRPr lang="en-US" b="0" dirty="0" smtClean="0">
-              <a:effectLst/>
-            </a:endParaRPr>
-          </a:p>
-          <a:p>
-            <a:pPr rtl="0"/>
-            <a:r>
-              <a:rPr lang="en-US" sz="1200" b="0" i="0" u="none" strike="noStrike" kern="1200" dirty="0" smtClean="0">
-                <a:solidFill>
-                  <a:schemeClr val="tx1"/>
-                </a:solidFill>
-                <a:effectLst/>
-                <a:latin typeface="+mn-lt"/>
-                <a:ea typeface="+mn-ea"/>
-                <a:cs typeface="+mn-cs"/>
-              </a:rPr>
-              <a:t>	b. AutoML</a:t>
-            </a:r>
-            <a:endParaRPr lang="en-US" b="0" dirty="0" smtClean="0">
-              <a:effectLst/>
-            </a:endParaRPr>
-          </a:p>
-          <a:p>
-            <a:pPr rtl="0"/>
-            <a:r>
-              <a:rPr lang="en-US" sz="1200" b="0" i="0" u="none" strike="noStrike" kern="1200" dirty="0" smtClean="0">
-                <a:solidFill>
-                  <a:schemeClr val="tx1"/>
-                </a:solidFill>
-                <a:effectLst/>
-                <a:latin typeface="+mn-lt"/>
-                <a:ea typeface="+mn-ea"/>
-                <a:cs typeface="+mn-cs"/>
-              </a:rPr>
-              <a:t>		i. Runs different algorithm</a:t>
-            </a:r>
-            <a:endParaRPr lang="en-US" b="0" dirty="0" smtClean="0">
-              <a:effectLst/>
-            </a:endParaRPr>
-          </a:p>
-          <a:p>
-            <a:pPr rtl="0"/>
-            <a:r>
-              <a:rPr lang="en-US" sz="1200" b="0" i="0" u="none" strike="noStrike" kern="1200" dirty="0" smtClean="0">
-                <a:solidFill>
-                  <a:schemeClr val="tx1"/>
-                </a:solidFill>
-                <a:effectLst/>
-                <a:latin typeface="+mn-lt"/>
-                <a:ea typeface="+mn-ea"/>
-                <a:cs typeface="+mn-cs"/>
-              </a:rPr>
-              <a:t>		Ii. Best algorithm</a:t>
-            </a:r>
-            <a:endParaRPr lang="en-US" b="0" dirty="0" smtClean="0">
-              <a:effectLst/>
-            </a:endParaRPr>
-          </a:p>
-          <a:p>
-            <a:pPr rtl="0"/>
-            <a:r>
-              <a:rPr lang="en-US" sz="1200" b="0" i="0" u="none" strike="noStrike" kern="1200" dirty="0" smtClean="0">
-                <a:solidFill>
-                  <a:schemeClr val="tx1"/>
-                </a:solidFill>
-                <a:effectLst/>
-                <a:latin typeface="+mn-lt"/>
-                <a:ea typeface="+mn-ea"/>
-                <a:cs typeface="+mn-cs"/>
-              </a:rPr>
-              <a:t>		Iii. Summary of multiple algorithm used</a:t>
-            </a:r>
-            <a:endParaRPr lang="en-US" b="0" dirty="0" smtClean="0">
-              <a:effectLst/>
-            </a:endParaRPr>
-          </a:p>
-          <a:p>
-            <a:pPr rtl="0"/>
-            <a:r>
-              <a:rPr lang="en-US" sz="1200" b="0" i="0" u="none" strike="noStrike" kern="1200" dirty="0" smtClean="0">
-                <a:solidFill>
-                  <a:schemeClr val="tx1"/>
-                </a:solidFill>
-                <a:effectLst/>
-                <a:latin typeface="+mn-lt"/>
-                <a:ea typeface="+mn-ea"/>
-                <a:cs typeface="+mn-cs"/>
-              </a:rPr>
-              <a:t>		Iv. Auto-Generate code </a:t>
-            </a:r>
-            <a:endParaRPr lang="en-US" b="0" dirty="0" smtClean="0">
-              <a:effectLst/>
-            </a:endParaRPr>
-          </a:p>
-          <a:p>
-            <a:pPr rtl="0"/>
-            <a:r>
-              <a:rPr lang="en-US" b="0" dirty="0" smtClean="0">
-                <a:effectLst/>
-              </a:rPr>
-              <a:t/>
-            </a:r>
-            <a:br>
-              <a:rPr lang="en-US" b="0" dirty="0" smtClean="0">
-                <a:effectLst/>
-              </a:rPr>
-            </a:br>
-            <a:r>
-              <a:rPr lang="en-US" b="0" dirty="0" smtClean="0">
-                <a:effectLst/>
-              </a:rPr>
-              <a:t>	</a:t>
-            </a:r>
-            <a:r>
-              <a:rPr lang="en-US" sz="1200" b="0" i="0" u="none" strike="noStrike" kern="1200" dirty="0" smtClean="0">
-                <a:solidFill>
-                  <a:schemeClr val="tx1"/>
-                </a:solidFill>
-                <a:effectLst/>
-                <a:latin typeface="+mn-lt"/>
-                <a:ea typeface="+mn-ea"/>
-                <a:cs typeface="+mn-cs"/>
-              </a:rPr>
-              <a:t>c. Show summary and improved accuracy from 80% to 84%</a:t>
-            </a:r>
-            <a:endParaRPr lang="en-US" b="0" dirty="0" smtClean="0">
-              <a:effectLst/>
-            </a:endParaRPr>
-          </a:p>
-          <a:p>
-            <a:pPr rtl="0"/>
-            <a:r>
-              <a:rPr lang="en-US" sz="1200" b="0" i="0" u="none" strike="noStrike" kern="1200" dirty="0" smtClean="0">
-                <a:solidFill>
-                  <a:schemeClr val="tx1"/>
-                </a:solidFill>
-                <a:effectLst/>
-                <a:latin typeface="+mn-lt"/>
-                <a:ea typeface="+mn-ea"/>
-                <a:cs typeface="+mn-cs"/>
-              </a:rPr>
-              <a:t>	d. Show generated code and compare with manual code</a:t>
-            </a:r>
-            <a:endParaRPr lang="en-US" b="0" dirty="0" smtClean="0">
-              <a:effectLst/>
-            </a:endParaRPr>
-          </a:p>
-          <a:p>
-            <a:pPr rtl="0"/>
-            <a:r>
-              <a:rPr lang="en-US" b="0" dirty="0" smtClean="0">
-                <a:effectLst/>
-              </a:rPr>
-              <a:t/>
-            </a:r>
-            <a:br>
-              <a:rPr lang="en-US" b="0" dirty="0" smtClean="0">
-                <a:effectLst/>
-              </a:rPr>
-            </a:br>
-            <a:r>
-              <a:rPr lang="en-US" sz="1200" b="0" i="0" u="none" strike="noStrike" kern="1200" dirty="0" smtClean="0">
-                <a:solidFill>
-                  <a:schemeClr val="tx1"/>
-                </a:solidFill>
-                <a:effectLst/>
-                <a:latin typeface="+mn-lt"/>
-                <a:ea typeface="+mn-ea"/>
-                <a:cs typeface="+mn-cs"/>
-              </a:rPr>
-              <a:t>19. Sow matrices</a:t>
-            </a:r>
-            <a:endParaRPr lang="en-US" b="0" dirty="0" smtClean="0">
-              <a:effectLst/>
-            </a:endParaRPr>
+            <a:r>
+              <a:rPr lang="en-US" dirty="0" smtClean="0"/>
+              <a:t>Machine Learning (ML) deals with making your machine learn from the external environment</a:t>
+            </a:r>
+            <a:r>
+              <a:rPr lang="en-US" dirty="0" smtClean="0"/>
+              <a:t>.</a:t>
+            </a:r>
+          </a:p>
+          <a:p>
+            <a:endParaRPr lang="en-US" dirty="0" smtClean="0"/>
+          </a:p>
+          <a:p>
+            <a:r>
+              <a:rPr lang="en-US" dirty="0" smtClean="0"/>
+              <a:t>This external environment can be in the form of sensors, electronic components, external data storage devices and many other. </a:t>
+            </a:r>
+          </a:p>
+          <a:p>
+            <a:endParaRPr lang="en-US" dirty="0" smtClean="0"/>
+          </a:p>
+          <a:p>
+            <a:r>
+              <a:rPr lang="en-US" dirty="0" smtClean="0"/>
+              <a:t>What </a:t>
+            </a:r>
+            <a:r>
+              <a:rPr lang="en-US" dirty="0" smtClean="0"/>
+              <a:t>ML does is, based on the user input or a query by the user, the system checks whether it is present in the knowledge base or not. If it is present, it will return the result to the user associated with that query, but if it is not stored initially, the machine will learn the user input and will improve its knowledge base, so as to provide better value to the end user.</a:t>
+            </a:r>
+            <a:endParaRPr lang="en-US" dirty="0"/>
           </a:p>
         </p:txBody>
       </p:sp>
@@ -8185,7 +7268,7 @@
           <a:p>
             <a:fld id="{55849CEA-452E-49F3-92ED-210B64DD3C6C}" type="slidenum">
               <a:rPr lang="en-US" smtClean="0"/>
-              <a:t>20</a:t>
+              <a:t>4</a:t>
             </a:fld>
             <a:endParaRPr lang="en-US" dirty="0"/>
           </a:p>
@@ -8194,7 +7277,7 @@
     </p:spTree>
     <p:extLst>
       <p:ext uri="{BB962C8B-B14F-4D97-AF65-F5344CB8AC3E}">
-        <p14:creationId xmlns:p14="http://schemas.microsoft.com/office/powerpoint/2010/main" val="1117024890"/>
+        <p14:creationId xmlns:p14="http://schemas.microsoft.com/office/powerpoint/2010/main" val="3068319189"/>
       </p:ext>
     </p:extLst>
   </p:cSld>
@@ -8250,14 +7333,40 @@
           <a:p>
             <a:r>
               <a:rPr lang="en-US" dirty="0" smtClean="0"/>
-              <a:t>1. One-hot encoding : Sex column</a:t>
-            </a:r>
-          </a:p>
-          <a:p>
-            <a:r>
-              <a:rPr lang="en-US" dirty="0" smtClean="0"/>
-              <a:t>2. Missing or wrong values : Average/Mean</a:t>
-            </a:r>
+              <a:t>Supervised Algorithm : Regression,</a:t>
+            </a:r>
+            <a:r>
+              <a:rPr lang="en-US" baseline="0" dirty="0" smtClean="0"/>
+              <a:t> Decision Tree, Random Forest, KNN, Logistic Regression</a:t>
+            </a:r>
+          </a:p>
+          <a:p>
+            <a:endParaRPr lang="en-US" baseline="0" dirty="0" smtClean="0"/>
+          </a:p>
+          <a:p>
+            <a:r>
+              <a:rPr lang="en-US" baseline="0" dirty="0" smtClean="0"/>
+              <a:t>Unsupervised Algorithm: </a:t>
+            </a:r>
+            <a:r>
+              <a:rPr lang="en-US" baseline="0" dirty="0" err="1" smtClean="0"/>
+              <a:t>Apriori</a:t>
+            </a:r>
+            <a:r>
+              <a:rPr lang="en-US" baseline="0" dirty="0" smtClean="0"/>
+              <a:t> algorithm, K-means</a:t>
+            </a:r>
+          </a:p>
+          <a:p>
+            <a:endParaRPr lang="en-US" baseline="0" dirty="0" smtClean="0"/>
+          </a:p>
+          <a:p>
+            <a:r>
+              <a:rPr lang="en-US" baseline="0" dirty="0" smtClean="0"/>
+              <a:t>Reinforcement Learning: Markov Decision Process</a:t>
+            </a:r>
+          </a:p>
+          <a:p>
             <a:endParaRPr lang="en-US" dirty="0"/>
           </a:p>
         </p:txBody>
@@ -8279,7 +7388,7 @@
           <a:p>
             <a:fld id="{55849CEA-452E-49F3-92ED-210B64DD3C6C}" type="slidenum">
               <a:rPr lang="en-US" smtClean="0"/>
-              <a:t>21</a:t>
+              <a:t>6</a:t>
             </a:fld>
             <a:endParaRPr lang="en-US" dirty="0"/>
           </a:p>
@@ -8288,7 +7397,7 @@
     </p:spTree>
     <p:extLst>
       <p:ext uri="{BB962C8B-B14F-4D97-AF65-F5344CB8AC3E}">
-        <p14:creationId xmlns:p14="http://schemas.microsoft.com/office/powerpoint/2010/main" val="2769389728"/>
+        <p14:creationId xmlns:p14="http://schemas.microsoft.com/office/powerpoint/2010/main" val="4113796580"/>
       </p:ext>
     </p:extLst>
   </p:cSld>
@@ -8342,17 +7451,1221 @@
           <a:bodyPr/>
           <a:lstStyle/>
           <a:p>
-            <a:r>
-              <a:rPr lang="en-US" dirty="0" smtClean="0"/>
-              <a:t>1. One-hot encoding : Sex column</a:t>
-            </a:r>
-          </a:p>
-          <a:p>
-            <a:r>
-              <a:rPr lang="en-US" dirty="0" smtClean="0"/>
-              <a:t>2. Missing or wrong values : Average/Mean</a:t>
-            </a:r>
-            <a:endParaRPr lang="en-US" dirty="0"/>
+            <a:pPr rtl="0"/>
+            <a:r>
+              <a:rPr lang="en-US" sz="1200" b="0" i="0" u="none" strike="noStrike" kern="1200" dirty="0" smtClean="0">
+                <a:solidFill>
+                  <a:schemeClr val="tx1"/>
+                </a:solidFill>
+                <a:effectLst/>
+                <a:latin typeface="+mn-lt"/>
+                <a:ea typeface="+mn-ea"/>
+                <a:cs typeface="+mn-cs"/>
+              </a:rPr>
+              <a:t>British Passenger ship sunk in </a:t>
+            </a:r>
+            <a:r>
+              <a:rPr lang="en-US" sz="1200" b="1" i="0" u="none" strike="noStrike" kern="1200" dirty="0" smtClean="0">
+                <a:solidFill>
+                  <a:schemeClr val="tx1"/>
+                </a:solidFill>
+                <a:effectLst/>
+                <a:latin typeface="+mn-lt"/>
+                <a:ea typeface="+mn-ea"/>
+                <a:cs typeface="+mn-cs"/>
+              </a:rPr>
+              <a:t>1912</a:t>
+            </a:r>
+            <a:r>
+              <a:rPr lang="en-US" sz="1200" b="0" i="0" u="none" strike="noStrike" kern="1200" dirty="0" smtClean="0">
+                <a:solidFill>
+                  <a:schemeClr val="tx1"/>
+                </a:solidFill>
+                <a:effectLst/>
+                <a:latin typeface="+mn-lt"/>
+                <a:ea typeface="+mn-ea"/>
+                <a:cs typeface="+mn-cs"/>
+              </a:rPr>
+              <a:t> after colliding with an iceberg. Around </a:t>
+            </a:r>
+            <a:r>
+              <a:rPr lang="en-US" sz="1200" b="1" i="0" u="none" strike="noStrike" kern="1200" dirty="0" smtClean="0">
+                <a:solidFill>
+                  <a:schemeClr val="tx1"/>
+                </a:solidFill>
+                <a:effectLst/>
+                <a:latin typeface="+mn-lt"/>
+                <a:ea typeface="+mn-ea"/>
+                <a:cs typeface="+mn-cs"/>
+              </a:rPr>
+              <a:t>2000</a:t>
+            </a:r>
+            <a:r>
+              <a:rPr lang="en-US" sz="1200" b="0" i="0" u="none" strike="noStrike" kern="1200" dirty="0" smtClean="0">
+                <a:solidFill>
+                  <a:schemeClr val="tx1"/>
+                </a:solidFill>
+                <a:effectLst/>
+                <a:latin typeface="+mn-lt"/>
+                <a:ea typeface="+mn-ea"/>
+                <a:cs typeface="+mn-cs"/>
+              </a:rPr>
+              <a:t> passengers and crew were aboard and more than 1500 died.</a:t>
+            </a:r>
+            <a:endParaRPr lang="en-US" b="0" dirty="0" smtClean="0">
+              <a:effectLst/>
+            </a:endParaRPr>
+          </a:p>
+          <a:p>
+            <a:pPr rtl="0"/>
+            <a:r>
+              <a:rPr lang="en-US" b="0" dirty="0" smtClean="0">
+                <a:effectLst/>
+              </a:rPr>
+              <a:t/>
+            </a:r>
+            <a:br>
+              <a:rPr lang="en-US" b="0" dirty="0" smtClean="0">
+                <a:effectLst/>
+              </a:rPr>
+            </a:br>
+            <a:r>
+              <a:rPr lang="en-US" sz="1200" b="0" i="0" u="none" strike="noStrike" kern="1200" dirty="0" smtClean="0">
+                <a:solidFill>
+                  <a:schemeClr val="tx1"/>
+                </a:solidFill>
+                <a:effectLst/>
+                <a:latin typeface="+mn-lt"/>
+                <a:ea typeface="+mn-ea"/>
+                <a:cs typeface="+mn-cs"/>
+              </a:rPr>
+              <a:t>Let’s see if we can use ML.Net to predict the chance of survival for any passenger onboard</a:t>
+            </a:r>
+            <a:endParaRPr lang="en-US" b="0" dirty="0" smtClean="0">
+              <a:effectLst/>
+            </a:endParaRPr>
+          </a:p>
+          <a:p>
+            <a:pPr rtl="0" fontAlgn="base"/>
+            <a:r>
+              <a:rPr lang="en-US" b="0" dirty="0" smtClean="0">
+                <a:effectLst/>
+              </a:rPr>
+              <a:t/>
+            </a:r>
+            <a:br>
+              <a:rPr lang="en-US" b="0" dirty="0" smtClean="0">
+                <a:effectLst/>
+              </a:rPr>
+            </a:br>
+            <a:r>
+              <a:rPr lang="en-US" sz="1200" b="1" i="0" u="none" strike="noStrike" kern="1200" dirty="0" smtClean="0">
+                <a:solidFill>
+                  <a:schemeClr val="tx1"/>
+                </a:solidFill>
+                <a:effectLst/>
+                <a:latin typeface="+mn-lt"/>
+                <a:ea typeface="+mn-ea"/>
+                <a:cs typeface="+mn-cs"/>
+              </a:rPr>
+              <a:t>Start by walking through sample data and introduce what we are trying to do</a:t>
+            </a:r>
+            <a:endParaRPr lang="en-US" sz="1600" b="1" i="0" u="none" strike="noStrike" kern="1200" dirty="0" smtClean="0">
+              <a:solidFill>
+                <a:schemeClr val="tx1"/>
+              </a:solidFill>
+              <a:effectLst/>
+              <a:latin typeface="+mn-lt"/>
+              <a:ea typeface="+mn-ea"/>
+              <a:cs typeface="+mn-cs"/>
+            </a:endParaRPr>
+          </a:p>
+          <a:p>
+            <a:pPr rtl="0" fontAlgn="base"/>
+            <a:r>
+              <a:rPr lang="en-US" sz="1200" b="0" i="0" u="none" strike="noStrike" kern="1200" dirty="0" smtClean="0">
+                <a:solidFill>
+                  <a:schemeClr val="tx1"/>
+                </a:solidFill>
+                <a:effectLst/>
+                <a:latin typeface="+mn-lt"/>
+                <a:ea typeface="+mn-ea"/>
+                <a:cs typeface="+mn-cs"/>
+              </a:rPr>
+              <a:t>1. Create Solution</a:t>
+            </a:r>
+            <a:endParaRPr lang="en-US" sz="1600" b="0" i="0" u="none" strike="noStrike" kern="1200" dirty="0" smtClean="0">
+              <a:solidFill>
+                <a:schemeClr val="tx1"/>
+              </a:solidFill>
+              <a:effectLst/>
+              <a:latin typeface="+mn-lt"/>
+              <a:ea typeface="+mn-ea"/>
+              <a:cs typeface="+mn-cs"/>
+            </a:endParaRPr>
+          </a:p>
+          <a:p>
+            <a:pPr lvl="1" rtl="0" fontAlgn="base"/>
+            <a:r>
+              <a:rPr lang="en-US" sz="1200" b="0" i="0" u="none" strike="noStrike" kern="1200" dirty="0" smtClean="0">
+                <a:solidFill>
+                  <a:schemeClr val="tx1"/>
+                </a:solidFill>
+                <a:effectLst/>
+                <a:latin typeface="+mn-lt"/>
+                <a:ea typeface="+mn-ea"/>
+                <a:cs typeface="+mn-cs"/>
+              </a:rPr>
+              <a:t>dotnet new console -o titanicPredictions</a:t>
+            </a:r>
+            <a:endParaRPr lang="en-US" sz="1600" b="0" i="0" u="none" strike="noStrike" kern="1200" dirty="0" smtClean="0">
+              <a:solidFill>
+                <a:schemeClr val="tx1"/>
+              </a:solidFill>
+              <a:effectLst/>
+              <a:latin typeface="+mn-lt"/>
+              <a:ea typeface="+mn-ea"/>
+              <a:cs typeface="+mn-cs"/>
+            </a:endParaRPr>
+          </a:p>
+          <a:p>
+            <a:pPr lvl="1" rtl="0" fontAlgn="base"/>
+            <a:r>
+              <a:rPr lang="en-US" sz="1200" b="0" i="0" u="none" strike="noStrike" kern="1200" dirty="0" smtClean="0">
+                <a:solidFill>
+                  <a:schemeClr val="tx1"/>
+                </a:solidFill>
+                <a:effectLst/>
+                <a:latin typeface="+mn-lt"/>
+                <a:ea typeface="+mn-ea"/>
+                <a:cs typeface="+mn-cs"/>
+              </a:rPr>
+              <a:t>dotnet add package Microsoft.ML</a:t>
+            </a:r>
+            <a:endParaRPr lang="en-US" sz="1600" b="0" i="0" u="none" strike="noStrike" kern="1200" dirty="0" smtClean="0">
+              <a:solidFill>
+                <a:schemeClr val="tx1"/>
+              </a:solidFill>
+              <a:effectLst/>
+              <a:latin typeface="+mn-lt"/>
+              <a:ea typeface="+mn-ea"/>
+              <a:cs typeface="+mn-cs"/>
+            </a:endParaRPr>
+          </a:p>
+          <a:p>
+            <a:pPr rtl="0"/>
+            <a:r>
+              <a:rPr lang="en-US" sz="1200" b="0" i="0" u="none" strike="noStrike" kern="1200" dirty="0" smtClean="0">
+                <a:solidFill>
+                  <a:schemeClr val="tx1"/>
+                </a:solidFill>
+                <a:effectLst/>
+                <a:latin typeface="+mn-lt"/>
+                <a:ea typeface="+mn-ea"/>
+                <a:cs typeface="+mn-cs"/>
+              </a:rPr>
+              <a:t>2.   Open solution - command Load, Transform, Train, Evaluate and Predict</a:t>
+            </a:r>
+            <a:endParaRPr lang="en-US" b="0" dirty="0" smtClean="0">
+              <a:effectLst/>
+            </a:endParaRPr>
+          </a:p>
+          <a:p>
+            <a:pPr rtl="0"/>
+            <a:r>
+              <a:rPr lang="en-US" sz="1200" b="0" i="0" u="none" strike="noStrike" kern="1200" dirty="0" smtClean="0">
+                <a:solidFill>
+                  <a:schemeClr val="tx1"/>
+                </a:solidFill>
+                <a:effectLst/>
+                <a:latin typeface="+mn-lt"/>
+                <a:ea typeface="+mn-ea"/>
+                <a:cs typeface="+mn-cs"/>
+              </a:rPr>
+              <a:t>3.   Talk about train/test and add csv to solution.</a:t>
+            </a:r>
+            <a:endParaRPr lang="en-US" b="0" dirty="0" smtClean="0">
+              <a:effectLst/>
+            </a:endParaRPr>
+          </a:p>
+          <a:p>
+            <a:pPr rtl="0"/>
+            <a:r>
+              <a:rPr lang="en-US" sz="1200" b="0" i="0" u="none" strike="noStrike" kern="1200" dirty="0" smtClean="0">
+                <a:solidFill>
+                  <a:schemeClr val="tx1"/>
+                </a:solidFill>
+                <a:effectLst/>
+                <a:latin typeface="+mn-lt"/>
+                <a:ea typeface="+mn-ea"/>
+                <a:cs typeface="+mn-cs"/>
+              </a:rPr>
+              <a:t>4.   Set them to Copy Always</a:t>
+            </a:r>
+            <a:endParaRPr lang="en-US" b="0" dirty="0" smtClean="0">
+              <a:effectLst/>
+            </a:endParaRPr>
+          </a:p>
+          <a:p>
+            <a:pPr rtl="0"/>
+            <a:r>
+              <a:rPr lang="en-US" sz="1200" b="0" i="0" u="none" strike="noStrike" kern="1200" dirty="0" smtClean="0">
+                <a:solidFill>
+                  <a:schemeClr val="tx1"/>
+                </a:solidFill>
+                <a:effectLst/>
+                <a:latin typeface="+mn-lt"/>
+                <a:ea typeface="+mn-ea"/>
+                <a:cs typeface="+mn-cs"/>
+              </a:rPr>
+              <a:t>5.   Explore the training data : 0-Survived 1-Not survived, Passenger class 0-3, Sex - male/female, Name(non-float values) : One-hot encoding, Age - missing (mean), delete age record</a:t>
+            </a:r>
+            <a:endParaRPr lang="en-US" b="0" dirty="0" smtClean="0">
+              <a:effectLst/>
+            </a:endParaRPr>
+          </a:p>
+          <a:p>
+            <a:pPr rtl="0"/>
+            <a:r>
+              <a:rPr lang="en-US" sz="1200" b="0" i="0" u="none" strike="noStrike" kern="1200" dirty="0" smtClean="0">
+                <a:solidFill>
+                  <a:schemeClr val="tx1"/>
+                </a:solidFill>
+                <a:effectLst/>
+                <a:latin typeface="+mn-lt"/>
+                <a:ea typeface="+mn-ea"/>
+                <a:cs typeface="+mn-cs"/>
+              </a:rPr>
+              <a:t>6.   Mention that the algorithms only works on float vectors - thus we need to convert SEX.</a:t>
+            </a:r>
+            <a:endParaRPr lang="en-US" b="0" dirty="0" smtClean="0">
+              <a:effectLst/>
+            </a:endParaRPr>
+          </a:p>
+          <a:p>
+            <a:pPr rtl="0"/>
+            <a:r>
+              <a:rPr lang="en-US" sz="1200" b="0" i="0" u="none" strike="noStrike" kern="1200" dirty="0" smtClean="0">
+                <a:solidFill>
+                  <a:schemeClr val="tx1"/>
+                </a:solidFill>
+                <a:effectLst/>
+                <a:latin typeface="+mn-lt"/>
+                <a:ea typeface="+mn-ea"/>
+                <a:cs typeface="+mn-cs"/>
+              </a:rPr>
+              <a:t>7.   Add Microsoft.ML nuget package</a:t>
+            </a:r>
+            <a:endParaRPr lang="en-US" b="0" dirty="0" smtClean="0">
+              <a:effectLst/>
+            </a:endParaRPr>
+          </a:p>
+          <a:p>
+            <a:pPr rtl="0"/>
+            <a:r>
+              <a:rPr lang="en-US" sz="1200" b="0" i="0" u="none" strike="noStrike" kern="1200" dirty="0" smtClean="0">
+                <a:solidFill>
+                  <a:schemeClr val="tx1"/>
+                </a:solidFill>
+                <a:effectLst/>
+                <a:latin typeface="+mn-lt"/>
+                <a:ea typeface="+mn-ea"/>
+                <a:cs typeface="+mn-cs"/>
+              </a:rPr>
+              <a:t>8.   Create ML Context</a:t>
+            </a:r>
+            <a:endParaRPr lang="en-US" b="0" dirty="0" smtClean="0">
+              <a:effectLst/>
+            </a:endParaRPr>
+          </a:p>
+          <a:p>
+            <a:pPr rtl="0"/>
+            <a:r>
+              <a:rPr lang="en-US" sz="1200" b="0" i="0" u="none" strike="noStrike" kern="1200" dirty="0" smtClean="0">
+                <a:solidFill>
+                  <a:schemeClr val="tx1"/>
+                </a:solidFill>
+                <a:effectLst/>
+                <a:latin typeface="+mn-lt"/>
+                <a:ea typeface="+mn-ea"/>
+                <a:cs typeface="+mn-cs"/>
+              </a:rPr>
+              <a:t>9.   Create schema object </a:t>
+            </a:r>
+            <a:r>
+              <a:rPr lang="en-US" sz="1200" b="1" i="0" u="none" strike="noStrike" kern="1200" dirty="0" smtClean="0">
+                <a:solidFill>
+                  <a:schemeClr val="tx1"/>
+                </a:solidFill>
+                <a:effectLst/>
+                <a:latin typeface="+mn-lt"/>
+                <a:ea typeface="+mn-ea"/>
+                <a:cs typeface="+mn-cs"/>
+              </a:rPr>
+              <a:t>Passenger</a:t>
+            </a:r>
+            <a:r>
+              <a:rPr lang="en-US" sz="1200" b="0" i="0" u="none" strike="noStrike" kern="1200" dirty="0" smtClean="0">
+                <a:solidFill>
+                  <a:schemeClr val="tx1"/>
+                </a:solidFill>
+                <a:effectLst/>
+                <a:latin typeface="+mn-lt"/>
+                <a:ea typeface="+mn-ea"/>
+                <a:cs typeface="+mn-cs"/>
+              </a:rPr>
+              <a:t> (float and bool)</a:t>
+            </a:r>
+            <a:endParaRPr lang="en-US" b="0" dirty="0" smtClean="0">
+              <a:effectLst/>
+            </a:endParaRPr>
+          </a:p>
+          <a:p>
+            <a:pPr rtl="0"/>
+            <a:r>
+              <a:rPr lang="en-US" sz="1200" b="0" i="0" u="none" strike="noStrike" kern="1200" dirty="0" smtClean="0">
+                <a:solidFill>
+                  <a:schemeClr val="tx1"/>
+                </a:solidFill>
+                <a:effectLst/>
+                <a:latin typeface="+mn-lt"/>
+                <a:ea typeface="+mn-ea"/>
+                <a:cs typeface="+mn-cs"/>
+              </a:rPr>
+              <a:t>10. </a:t>
+            </a:r>
+            <a:r>
+              <a:rPr lang="en-US" sz="1200" b="1" i="0" u="none" strike="noStrike" kern="1200" dirty="0" smtClean="0">
+                <a:solidFill>
+                  <a:schemeClr val="tx1"/>
+                </a:solidFill>
+                <a:effectLst/>
+                <a:latin typeface="+mn-lt"/>
+                <a:ea typeface="+mn-ea"/>
+                <a:cs typeface="+mn-cs"/>
+              </a:rPr>
+              <a:t>Read </a:t>
+            </a:r>
+            <a:r>
+              <a:rPr lang="en-US" sz="1200" b="0" i="0" u="none" strike="noStrike" kern="1200" dirty="0" smtClean="0">
+                <a:solidFill>
+                  <a:schemeClr val="tx1"/>
+                </a:solidFill>
+                <a:effectLst/>
+                <a:latin typeface="+mn-lt"/>
+                <a:ea typeface="+mn-ea"/>
+                <a:cs typeface="+mn-cs"/>
+              </a:rPr>
+              <a:t>data via </a:t>
+            </a:r>
+            <a:r>
+              <a:rPr lang="en-US" sz="1200" b="1" i="0" u="none" strike="noStrike" kern="1200" dirty="0" smtClean="0">
+                <a:solidFill>
+                  <a:schemeClr val="tx1"/>
+                </a:solidFill>
+                <a:effectLst/>
+                <a:latin typeface="+mn-lt"/>
+                <a:ea typeface="+mn-ea"/>
+                <a:cs typeface="+mn-cs"/>
+              </a:rPr>
+              <a:t>LoadFromTextFile</a:t>
+            </a:r>
+            <a:r>
+              <a:rPr lang="en-US" sz="1200" b="0" i="0" u="none" strike="noStrike" kern="1200" dirty="0" smtClean="0">
+                <a:solidFill>
+                  <a:schemeClr val="tx1"/>
+                </a:solidFill>
+                <a:effectLst/>
+                <a:latin typeface="+mn-lt"/>
+                <a:ea typeface="+mn-ea"/>
+                <a:cs typeface="+mn-cs"/>
+              </a:rPr>
+              <a:t>&lt;Passenger&gt;. Specify hasHeader and SeparatorChar ‘,’</a:t>
+            </a:r>
+            <a:endParaRPr lang="en-US" b="0" dirty="0" smtClean="0">
+              <a:effectLst/>
+            </a:endParaRPr>
+          </a:p>
+          <a:p>
+            <a:pPr rtl="0"/>
+            <a:r>
+              <a:rPr lang="en-US" sz="1200" b="0" i="0" u="none" strike="noStrike" kern="1200" dirty="0" smtClean="0">
+                <a:solidFill>
+                  <a:schemeClr val="tx1"/>
+                </a:solidFill>
+                <a:effectLst/>
+                <a:latin typeface="+mn-lt"/>
+                <a:ea typeface="+mn-ea"/>
+                <a:cs typeface="+mn-cs"/>
+              </a:rPr>
+              <a:t>	a. Set hasHeaderSplit to true</a:t>
+            </a:r>
+            <a:endParaRPr lang="en-US" b="0" dirty="0" smtClean="0">
+              <a:effectLst/>
+            </a:endParaRPr>
+          </a:p>
+          <a:p>
+            <a:pPr rtl="0"/>
+            <a:r>
+              <a:rPr lang="en-US" sz="1200" b="0" i="0" u="none" strike="noStrike" kern="1200" dirty="0" smtClean="0">
+                <a:solidFill>
+                  <a:schemeClr val="tx1"/>
+                </a:solidFill>
+                <a:effectLst/>
+                <a:latin typeface="+mn-lt"/>
+                <a:ea typeface="+mn-ea"/>
+                <a:cs typeface="+mn-cs"/>
+              </a:rPr>
+              <a:t>	b. Specify SeparatorChar as comma ‘,’.</a:t>
+            </a:r>
+            <a:endParaRPr lang="en-US" b="0" dirty="0" smtClean="0">
+              <a:effectLst/>
+            </a:endParaRPr>
+          </a:p>
+          <a:p>
+            <a:pPr rtl="0"/>
+            <a:r>
+              <a:rPr lang="en-US" sz="1200" b="0" i="0" u="none" strike="noStrike" kern="1200" dirty="0" smtClean="0">
+                <a:solidFill>
+                  <a:schemeClr val="tx1"/>
+                </a:solidFill>
+                <a:effectLst/>
+                <a:latin typeface="+mn-lt"/>
+                <a:ea typeface="+mn-ea"/>
+                <a:cs typeface="+mn-cs"/>
+              </a:rPr>
+              <a:t>	c. Split data using </a:t>
+            </a:r>
+            <a:r>
+              <a:rPr lang="en-US" sz="1200" b="1" i="0" u="none" strike="noStrike" kern="1200" dirty="0" smtClean="0">
+                <a:solidFill>
+                  <a:schemeClr val="tx1"/>
+                </a:solidFill>
+                <a:effectLst/>
+                <a:latin typeface="+mn-lt"/>
+                <a:ea typeface="+mn-ea"/>
+                <a:cs typeface="+mn-cs"/>
+              </a:rPr>
+              <a:t>TrainTestSplit (80/20) </a:t>
+            </a:r>
+            <a:endParaRPr lang="en-US" b="0" dirty="0" smtClean="0">
+              <a:effectLst/>
+            </a:endParaRPr>
+          </a:p>
+          <a:p>
+            <a:pPr rtl="0"/>
+            <a:r>
+              <a:rPr lang="en-US" b="0" dirty="0" smtClean="0">
+                <a:effectLst/>
+              </a:rPr>
+              <a:t/>
+            </a:r>
+            <a:br>
+              <a:rPr lang="en-US" b="0" dirty="0" smtClean="0">
+                <a:effectLst/>
+              </a:rPr>
+            </a:br>
+            <a:r>
+              <a:rPr lang="en-US" sz="1200" b="0" i="0" u="none" strike="noStrike" kern="1200" dirty="0" smtClean="0">
+                <a:solidFill>
+                  <a:schemeClr val="tx1"/>
+                </a:solidFill>
+                <a:effectLst/>
+                <a:latin typeface="+mn-lt"/>
+                <a:ea typeface="+mn-ea"/>
+                <a:cs typeface="+mn-cs"/>
+              </a:rPr>
+              <a:t>11. </a:t>
+            </a:r>
+            <a:r>
+              <a:rPr lang="en-US" sz="1200" b="1" i="0" u="none" strike="noStrike" kern="1200" dirty="0" smtClean="0">
+                <a:solidFill>
+                  <a:schemeClr val="tx1"/>
+                </a:solidFill>
+                <a:effectLst/>
+                <a:latin typeface="+mn-lt"/>
+                <a:ea typeface="+mn-ea"/>
+                <a:cs typeface="+mn-cs"/>
+              </a:rPr>
+              <a:t>Transform </a:t>
+            </a:r>
+            <a:r>
+              <a:rPr lang="en-US" sz="1200" b="0" i="0" u="none" strike="noStrike" kern="1200" dirty="0" smtClean="0">
+                <a:solidFill>
+                  <a:schemeClr val="tx1"/>
+                </a:solidFill>
+                <a:effectLst/>
+                <a:latin typeface="+mn-lt"/>
+                <a:ea typeface="+mn-ea"/>
+                <a:cs typeface="+mn-cs"/>
+              </a:rPr>
+              <a:t>data:</a:t>
+            </a:r>
+            <a:endParaRPr lang="en-US" b="0" dirty="0" smtClean="0">
+              <a:effectLst/>
+            </a:endParaRPr>
+          </a:p>
+          <a:p>
+            <a:pPr rtl="0"/>
+            <a:r>
+              <a:rPr lang="en-US" sz="1200" b="0" i="0" u="none" strike="noStrike" kern="1200" dirty="0" smtClean="0">
+                <a:solidFill>
+                  <a:schemeClr val="tx1"/>
+                </a:solidFill>
+                <a:effectLst/>
+                <a:latin typeface="+mn-lt"/>
+                <a:ea typeface="+mn-ea"/>
+                <a:cs typeface="+mn-cs"/>
+              </a:rPr>
+              <a:t>	a. Convert non-float(Sex : male/female) to float (0/1) using One-hot encoding</a:t>
+            </a:r>
+            <a:endParaRPr lang="en-US" b="0" dirty="0" smtClean="0">
+              <a:effectLst/>
+            </a:endParaRPr>
+          </a:p>
+          <a:p>
+            <a:pPr rtl="0"/>
+            <a:r>
+              <a:rPr lang="en-US" sz="1200" b="0" i="0" u="none" strike="noStrike" kern="1200" dirty="0" smtClean="0">
+                <a:solidFill>
+                  <a:schemeClr val="tx1"/>
+                </a:solidFill>
+                <a:effectLst/>
+                <a:latin typeface="+mn-lt"/>
+                <a:ea typeface="+mn-ea"/>
+                <a:cs typeface="+mn-cs"/>
+              </a:rPr>
+              <a:t>	b. Replace missing values : Age - Mean</a:t>
+            </a:r>
+            <a:endParaRPr lang="en-US" b="0" dirty="0" smtClean="0">
+              <a:effectLst/>
+            </a:endParaRPr>
+          </a:p>
+          <a:p>
+            <a:pPr rtl="0"/>
+            <a:r>
+              <a:rPr lang="en-US" sz="1200" b="0" i="0" u="none" strike="noStrike" kern="1200" dirty="0" smtClean="0">
+                <a:solidFill>
+                  <a:schemeClr val="tx1"/>
+                </a:solidFill>
+                <a:effectLst/>
+                <a:latin typeface="+mn-lt"/>
+                <a:ea typeface="+mn-ea"/>
+                <a:cs typeface="+mn-cs"/>
+              </a:rPr>
+              <a:t>	b. Concatenate feature : Columns to be used for prediction - PClass, Sex, SiblingsAboard, ParentsAboard</a:t>
+            </a:r>
+            <a:endParaRPr lang="en-US" b="0" dirty="0" smtClean="0">
+              <a:effectLst/>
+            </a:endParaRPr>
+          </a:p>
+          <a:p>
+            <a:pPr rtl="0"/>
+            <a:r>
+              <a:rPr lang="en-US" b="0" dirty="0" smtClean="0">
+                <a:effectLst/>
+              </a:rPr>
+              <a:t/>
+            </a:r>
+            <a:br>
+              <a:rPr lang="en-US" b="0" dirty="0" smtClean="0">
+                <a:effectLst/>
+              </a:rPr>
+            </a:br>
+            <a:r>
+              <a:rPr lang="en-US" sz="1200" b="0" i="0" u="none" strike="noStrike" kern="1200" dirty="0" smtClean="0">
+                <a:solidFill>
+                  <a:schemeClr val="tx1"/>
+                </a:solidFill>
+                <a:effectLst/>
+                <a:latin typeface="+mn-lt"/>
+                <a:ea typeface="+mn-ea"/>
+                <a:cs typeface="+mn-cs"/>
+              </a:rPr>
+              <a:t>12. </a:t>
+            </a:r>
+            <a:r>
+              <a:rPr lang="en-US" sz="1200" b="1" i="0" u="none" strike="noStrike" kern="1200" dirty="0" smtClean="0">
+                <a:solidFill>
+                  <a:schemeClr val="tx1"/>
+                </a:solidFill>
+                <a:effectLst/>
+                <a:latin typeface="+mn-lt"/>
+                <a:ea typeface="+mn-ea"/>
+                <a:cs typeface="+mn-cs"/>
+              </a:rPr>
+              <a:t>Train </a:t>
+            </a:r>
+            <a:r>
+              <a:rPr lang="en-US" sz="1200" b="0" i="0" u="none" strike="noStrike" kern="1200" dirty="0" smtClean="0">
+                <a:solidFill>
+                  <a:schemeClr val="tx1"/>
+                </a:solidFill>
+                <a:effectLst/>
+                <a:latin typeface="+mn-lt"/>
+                <a:ea typeface="+mn-ea"/>
+                <a:cs typeface="+mn-cs"/>
+              </a:rPr>
+              <a:t>model </a:t>
+            </a:r>
+            <a:endParaRPr lang="en-US" b="0" dirty="0" smtClean="0">
+              <a:effectLst/>
+            </a:endParaRPr>
+          </a:p>
+          <a:p>
+            <a:pPr rtl="0"/>
+            <a:r>
+              <a:rPr lang="en-US" sz="1200" b="0" i="0" u="none" strike="noStrike" kern="1200" dirty="0" smtClean="0">
+                <a:solidFill>
+                  <a:schemeClr val="tx1"/>
+                </a:solidFill>
+                <a:effectLst/>
+                <a:latin typeface="+mn-lt"/>
+                <a:ea typeface="+mn-ea"/>
+                <a:cs typeface="+mn-cs"/>
+              </a:rPr>
+              <a:t>	a. Assign algorithm : Binary Classification with Logistic regression. It’s a hit and trial. Not sure if this is the best algorithm </a:t>
+            </a:r>
+            <a:endParaRPr lang="en-US" b="0" dirty="0" smtClean="0">
+              <a:effectLst/>
+            </a:endParaRPr>
+          </a:p>
+          <a:p>
+            <a:pPr rtl="0"/>
+            <a:r>
+              <a:rPr lang="en-US" sz="1200" b="0" i="0" u="none" strike="noStrike" kern="1200" dirty="0" smtClean="0">
+                <a:solidFill>
+                  <a:schemeClr val="tx1"/>
+                </a:solidFill>
+                <a:effectLst/>
+                <a:latin typeface="+mn-lt"/>
+                <a:ea typeface="+mn-ea"/>
+                <a:cs typeface="+mn-cs"/>
+              </a:rPr>
+              <a:t>	b. Train/Fit Model: pass training set</a:t>
+            </a:r>
+            <a:endParaRPr lang="en-US" b="0" dirty="0" smtClean="0">
+              <a:effectLst/>
+            </a:endParaRPr>
+          </a:p>
+          <a:p>
+            <a:pPr rtl="0"/>
+            <a:r>
+              <a:rPr lang="en-US" sz="1200" b="0" i="0" u="none" strike="noStrike" kern="1200" dirty="0" smtClean="0">
+                <a:solidFill>
+                  <a:schemeClr val="tx1"/>
+                </a:solidFill>
+                <a:effectLst/>
+                <a:latin typeface="+mn-lt"/>
+                <a:ea typeface="+mn-ea"/>
+                <a:cs typeface="+mn-cs"/>
+              </a:rPr>
+              <a:t>13. </a:t>
+            </a:r>
+            <a:r>
+              <a:rPr lang="en-US" sz="1200" b="1" i="0" u="none" strike="noStrike" kern="1200" dirty="0" smtClean="0">
+                <a:solidFill>
+                  <a:schemeClr val="tx1"/>
+                </a:solidFill>
+                <a:effectLst/>
+                <a:latin typeface="+mn-lt"/>
+                <a:ea typeface="+mn-ea"/>
+                <a:cs typeface="+mn-cs"/>
+              </a:rPr>
+              <a:t>Evaluate</a:t>
+            </a:r>
+            <a:r>
+              <a:rPr lang="en-US" sz="1200" b="0" i="0" u="none" strike="noStrike" kern="1200" dirty="0" smtClean="0">
+                <a:solidFill>
+                  <a:schemeClr val="tx1"/>
+                </a:solidFill>
+                <a:effectLst/>
+                <a:latin typeface="+mn-lt"/>
+                <a:ea typeface="+mn-ea"/>
+                <a:cs typeface="+mn-cs"/>
+              </a:rPr>
+              <a:t> model</a:t>
+            </a:r>
+            <a:endParaRPr lang="en-US" b="0" dirty="0" smtClean="0">
+              <a:effectLst/>
+            </a:endParaRPr>
+          </a:p>
+          <a:p>
+            <a:pPr rtl="0"/>
+            <a:r>
+              <a:rPr lang="en-US" sz="1200" b="0" i="0" u="none" strike="noStrike" kern="1200" dirty="0" smtClean="0">
+                <a:solidFill>
+                  <a:schemeClr val="tx1"/>
+                </a:solidFill>
+                <a:effectLst/>
+                <a:latin typeface="+mn-lt"/>
+                <a:ea typeface="+mn-ea"/>
+                <a:cs typeface="+mn-cs"/>
+              </a:rPr>
+              <a:t>	a. Get the score </a:t>
+            </a:r>
+            <a:endParaRPr lang="en-US" b="0" dirty="0" smtClean="0">
+              <a:effectLst/>
+            </a:endParaRPr>
+          </a:p>
+          <a:p>
+            <a:pPr rtl="0"/>
+            <a:r>
+              <a:rPr lang="en-US" sz="1200" b="0" i="0" u="none" strike="noStrike" kern="1200" dirty="0" smtClean="0">
+                <a:solidFill>
+                  <a:schemeClr val="tx1"/>
+                </a:solidFill>
+                <a:effectLst/>
+                <a:latin typeface="+mn-lt"/>
+                <a:ea typeface="+mn-ea"/>
+                <a:cs typeface="+mn-cs"/>
+              </a:rPr>
+              <a:t>	b. Evaluate gives various score that help determine accuracy of model based on output column.</a:t>
+            </a:r>
+            <a:endParaRPr lang="en-US" b="0" dirty="0" smtClean="0">
+              <a:effectLst/>
+            </a:endParaRPr>
+          </a:p>
+          <a:p>
+            <a:pPr rtl="0"/>
+            <a:r>
+              <a:rPr lang="en-US" sz="1200" b="0" i="0" u="none" strike="noStrike" kern="1200" dirty="0" smtClean="0">
+                <a:solidFill>
+                  <a:schemeClr val="tx1"/>
+                </a:solidFill>
+                <a:effectLst/>
+                <a:latin typeface="+mn-lt"/>
+                <a:ea typeface="+mn-ea"/>
+                <a:cs typeface="+mn-cs"/>
+              </a:rPr>
+              <a:t>		Gives accuracy of 80%</a:t>
+            </a:r>
+            <a:endParaRPr lang="en-US" b="0" dirty="0" smtClean="0">
+              <a:effectLst/>
+            </a:endParaRPr>
+          </a:p>
+          <a:p>
+            <a:pPr rtl="0"/>
+            <a:r>
+              <a:rPr lang="en-US" b="0" dirty="0" smtClean="0">
+                <a:effectLst/>
+              </a:rPr>
+              <a:t/>
+            </a:r>
+            <a:br>
+              <a:rPr lang="en-US" b="0" dirty="0" smtClean="0">
+                <a:effectLst/>
+              </a:rPr>
+            </a:br>
+            <a:r>
+              <a:rPr lang="en-US" sz="1200" b="0" i="0" u="none" strike="noStrike" kern="1200" dirty="0" smtClean="0">
+                <a:solidFill>
+                  <a:schemeClr val="tx1"/>
+                </a:solidFill>
+                <a:effectLst/>
+                <a:latin typeface="+mn-lt"/>
+                <a:ea typeface="+mn-ea"/>
+                <a:cs typeface="+mn-cs"/>
+              </a:rPr>
+              <a:t>14. Modify anything(Add/remove Features/Parameters/algorithm) and try to get better accuracy</a:t>
+            </a:r>
+            <a:endParaRPr lang="en-US" b="0" dirty="0" smtClean="0">
+              <a:effectLst/>
+            </a:endParaRPr>
+          </a:p>
+          <a:p>
+            <a:pPr rtl="0"/>
+            <a:r>
+              <a:rPr lang="en-US" sz="1200" b="0" i="0" u="none" strike="noStrike" kern="1200" dirty="0" smtClean="0">
+                <a:solidFill>
+                  <a:schemeClr val="tx1"/>
+                </a:solidFill>
+                <a:effectLst/>
+                <a:latin typeface="+mn-lt"/>
+                <a:ea typeface="+mn-ea"/>
+                <a:cs typeface="+mn-cs"/>
+              </a:rPr>
+              <a:t>15. </a:t>
+            </a:r>
+            <a:r>
+              <a:rPr lang="en-US" sz="1200" b="1" i="0" u="none" strike="noStrike" kern="1200" dirty="0" smtClean="0">
+                <a:solidFill>
+                  <a:schemeClr val="tx1"/>
+                </a:solidFill>
+                <a:effectLst/>
+                <a:latin typeface="+mn-lt"/>
+                <a:ea typeface="+mn-ea"/>
+                <a:cs typeface="+mn-cs"/>
+              </a:rPr>
+              <a:t>Save</a:t>
+            </a:r>
+            <a:endParaRPr lang="en-US" b="1" dirty="0" smtClean="0">
+              <a:effectLst/>
+            </a:endParaRPr>
+          </a:p>
+          <a:p>
+            <a:pPr rtl="0"/>
+            <a:r>
+              <a:rPr lang="en-US" sz="1200" b="0" i="0" u="none" strike="noStrike" kern="1200" dirty="0" smtClean="0">
+                <a:solidFill>
+                  <a:schemeClr val="tx1"/>
+                </a:solidFill>
+                <a:effectLst/>
+                <a:latin typeface="+mn-lt"/>
+                <a:ea typeface="+mn-ea"/>
+                <a:cs typeface="+mn-cs"/>
+              </a:rPr>
+              <a:t>	a. Save Model schema as Model.zip to be re-used </a:t>
+            </a:r>
+            <a:endParaRPr lang="en-US" b="0" dirty="0" smtClean="0">
+              <a:effectLst/>
+            </a:endParaRPr>
+          </a:p>
+          <a:p>
+            <a:pPr rtl="0"/>
+            <a:r>
+              <a:rPr lang="en-US" sz="1200" b="0" i="0" u="none" strike="noStrike" kern="1200" dirty="0" smtClean="0">
+                <a:solidFill>
+                  <a:schemeClr val="tx1"/>
+                </a:solidFill>
+                <a:effectLst/>
+                <a:latin typeface="+mn-lt"/>
+                <a:ea typeface="+mn-ea"/>
+                <a:cs typeface="+mn-cs"/>
+              </a:rPr>
+              <a:t>	b. Reuse this model.zip in various application such as web, desktop, Azure serverless functions</a:t>
+            </a:r>
+            <a:endParaRPr lang="en-US" b="0" dirty="0" smtClean="0">
+              <a:effectLst/>
+            </a:endParaRPr>
+          </a:p>
+          <a:p>
+            <a:pPr rtl="0"/>
+            <a:r>
+              <a:rPr lang="en-US" sz="1200" b="0" i="0" u="none" strike="noStrike" kern="1200" dirty="0" smtClean="0">
+                <a:solidFill>
+                  <a:schemeClr val="tx1"/>
+                </a:solidFill>
+                <a:effectLst/>
+                <a:latin typeface="+mn-lt"/>
+                <a:ea typeface="+mn-ea"/>
+                <a:cs typeface="+mn-cs"/>
+              </a:rPr>
+              <a:t>16. Completed in less than 40 lines of code.</a:t>
+            </a:r>
+            <a:endParaRPr lang="en-US" b="0" dirty="0" smtClean="0">
+              <a:effectLst/>
+            </a:endParaRPr>
+          </a:p>
+          <a:p>
+            <a:pPr rtl="0"/>
+            <a:r>
+              <a:rPr lang="en-US" sz="1200" b="0" i="0" u="none" strike="noStrike" kern="1200" dirty="0" smtClean="0">
+                <a:solidFill>
+                  <a:schemeClr val="tx1"/>
+                </a:solidFill>
+                <a:effectLst/>
+                <a:latin typeface="+mn-lt"/>
+                <a:ea typeface="+mn-ea"/>
+                <a:cs typeface="+mn-cs"/>
+              </a:rPr>
+              <a:t>17. </a:t>
+            </a:r>
+            <a:r>
+              <a:rPr lang="en-US" sz="1200" b="1" i="0" u="none" strike="noStrike" kern="1200" dirty="0" smtClean="0">
+                <a:solidFill>
+                  <a:schemeClr val="tx1"/>
+                </a:solidFill>
+                <a:effectLst/>
+                <a:latin typeface="+mn-lt"/>
+                <a:ea typeface="+mn-ea"/>
+                <a:cs typeface="+mn-cs"/>
+              </a:rPr>
+              <a:t>Predict</a:t>
+            </a:r>
+            <a:r>
+              <a:rPr lang="en-US" sz="1200" b="0" i="0" u="none" strike="noStrike" kern="1200" dirty="0" smtClean="0">
+                <a:solidFill>
+                  <a:schemeClr val="tx1"/>
+                </a:solidFill>
+                <a:effectLst/>
+                <a:latin typeface="+mn-lt"/>
+                <a:ea typeface="+mn-ea"/>
+                <a:cs typeface="+mn-cs"/>
+              </a:rPr>
+              <a:t> : PredictionEngine, Prediction class and Sample, </a:t>
+            </a:r>
+            <a:endParaRPr lang="en-US" b="0" dirty="0" smtClean="0">
+              <a:effectLst/>
+            </a:endParaRPr>
+          </a:p>
+          <a:p>
+            <a:pPr rtl="0"/>
+            <a:r>
+              <a:rPr lang="en-US" sz="1200" b="0" i="0" u="none" strike="noStrike" kern="1200" dirty="0" smtClean="0">
+                <a:solidFill>
+                  <a:schemeClr val="tx1"/>
+                </a:solidFill>
+                <a:effectLst/>
+                <a:latin typeface="+mn-lt"/>
+                <a:ea typeface="+mn-ea"/>
+                <a:cs typeface="+mn-cs"/>
+              </a:rPr>
+              <a:t>18. </a:t>
+            </a:r>
+            <a:r>
+              <a:rPr lang="en-US" sz="1200" b="1" i="0" u="none" strike="noStrike" kern="1200" dirty="0" smtClean="0">
+                <a:solidFill>
+                  <a:schemeClr val="tx1"/>
+                </a:solidFill>
+                <a:effectLst/>
+                <a:latin typeface="+mn-lt"/>
+                <a:ea typeface="+mn-ea"/>
+                <a:cs typeface="+mn-cs"/>
+              </a:rPr>
+              <a:t>AutoML</a:t>
+            </a:r>
+            <a:r>
+              <a:rPr lang="en-US" sz="1200" b="0" i="0" u="none" strike="noStrike" kern="1200" dirty="0" smtClean="0">
+                <a:solidFill>
+                  <a:schemeClr val="tx1"/>
+                </a:solidFill>
+                <a:effectLst/>
+                <a:latin typeface="+mn-lt"/>
+                <a:ea typeface="+mn-ea"/>
+                <a:cs typeface="+mn-cs"/>
+              </a:rPr>
+              <a:t> : Automatic Machine learning using ML.Net - PREVIEW</a:t>
+            </a:r>
+            <a:endParaRPr lang="en-US" b="0" dirty="0" smtClean="0">
+              <a:effectLst/>
+            </a:endParaRPr>
+          </a:p>
+          <a:p>
+            <a:pPr rtl="0"/>
+            <a:r>
+              <a:rPr lang="en-US" sz="1200" b="0" i="0" u="none" strike="noStrike" kern="1200" dirty="0" smtClean="0">
+                <a:solidFill>
+                  <a:schemeClr val="tx1"/>
+                </a:solidFill>
+                <a:effectLst/>
+                <a:latin typeface="+mn-lt"/>
+                <a:ea typeface="+mn-ea"/>
+                <a:cs typeface="+mn-cs"/>
+              </a:rPr>
+              <a:t>	a. Manual process is a tedious</a:t>
+            </a:r>
+            <a:endParaRPr lang="en-US" b="0" dirty="0" smtClean="0">
+              <a:effectLst/>
+            </a:endParaRPr>
+          </a:p>
+          <a:p>
+            <a:pPr rtl="0"/>
+            <a:r>
+              <a:rPr lang="en-US" sz="1200" b="0" i="0" u="none" strike="noStrike" kern="1200" dirty="0" smtClean="0">
+                <a:solidFill>
+                  <a:schemeClr val="tx1"/>
+                </a:solidFill>
+                <a:effectLst/>
+                <a:latin typeface="+mn-lt"/>
+                <a:ea typeface="+mn-ea"/>
+                <a:cs typeface="+mn-cs"/>
+              </a:rPr>
+              <a:t>		i. Selecting algorithm</a:t>
+            </a:r>
+            <a:endParaRPr lang="en-US" b="0" dirty="0" smtClean="0">
+              <a:effectLst/>
+            </a:endParaRPr>
+          </a:p>
+          <a:p>
+            <a:pPr rtl="0"/>
+            <a:r>
+              <a:rPr lang="en-US" sz="1200" b="0" i="0" u="none" strike="noStrike" kern="1200" dirty="0" smtClean="0">
+                <a:solidFill>
+                  <a:schemeClr val="tx1"/>
+                </a:solidFill>
+                <a:effectLst/>
+                <a:latin typeface="+mn-lt"/>
+                <a:ea typeface="+mn-ea"/>
+                <a:cs typeface="+mn-cs"/>
+              </a:rPr>
+              <a:t>		Ii.Time consuming (running models for different algorithms/hyperparameters)</a:t>
+            </a:r>
+            <a:endParaRPr lang="en-US" b="0" dirty="0" smtClean="0">
+              <a:effectLst/>
+            </a:endParaRPr>
+          </a:p>
+          <a:p>
+            <a:pPr rtl="0"/>
+            <a:r>
+              <a:rPr lang="en-US" sz="1200" b="0" i="0" u="none" strike="noStrike" kern="1200" dirty="0" smtClean="0">
+                <a:solidFill>
+                  <a:schemeClr val="tx1"/>
+                </a:solidFill>
+                <a:effectLst/>
+                <a:latin typeface="+mn-lt"/>
+                <a:ea typeface="+mn-ea"/>
+                <a:cs typeface="+mn-cs"/>
+              </a:rPr>
+              <a:t>	b. AutoML</a:t>
+            </a:r>
+            <a:endParaRPr lang="en-US" b="0" dirty="0" smtClean="0">
+              <a:effectLst/>
+            </a:endParaRPr>
+          </a:p>
+          <a:p>
+            <a:pPr rtl="0"/>
+            <a:r>
+              <a:rPr lang="en-US" sz="1200" b="0" i="0" u="none" strike="noStrike" kern="1200" dirty="0" smtClean="0">
+                <a:solidFill>
+                  <a:schemeClr val="tx1"/>
+                </a:solidFill>
+                <a:effectLst/>
+                <a:latin typeface="+mn-lt"/>
+                <a:ea typeface="+mn-ea"/>
+                <a:cs typeface="+mn-cs"/>
+              </a:rPr>
+              <a:t>		i. Runs different algorithm</a:t>
+            </a:r>
+            <a:endParaRPr lang="en-US" b="0" dirty="0" smtClean="0">
+              <a:effectLst/>
+            </a:endParaRPr>
+          </a:p>
+          <a:p>
+            <a:pPr rtl="0"/>
+            <a:r>
+              <a:rPr lang="en-US" sz="1200" b="0" i="0" u="none" strike="noStrike" kern="1200" dirty="0" smtClean="0">
+                <a:solidFill>
+                  <a:schemeClr val="tx1"/>
+                </a:solidFill>
+                <a:effectLst/>
+                <a:latin typeface="+mn-lt"/>
+                <a:ea typeface="+mn-ea"/>
+                <a:cs typeface="+mn-cs"/>
+              </a:rPr>
+              <a:t>		Ii. Best algorithm</a:t>
+            </a:r>
+            <a:endParaRPr lang="en-US" b="0" dirty="0" smtClean="0">
+              <a:effectLst/>
+            </a:endParaRPr>
+          </a:p>
+          <a:p>
+            <a:pPr rtl="0"/>
+            <a:r>
+              <a:rPr lang="en-US" sz="1200" b="0" i="0" u="none" strike="noStrike" kern="1200" dirty="0" smtClean="0">
+                <a:solidFill>
+                  <a:schemeClr val="tx1"/>
+                </a:solidFill>
+                <a:effectLst/>
+                <a:latin typeface="+mn-lt"/>
+                <a:ea typeface="+mn-ea"/>
+                <a:cs typeface="+mn-cs"/>
+              </a:rPr>
+              <a:t>		Iii. Summary of multiple algorithm used</a:t>
+            </a:r>
+            <a:endParaRPr lang="en-US" b="0" dirty="0" smtClean="0">
+              <a:effectLst/>
+            </a:endParaRPr>
+          </a:p>
+          <a:p>
+            <a:pPr rtl="0"/>
+            <a:r>
+              <a:rPr lang="en-US" sz="1200" b="0" i="0" u="none" strike="noStrike" kern="1200" dirty="0" smtClean="0">
+                <a:solidFill>
+                  <a:schemeClr val="tx1"/>
+                </a:solidFill>
+                <a:effectLst/>
+                <a:latin typeface="+mn-lt"/>
+                <a:ea typeface="+mn-ea"/>
+                <a:cs typeface="+mn-cs"/>
+              </a:rPr>
+              <a:t>		Iv. Auto-Generate code </a:t>
+            </a:r>
+            <a:endParaRPr lang="en-US" b="0" dirty="0" smtClean="0">
+              <a:effectLst/>
+            </a:endParaRPr>
+          </a:p>
+          <a:p>
+            <a:pPr rtl="0"/>
+            <a:r>
+              <a:rPr lang="en-US" b="0" dirty="0" smtClean="0">
+                <a:effectLst/>
+              </a:rPr>
+              <a:t/>
+            </a:r>
+            <a:br>
+              <a:rPr lang="en-US" b="0" dirty="0" smtClean="0">
+                <a:effectLst/>
+              </a:rPr>
+            </a:br>
+            <a:r>
+              <a:rPr lang="en-US" b="0" dirty="0" smtClean="0">
+                <a:effectLst/>
+              </a:rPr>
+              <a:t>	</a:t>
+            </a:r>
+            <a:r>
+              <a:rPr lang="en-US" sz="1200" b="0" i="0" u="none" strike="noStrike" kern="1200" dirty="0" smtClean="0">
+                <a:solidFill>
+                  <a:schemeClr val="tx1"/>
+                </a:solidFill>
+                <a:effectLst/>
+                <a:latin typeface="+mn-lt"/>
+                <a:ea typeface="+mn-ea"/>
+                <a:cs typeface="+mn-cs"/>
+              </a:rPr>
+              <a:t>c. Show summary and improved accuracy from 80% to 84%</a:t>
+            </a:r>
+            <a:endParaRPr lang="en-US" b="0" dirty="0" smtClean="0">
+              <a:effectLst/>
+            </a:endParaRPr>
+          </a:p>
+          <a:p>
+            <a:pPr rtl="0"/>
+            <a:r>
+              <a:rPr lang="en-US" sz="1200" b="0" i="0" u="none" strike="noStrike" kern="1200" dirty="0" smtClean="0">
+                <a:solidFill>
+                  <a:schemeClr val="tx1"/>
+                </a:solidFill>
+                <a:effectLst/>
+                <a:latin typeface="+mn-lt"/>
+                <a:ea typeface="+mn-ea"/>
+                <a:cs typeface="+mn-cs"/>
+              </a:rPr>
+              <a:t>	d. Show generated code and compare with manual code</a:t>
+            </a:r>
+            <a:endParaRPr lang="en-US" b="0" dirty="0" smtClean="0">
+              <a:effectLst/>
+            </a:endParaRPr>
+          </a:p>
+          <a:p>
+            <a:pPr rtl="0"/>
+            <a:r>
+              <a:rPr lang="en-US" b="0" dirty="0" smtClean="0">
+                <a:effectLst/>
+              </a:rPr>
+              <a:t/>
+            </a:r>
+            <a:br>
+              <a:rPr lang="en-US" b="0" dirty="0" smtClean="0">
+                <a:effectLst/>
+              </a:rPr>
+            </a:br>
+            <a:r>
+              <a:rPr lang="en-US" sz="1200" b="0" i="0" u="none" strike="noStrike" kern="1200" dirty="0" smtClean="0">
+                <a:solidFill>
+                  <a:schemeClr val="tx1"/>
+                </a:solidFill>
+                <a:effectLst/>
+                <a:latin typeface="+mn-lt"/>
+                <a:ea typeface="+mn-ea"/>
+                <a:cs typeface="+mn-cs"/>
+              </a:rPr>
+              <a:t>19. Sow matrices</a:t>
+            </a:r>
+            <a:endParaRPr lang="en-US" b="0" dirty="0" smtClean="0">
+              <a:effectLst/>
+            </a:endParaRPr>
           </a:p>
         </p:txBody>
       </p:sp>
@@ -8373,7 +8686,7 @@
           <a:p>
             <a:fld id="{55849CEA-452E-49F3-92ED-210B64DD3C6C}" type="slidenum">
               <a:rPr lang="en-US" smtClean="0"/>
-              <a:t>22</a:t>
+              <a:t>20</a:t>
             </a:fld>
             <a:endParaRPr lang="en-US" dirty="0"/>
           </a:p>
@@ -8382,7 +8695,7 @@
     </p:spTree>
     <p:extLst>
       <p:ext uri="{BB962C8B-B14F-4D97-AF65-F5344CB8AC3E}">
-        <p14:creationId xmlns:p14="http://schemas.microsoft.com/office/powerpoint/2010/main" val="74304540"/>
+        <p14:creationId xmlns:p14="http://schemas.microsoft.com/office/powerpoint/2010/main" val="1117024890"/>
       </p:ext>
     </p:extLst>
   </p:cSld>
@@ -8467,7 +8780,7 @@
           <a:p>
             <a:fld id="{55849CEA-452E-49F3-92ED-210B64DD3C6C}" type="slidenum">
               <a:rPr lang="en-US" smtClean="0"/>
-              <a:t>23</a:t>
+              <a:t>21</a:t>
             </a:fld>
             <a:endParaRPr lang="en-US" dirty="0"/>
           </a:p>
@@ -8476,7 +8789,7 @@
     </p:spTree>
     <p:extLst>
       <p:ext uri="{BB962C8B-B14F-4D97-AF65-F5344CB8AC3E}">
-        <p14:creationId xmlns:p14="http://schemas.microsoft.com/office/powerpoint/2010/main" val="2114391985"/>
+        <p14:creationId xmlns:p14="http://schemas.microsoft.com/office/powerpoint/2010/main" val="2769389728"/>
       </p:ext>
     </p:extLst>
   </p:cSld>
@@ -8532,7 +8845,13 @@
           <a:p>
             <a:r>
               <a:rPr lang="en-US" dirty="0" smtClean="0"/>
-              <a:t>1. Choose algorithm : Binary classification </a:t>
+              <a:t>1. One-hot encoding : Sex column</a:t>
+            </a:r>
+          </a:p>
+          <a:p>
+            <a:r>
+              <a:rPr lang="en-US" dirty="0" smtClean="0"/>
+              <a:t>2. Missing or wrong values : Average/Mean</a:t>
             </a:r>
             <a:endParaRPr lang="en-US" dirty="0"/>
           </a:p>
@@ -8555,7 +8874,7 @@
           <a:p>
             <a:fld id="{55849CEA-452E-49F3-92ED-210B64DD3C6C}" type="slidenum">
               <a:rPr lang="en-US" smtClean="0"/>
-              <a:t>24</a:t>
+              <a:t>22</a:t>
             </a:fld>
             <a:endParaRPr lang="en-US" dirty="0"/>
           </a:p>
@@ -8564,7 +8883,7 @@
     </p:spTree>
     <p:extLst>
       <p:ext uri="{BB962C8B-B14F-4D97-AF65-F5344CB8AC3E}">
-        <p14:creationId xmlns:p14="http://schemas.microsoft.com/office/powerpoint/2010/main" val="3363331460"/>
+        <p14:creationId xmlns:p14="http://schemas.microsoft.com/office/powerpoint/2010/main" val="74304540"/>
       </p:ext>
     </p:extLst>
   </p:cSld>
@@ -8620,14 +8939,14 @@
           <a:p>
             <a:r>
               <a:rPr lang="en-US" dirty="0" smtClean="0"/>
-              <a:t>1. Evaluate on Test</a:t>
-            </a:r>
-            <a:r>
-              <a:rPr lang="en-US" baseline="0" dirty="0" smtClean="0"/>
-              <a:t> data</a:t>
-            </a:r>
-          </a:p>
-          <a:p>
+              <a:t>1. One-hot encoding : Sex column</a:t>
+            </a:r>
+          </a:p>
+          <a:p>
+            <a:r>
+              <a:rPr lang="en-US" dirty="0" smtClean="0"/>
+              <a:t>2. Missing or wrong values : Average/Mean</a:t>
+            </a:r>
             <a:endParaRPr lang="en-US" dirty="0"/>
           </a:p>
         </p:txBody>
@@ -8649,7 +8968,7 @@
           <a:p>
             <a:fld id="{55849CEA-452E-49F3-92ED-210B64DD3C6C}" type="slidenum">
               <a:rPr lang="en-US" smtClean="0"/>
-              <a:t>25</a:t>
+              <a:t>23</a:t>
             </a:fld>
             <a:endParaRPr lang="en-US" dirty="0"/>
           </a:p>
@@ -8658,7 +8977,7 @@
     </p:spTree>
     <p:extLst>
       <p:ext uri="{BB962C8B-B14F-4D97-AF65-F5344CB8AC3E}">
-        <p14:creationId xmlns:p14="http://schemas.microsoft.com/office/powerpoint/2010/main" val="1699759432"/>
+        <p14:creationId xmlns:p14="http://schemas.microsoft.com/office/powerpoint/2010/main" val="2114391985"/>
       </p:ext>
     </p:extLst>
   </p:cSld>
@@ -8894,7 +9213,7 @@
           <a:p>
             <a:fld id="{48A87A34-81AB-432B-8DAE-1953F412C126}" type="datetimeFigureOut">
               <a:rPr lang="en-US" smtClean="0"/>
-              <a:t>8/9/2019</a:t>
+              <a:t>8/10/2019</a:t>
             </a:fld>
             <a:endParaRPr lang="en-US" dirty="0"/>
           </a:p>
@@ -9102,7 +9421,7 @@
           <a:p>
             <a:fld id="{48A87A34-81AB-432B-8DAE-1953F412C126}" type="datetimeFigureOut">
               <a:rPr lang="en-US" smtClean="0"/>
-              <a:t>8/9/2019</a:t>
+              <a:t>8/10/2019</a:t>
             </a:fld>
             <a:endParaRPr lang="en-US" dirty="0"/>
           </a:p>
@@ -9358,7 +9677,7 @@
           <a:p>
             <a:fld id="{48A87A34-81AB-432B-8DAE-1953F412C126}" type="datetimeFigureOut">
               <a:rPr lang="en-US" smtClean="0"/>
-              <a:t>8/9/2019</a:t>
+              <a:t>8/10/2019</a:t>
             </a:fld>
             <a:endParaRPr lang="en-US" dirty="0"/>
           </a:p>
@@ -9532,7 +9851,7 @@
           <a:p>
             <a:fld id="{48A87A34-81AB-432B-8DAE-1953F412C126}" type="datetimeFigureOut">
               <a:rPr lang="en-US" smtClean="0"/>
-              <a:t>8/9/2019</a:t>
+              <a:t>8/10/2019</a:t>
             </a:fld>
             <a:endParaRPr lang="en-US" dirty="0"/>
           </a:p>
@@ -9875,7 +10194,7 @@
           <a:p>
             <a:fld id="{48A87A34-81AB-432B-8DAE-1953F412C126}" type="datetimeFigureOut">
               <a:rPr lang="en-US" smtClean="0"/>
-              <a:t>8/9/2019</a:t>
+              <a:t>8/10/2019</a:t>
             </a:fld>
             <a:endParaRPr lang="en-US" dirty="0"/>
           </a:p>
@@ -10150,7 +10469,7 @@
           <a:p>
             <a:fld id="{48A87A34-81AB-432B-8DAE-1953F412C126}" type="datetimeFigureOut">
               <a:rPr lang="en-US" smtClean="0"/>
-              <a:t>8/9/2019</a:t>
+              <a:t>8/10/2019</a:t>
             </a:fld>
             <a:endParaRPr lang="en-US" dirty="0"/>
           </a:p>
@@ -10529,7 +10848,7 @@
           <a:p>
             <a:fld id="{48A87A34-81AB-432B-8DAE-1953F412C126}" type="datetimeFigureOut">
               <a:rPr lang="en-US" smtClean="0"/>
-              <a:t>8/9/2019</a:t>
+              <a:t>8/10/2019</a:t>
             </a:fld>
             <a:endParaRPr lang="en-US" dirty="0"/>
           </a:p>
@@ -10647,7 +10966,7 @@
           <a:p>
             <a:fld id="{48A87A34-81AB-432B-8DAE-1953F412C126}" type="datetimeFigureOut">
               <a:rPr lang="en-US" smtClean="0"/>
-              <a:t>8/9/2019</a:t>
+              <a:t>8/10/2019</a:t>
             </a:fld>
             <a:endParaRPr lang="en-US" dirty="0"/>
           </a:p>
@@ -10818,7 +11137,7 @@
           <a:p>
             <a:fld id="{48A87A34-81AB-432B-8DAE-1953F412C126}" type="datetimeFigureOut">
               <a:rPr lang="en-US" smtClean="0"/>
-              <a:t>8/9/2019</a:t>
+              <a:t>8/10/2019</a:t>
             </a:fld>
             <a:endParaRPr lang="en-US" dirty="0"/>
           </a:p>
@@ -11172,7 +11491,7 @@
           <a:p>
             <a:fld id="{48A87A34-81AB-432B-8DAE-1953F412C126}" type="datetimeFigureOut">
               <a:rPr lang="en-US" smtClean="0"/>
-              <a:t>8/9/2019</a:t>
+              <a:t>8/10/2019</a:t>
             </a:fld>
             <a:endParaRPr lang="en-US" dirty="0"/>
           </a:p>
@@ -11554,7 +11873,7 @@
           <a:p>
             <a:fld id="{48A87A34-81AB-432B-8DAE-1953F412C126}" type="datetimeFigureOut">
               <a:rPr lang="en-US" smtClean="0"/>
-              <a:t>8/9/2019</a:t>
+              <a:t>8/10/2019</a:t>
             </a:fld>
             <a:endParaRPr lang="en-US" dirty="0"/>
           </a:p>
@@ -11842,7 +12161,7 @@
             <a:fld id="{48A87A34-81AB-432B-8DAE-1953F412C126}" type="datetimeFigureOut">
               <a:rPr lang="en-US" smtClean="0"/>
               <a:pPr/>
-              <a:t>8/9/2019</a:t>
+              <a:t>8/10/2019</a:t>
             </a:fld>
             <a:endParaRPr lang="en-US" dirty="0"/>
           </a:p>
@@ -15279,6 +15598,96 @@
 </file>
 
 <file path=ppt/slides/slide28.xml><?xml version="1.0" encoding="utf-8"?>
+<p:sld xmlns:a="http://schemas.openxmlformats.org/drawingml/2006/main" xmlns:r="http://schemas.openxmlformats.org/officeDocument/2006/relationships" xmlns:p="http://schemas.openxmlformats.org/presentationml/2006/main">
+  <p:cSld>
+    <p:spTree>
+      <p:nvGrpSpPr>
+        <p:cNvPr id="1" name=""/>
+        <p:cNvGrpSpPr/>
+        <p:nvPr/>
+      </p:nvGrpSpPr>
+      <p:grpSpPr>
+        <a:xfrm>
+          <a:off x="0" y="0"/>
+          <a:ext cx="0" cy="0"/>
+          <a:chOff x="0" y="0"/>
+          <a:chExt cx="0" cy="0"/>
+        </a:xfrm>
+      </p:grpSpPr>
+      <p:sp>
+        <p:nvSpPr>
+          <p:cNvPr id="2" name="Title 1"/>
+          <p:cNvSpPr>
+            <a:spLocks noGrp="1"/>
+          </p:cNvSpPr>
+          <p:nvPr>
+            <p:ph type="title"/>
+          </p:nvPr>
+        </p:nvSpPr>
+        <p:spPr/>
+        <p:txBody>
+          <a:bodyPr>
+            <a:normAutofit/>
+          </a:bodyPr>
+          <a:lstStyle/>
+          <a:p>
+            <a:r>
+              <a:rPr lang="en-US" sz="3600" dirty="0" smtClean="0"/>
+              <a:t>Load a model</a:t>
+            </a:r>
+            <a:endParaRPr lang="en-US" sz="3600" b="1" dirty="0">
+              <a:solidFill>
+                <a:srgbClr val="00B050"/>
+              </a:solidFill>
+            </a:endParaRPr>
+          </a:p>
+        </p:txBody>
+      </p:sp>
+      <p:pic>
+        <p:nvPicPr>
+          <p:cNvPr id="5" name="Picture 4"/>
+          <p:cNvPicPr>
+            <a:picLocks noChangeAspect="1"/>
+          </p:cNvPicPr>
+          <p:nvPr/>
+        </p:nvPicPr>
+        <p:blipFill>
+          <a:blip r:embed="rId3"/>
+          <a:stretch>
+            <a:fillRect/>
+          </a:stretch>
+        </p:blipFill>
+        <p:spPr>
+          <a:xfrm>
+            <a:off x="1267968" y="2087354"/>
+            <a:ext cx="9862576" cy="2740677"/>
+          </a:xfrm>
+          <a:prstGeom prst="rect">
+            <a:avLst/>
+          </a:prstGeom>
+        </p:spPr>
+      </p:pic>
+    </p:spTree>
+    <p:extLst>
+      <p:ext uri="{BB962C8B-B14F-4D97-AF65-F5344CB8AC3E}">
+        <p14:creationId xmlns:p14="http://schemas.microsoft.com/office/powerpoint/2010/main" val="2103816394"/>
+      </p:ext>
+    </p:extLst>
+  </p:cSld>
+  <p:clrMapOvr>
+    <a:masterClrMapping/>
+  </p:clrMapOvr>
+  <p:timing>
+    <p:tnLst>
+      <p:par>
+        <p:cTn id="1" dur="indefinite" restart="never" nodeType="tmRoot"/>
+      </p:par>
+    </p:tnLst>
+  </p:timing>
+</p:sld>
+</file>
+
+<file path=ppt/slides/slide29.xml><?xml version="1.0" encoding="utf-8"?>
 <p:sld xmlns:a="http://schemas.openxmlformats.org/drawingml/2006/main" xmlns:r="http://schemas.openxmlformats.org/officeDocument/2006/relationships" xmlns:p="http://schemas.openxmlformats.org/presentationml/2006/main">
   <p:cSld>
     <p:spTree>
@@ -16286,210 +16695,6 @@
 </p:sld>
 </file>
 
-<file path=ppt/slides/slide29.xml><?xml version="1.0" encoding="utf-8"?>
-<p:sld xmlns:a="http://schemas.openxmlformats.org/drawingml/2006/main" xmlns:r="http://schemas.openxmlformats.org/officeDocument/2006/relationships" xmlns:p="http://schemas.openxmlformats.org/presentationml/2006/main">
-  <p:cSld>
-    <p:spTree>
-      <p:nvGrpSpPr>
-        <p:cNvPr id="1" name=""/>
-        <p:cNvGrpSpPr/>
-        <p:nvPr/>
-      </p:nvGrpSpPr>
-      <p:grpSpPr>
-        <a:xfrm>
-          <a:off x="0" y="0"/>
-          <a:ext cx="0" cy="0"/>
-          <a:chOff x="0" y="0"/>
-          <a:chExt cx="0" cy="0"/>
-        </a:xfrm>
-      </p:grpSpPr>
-      <p:sp>
-        <p:nvSpPr>
-          <p:cNvPr id="2" name="Title 1"/>
-          <p:cNvSpPr>
-            <a:spLocks noGrp="1"/>
-          </p:cNvSpPr>
-          <p:nvPr>
-            <p:ph type="title"/>
-          </p:nvPr>
-        </p:nvSpPr>
-        <p:spPr>
-          <a:xfrm>
-            <a:off x="239485" y="993058"/>
-            <a:ext cx="3783542" cy="569042"/>
-          </a:xfrm>
-        </p:spPr>
-        <p:txBody>
-          <a:bodyPr>
-            <a:normAutofit/>
-          </a:bodyPr>
-          <a:lstStyle/>
-          <a:p>
-            <a:r>
-              <a:rPr lang="en-US" dirty="0" smtClean="0"/>
-              <a:t>Interoperability</a:t>
-            </a:r>
-            <a:endParaRPr lang="en-US" dirty="0"/>
-          </a:p>
-        </p:txBody>
-      </p:sp>
-      <p:sp>
-        <p:nvSpPr>
-          <p:cNvPr id="4" name="Text Placeholder 3"/>
-          <p:cNvSpPr>
-            <a:spLocks noGrp="1"/>
-          </p:cNvSpPr>
-          <p:nvPr>
-            <p:ph type="body" sz="half" idx="2"/>
-          </p:nvPr>
-        </p:nvSpPr>
-        <p:spPr>
-          <a:xfrm>
-            <a:off x="166990" y="1687286"/>
-            <a:ext cx="3856037" cy="2227006"/>
-          </a:xfrm>
-        </p:spPr>
-        <p:txBody>
-          <a:bodyPr>
-            <a:normAutofit lnSpcReduction="10000"/>
-          </a:bodyPr>
-          <a:lstStyle/>
-          <a:p>
-            <a:pPr marL="228600" indent="-228600" fontAlgn="base">
-              <a:lnSpc>
-                <a:spcPct val="100000"/>
-              </a:lnSpc>
-              <a:buFont typeface="Arial" panose="020B0604020202020204" pitchFamily="34" charset="0"/>
-              <a:buChar char="•"/>
-            </a:pPr>
-            <a:r>
-              <a:rPr lang="en-US" sz="2000" dirty="0" smtClean="0"/>
-              <a:t>Photo-Search</a:t>
-            </a:r>
-          </a:p>
-          <a:p>
-            <a:pPr marL="228600" indent="-228600" fontAlgn="base">
-              <a:lnSpc>
-                <a:spcPct val="100000"/>
-              </a:lnSpc>
-              <a:buFont typeface="Arial" panose="020B0604020202020204" pitchFamily="34" charset="0"/>
-              <a:buChar char="•"/>
-            </a:pPr>
-            <a:r>
-              <a:rPr lang="en-US" sz="2000" dirty="0" smtClean="0"/>
-              <a:t>ML.Net + ONNX</a:t>
-            </a:r>
-            <a:endParaRPr lang="en-US" sz="2000" dirty="0"/>
-          </a:p>
-          <a:p>
-            <a:pPr marL="228600" indent="-228600" fontAlgn="base">
-              <a:lnSpc>
-                <a:spcPct val="100000"/>
-              </a:lnSpc>
-              <a:buFont typeface="Arial" panose="020B0604020202020204" pitchFamily="34" charset="0"/>
-              <a:buChar char="•"/>
-            </a:pPr>
-            <a:r>
-              <a:rPr lang="en-US" sz="2000" dirty="0" smtClean="0"/>
-              <a:t>Keras CNN Model</a:t>
-            </a:r>
-          </a:p>
-          <a:p>
-            <a:pPr marL="228600" indent="-228600" fontAlgn="base">
-              <a:lnSpc>
-                <a:spcPct val="100000"/>
-              </a:lnSpc>
-              <a:buFont typeface="Arial" panose="020B0604020202020204" pitchFamily="34" charset="0"/>
-              <a:buChar char="•"/>
-            </a:pPr>
-            <a:r>
-              <a:rPr lang="en-US" sz="2000" dirty="0" smtClean="0"/>
-              <a:t>No </a:t>
-            </a:r>
-            <a:r>
-              <a:rPr lang="en-US" sz="2000" dirty="0"/>
-              <a:t>rewrite of algorithms/model</a:t>
-            </a:r>
-          </a:p>
-          <a:p>
-            <a:pPr marL="228600" indent="-228600" fontAlgn="base">
-              <a:lnSpc>
-                <a:spcPct val="100000"/>
-              </a:lnSpc>
-              <a:buFont typeface="Arial" panose="020B0604020202020204" pitchFamily="34" charset="0"/>
-              <a:buChar char="•"/>
-            </a:pPr>
-            <a:r>
-              <a:rPr lang="en-US" sz="2000" dirty="0"/>
-              <a:t>Save effort and time</a:t>
-            </a:r>
-          </a:p>
-          <a:p>
-            <a:endParaRPr lang="en-US" dirty="0"/>
-          </a:p>
-        </p:txBody>
-      </p:sp>
-      <p:pic>
-        <p:nvPicPr>
-          <p:cNvPr id="11266" name="Picture 2" descr="https://lh5.googleusercontent.com/pQtao83quyv5hjyvCmeb38e57PuHxpoYvhAaobxkm4u9XQ9YBRl2WfbfVLaJeiQGUPmzb7vOpruUGa9AGknmp2tYzCyTlB5-Jnl9YbHp2fAF6g19o5ebVpR31mV4gRj5v0q900J4-j0"/>
-          <p:cNvPicPr>
-            <a:picLocks noChangeAspect="1" noChangeArrowheads="1"/>
-          </p:cNvPicPr>
-          <p:nvPr/>
-        </p:nvPicPr>
-        <p:blipFill>
-          <a:blip r:embed="rId3">
-            <a:extLst>
-              <a:ext uri="{28A0092B-C50C-407E-A947-70E740481C1C}">
-                <a14:useLocalDpi xmlns:a14="http://schemas.microsoft.com/office/drawing/2010/main" val="0"/>
-              </a:ext>
-            </a:extLst>
-          </a:blip>
-          <a:srcRect/>
-          <a:stretch>
-            <a:fillRect/>
-          </a:stretch>
-        </p:blipFill>
-        <p:spPr bwMode="auto">
-          <a:xfrm>
-            <a:off x="5144291" y="993058"/>
-            <a:ext cx="5915025" cy="4395019"/>
-          </a:xfrm>
-          <a:prstGeom prst="rect">
-            <a:avLst/>
-          </a:prstGeom>
-          <a:noFill/>
-          <a:extLst>
-            <a:ext uri="{909E8E84-426E-40DD-AFC4-6F175D3DCCD1}">
-              <a14:hiddenFill xmlns:a14="http://schemas.microsoft.com/office/drawing/2010/main">
-                <a:solidFill>
-                  <a:srgbClr val="FFFFFF"/>
-                </a:solidFill>
-              </a14:hiddenFill>
-            </a:ext>
-          </a:extLst>
-        </p:spPr>
-      </p:pic>
-    </p:spTree>
-    <p:extLst>
-      <p:ext uri="{BB962C8B-B14F-4D97-AF65-F5344CB8AC3E}">
-        <p14:creationId xmlns:p14="http://schemas.microsoft.com/office/powerpoint/2010/main" val="638450634"/>
-      </p:ext>
-    </p:extLst>
-  </p:cSld>
-  <p:clrMapOvr>
-    <a:masterClrMapping/>
-  </p:clrMapOvr>
-  <p:timing>
-    <p:tnLst>
-      <p:par>
-        <p:cTn id="1" dur="indefinite" restart="never" nodeType="tmRoot"/>
-      </p:par>
-    </p:tnLst>
-  </p:timing>
-</p:sld>
-</file>
-
 <file path=ppt/slides/slide3.xml><?xml version="1.0" encoding="utf-8"?>
 <p:sld xmlns:a="http://schemas.openxmlformats.org/drawingml/2006/main" xmlns:r="http://schemas.openxmlformats.org/officeDocument/2006/relationships" xmlns:p="http://schemas.openxmlformats.org/presentationml/2006/main">
   <p:cSld>
@@ -16524,7 +16729,7 @@
           <a:p>
             <a:r>
               <a:rPr lang="en-US" dirty="0" smtClean="0"/>
-              <a:t>Quiz</a:t>
+              <a:t>Quiz : Type of ML</a:t>
             </a:r>
             <a:endParaRPr lang="en-US" dirty="0"/>
           </a:p>
@@ -17208,6 +17413,210 @@
             <p:ph type="title"/>
           </p:nvPr>
         </p:nvSpPr>
+        <p:spPr>
+          <a:xfrm>
+            <a:off x="239485" y="993058"/>
+            <a:ext cx="3783542" cy="569042"/>
+          </a:xfrm>
+        </p:spPr>
+        <p:txBody>
+          <a:bodyPr>
+            <a:normAutofit/>
+          </a:bodyPr>
+          <a:lstStyle/>
+          <a:p>
+            <a:r>
+              <a:rPr lang="en-US" dirty="0" smtClean="0"/>
+              <a:t>Interoperability</a:t>
+            </a:r>
+            <a:endParaRPr lang="en-US" dirty="0"/>
+          </a:p>
+        </p:txBody>
+      </p:sp>
+      <p:sp>
+        <p:nvSpPr>
+          <p:cNvPr id="4" name="Text Placeholder 3"/>
+          <p:cNvSpPr>
+            <a:spLocks noGrp="1"/>
+          </p:cNvSpPr>
+          <p:nvPr>
+            <p:ph type="body" sz="half" idx="2"/>
+          </p:nvPr>
+        </p:nvSpPr>
+        <p:spPr>
+          <a:xfrm>
+            <a:off x="166990" y="1687286"/>
+            <a:ext cx="3856037" cy="2227006"/>
+          </a:xfrm>
+        </p:spPr>
+        <p:txBody>
+          <a:bodyPr>
+            <a:normAutofit lnSpcReduction="10000"/>
+          </a:bodyPr>
+          <a:lstStyle/>
+          <a:p>
+            <a:pPr marL="228600" indent="-228600" fontAlgn="base">
+              <a:lnSpc>
+                <a:spcPct val="100000"/>
+              </a:lnSpc>
+              <a:buFont typeface="Arial" panose="020B0604020202020204" pitchFamily="34" charset="0"/>
+              <a:buChar char="•"/>
+            </a:pPr>
+            <a:r>
+              <a:rPr lang="en-US" sz="2000" dirty="0" smtClean="0"/>
+              <a:t>Photo-Search</a:t>
+            </a:r>
+          </a:p>
+          <a:p>
+            <a:pPr marL="228600" indent="-228600" fontAlgn="base">
+              <a:lnSpc>
+                <a:spcPct val="100000"/>
+              </a:lnSpc>
+              <a:buFont typeface="Arial" panose="020B0604020202020204" pitchFamily="34" charset="0"/>
+              <a:buChar char="•"/>
+            </a:pPr>
+            <a:r>
+              <a:rPr lang="en-US" sz="2000" dirty="0" smtClean="0"/>
+              <a:t>ML.Net + ONNX</a:t>
+            </a:r>
+            <a:endParaRPr lang="en-US" sz="2000" dirty="0"/>
+          </a:p>
+          <a:p>
+            <a:pPr marL="228600" indent="-228600" fontAlgn="base">
+              <a:lnSpc>
+                <a:spcPct val="100000"/>
+              </a:lnSpc>
+              <a:buFont typeface="Arial" panose="020B0604020202020204" pitchFamily="34" charset="0"/>
+              <a:buChar char="•"/>
+            </a:pPr>
+            <a:r>
+              <a:rPr lang="en-US" sz="2000" dirty="0" smtClean="0"/>
+              <a:t>Keras CNN Model</a:t>
+            </a:r>
+          </a:p>
+          <a:p>
+            <a:pPr marL="228600" indent="-228600" fontAlgn="base">
+              <a:lnSpc>
+                <a:spcPct val="100000"/>
+              </a:lnSpc>
+              <a:buFont typeface="Arial" panose="020B0604020202020204" pitchFamily="34" charset="0"/>
+              <a:buChar char="•"/>
+            </a:pPr>
+            <a:r>
+              <a:rPr lang="en-US" sz="2000" dirty="0" smtClean="0"/>
+              <a:t>No </a:t>
+            </a:r>
+            <a:r>
+              <a:rPr lang="en-US" sz="2000" dirty="0"/>
+              <a:t>rewrite of algorithms/model</a:t>
+            </a:r>
+          </a:p>
+          <a:p>
+            <a:pPr marL="228600" indent="-228600" fontAlgn="base">
+              <a:lnSpc>
+                <a:spcPct val="100000"/>
+              </a:lnSpc>
+              <a:buFont typeface="Arial" panose="020B0604020202020204" pitchFamily="34" charset="0"/>
+              <a:buChar char="•"/>
+            </a:pPr>
+            <a:r>
+              <a:rPr lang="en-US" sz="2000" dirty="0"/>
+              <a:t>Save effort and time</a:t>
+            </a:r>
+          </a:p>
+          <a:p>
+            <a:endParaRPr lang="en-US" dirty="0"/>
+          </a:p>
+        </p:txBody>
+      </p:sp>
+      <p:pic>
+        <p:nvPicPr>
+          <p:cNvPr id="11266" name="Picture 2" descr="https://lh5.googleusercontent.com/pQtao83quyv5hjyvCmeb38e57PuHxpoYvhAaobxkm4u9XQ9YBRl2WfbfVLaJeiQGUPmzb7vOpruUGa9AGknmp2tYzCyTlB5-Jnl9YbHp2fAF6g19o5ebVpR31mV4gRj5v0q900J4-j0"/>
+          <p:cNvPicPr>
+            <a:picLocks noChangeAspect="1" noChangeArrowheads="1"/>
+          </p:cNvPicPr>
+          <p:nvPr/>
+        </p:nvPicPr>
+        <p:blipFill>
+          <a:blip r:embed="rId3">
+            <a:extLst>
+              <a:ext uri="{28A0092B-C50C-407E-A947-70E740481C1C}">
+                <a14:useLocalDpi xmlns:a14="http://schemas.microsoft.com/office/drawing/2010/main" val="0"/>
+              </a:ext>
+            </a:extLst>
+          </a:blip>
+          <a:srcRect/>
+          <a:stretch>
+            <a:fillRect/>
+          </a:stretch>
+        </p:blipFill>
+        <p:spPr bwMode="auto">
+          <a:xfrm>
+            <a:off x="5144291" y="993058"/>
+            <a:ext cx="5915025" cy="4395019"/>
+          </a:xfrm>
+          <a:prstGeom prst="rect">
+            <a:avLst/>
+          </a:prstGeom>
+          <a:noFill/>
+          <a:extLst>
+            <a:ext uri="{909E8E84-426E-40DD-AFC4-6F175D3DCCD1}">
+              <a14:hiddenFill xmlns:a14="http://schemas.microsoft.com/office/drawing/2010/main">
+                <a:solidFill>
+                  <a:srgbClr val="FFFFFF"/>
+                </a:solidFill>
+              </a14:hiddenFill>
+            </a:ext>
+          </a:extLst>
+        </p:spPr>
+      </p:pic>
+    </p:spTree>
+    <p:extLst>
+      <p:ext uri="{BB962C8B-B14F-4D97-AF65-F5344CB8AC3E}">
+        <p14:creationId xmlns:p14="http://schemas.microsoft.com/office/powerpoint/2010/main" val="638450634"/>
+      </p:ext>
+    </p:extLst>
+  </p:cSld>
+  <p:clrMapOvr>
+    <a:masterClrMapping/>
+  </p:clrMapOvr>
+  <p:timing>
+    <p:tnLst>
+      <p:par>
+        <p:cTn id="1" dur="indefinite" restart="never" nodeType="tmRoot"/>
+      </p:par>
+    </p:tnLst>
+  </p:timing>
+</p:sld>
+</file>
+
+<file path=ppt/slides/slide31.xml><?xml version="1.0" encoding="utf-8"?>
+<p:sld xmlns:a="http://schemas.openxmlformats.org/drawingml/2006/main" xmlns:r="http://schemas.openxmlformats.org/officeDocument/2006/relationships" xmlns:p="http://schemas.openxmlformats.org/presentationml/2006/main">
+  <p:cSld>
+    <p:spTree>
+      <p:nvGrpSpPr>
+        <p:cNvPr id="1" name=""/>
+        <p:cNvGrpSpPr/>
+        <p:nvPr/>
+      </p:nvGrpSpPr>
+      <p:grpSpPr>
+        <a:xfrm>
+          <a:off x="0" y="0"/>
+          <a:ext cx="0" cy="0"/>
+          <a:chOff x="0" y="0"/>
+          <a:chExt cx="0" cy="0"/>
+        </a:xfrm>
+      </p:grpSpPr>
+      <p:sp>
+        <p:nvSpPr>
+          <p:cNvPr id="2" name="Title 1"/>
+          <p:cNvSpPr>
+            <a:spLocks noGrp="1"/>
+          </p:cNvSpPr>
+          <p:nvPr>
+            <p:ph type="title"/>
+          </p:nvPr>
+        </p:nvSpPr>
         <p:spPr/>
         <p:txBody>
           <a:bodyPr/>
@@ -17456,7 +17865,7 @@
 </p:sld>
 </file>
 
-<file path=ppt/slides/slide31.xml><?xml version="1.0" encoding="utf-8"?>
+<file path=ppt/slides/slide32.xml><?xml version="1.0" encoding="utf-8"?>
 <p:sld xmlns:a="http://schemas.openxmlformats.org/drawingml/2006/main" xmlns:r="http://schemas.openxmlformats.org/officeDocument/2006/relationships" xmlns:p="http://schemas.openxmlformats.org/presentationml/2006/main">
   <p:cSld>
     <p:spTree>
@@ -18038,7 +18447,15 @@
             </a:pPr>
             <a:r>
               <a:rPr lang="en-US" sz="9600" dirty="0"/>
-              <a:t>If programming is automation, then machine learning is automating the process of automation</a:t>
+              <a:t>If programming is </a:t>
+            </a:r>
+            <a:r>
+              <a:rPr lang="en-US" sz="9600" dirty="0" smtClean="0"/>
+              <a:t>automation, then machine </a:t>
+            </a:r>
+            <a:r>
+              <a:rPr lang="en-US" sz="9600" dirty="0"/>
+              <a:t>learning is automating the process of automation</a:t>
             </a:r>
           </a:p>
         </p:txBody>

</xml_diff>